<commit_message>
Update QS WSFT Meeting 2019-06-09.pptx
Reviewals
</commit_message>
<xml_diff>
--- a/end-to-end encryption/QS WSFT Meeting 2019-06-09.pptx
+++ b/end-to-end encryption/QS WSFT Meeting 2019-06-09.pptx
@@ -9,7 +9,7 @@
     <p:sldId id="257" r:id="rId6"/>
     <p:sldId id="264" r:id="rId7"/>
     <p:sldId id="258" r:id="rId8"/>
-    <p:sldId id="259" r:id="rId9"/>
+    <p:sldId id="267" r:id="rId9"/>
     <p:sldId id="260" r:id="rId10"/>
     <p:sldId id="266" r:id="rId11"/>
     <p:sldId id="261" r:id="rId12"/>
@@ -124,1479 +124,9 @@
 <file path=ppt/revisionInfo.xml><?xml version="1.0" encoding="utf-8"?>
 <p1510:revInfo xmlns:a="http://schemas.openxmlformats.org/drawingml/2006/main" xmlns:r="http://schemas.openxmlformats.org/officeDocument/2006/relationships" xmlns:p1510="http://schemas.microsoft.com/office/powerpoint/2015/10/main">
   <p1510:revLst>
-    <p1510:client id="{098C72FC-AE60-E4CD-85A6-D8811150A563}" v="48" dt="2019-06-04T06:48:55.411"/>
-    <p1510:client id="{3B63374C-0901-8781-4790-3A2CCE0D3837}" v="1" dt="2019-06-03T13:59:46.197"/>
-    <p1510:client id="{788EFEF4-B8A5-345C-286E-0A34FF405E82}" v="21" dt="2019-06-04T06:47:03.008"/>
+    <p1510:client id="{D91654D6-6C03-D627-3BAD-D49D1DB44CD8}" v="9" dt="2019-06-05T12:40:13.350"/>
   </p1510:revLst>
 </p1510:revInfo>
-</file>
-
-<file path=ppt/changesInfos/changesInfo1.xml><?xml version="1.0" encoding="utf-8"?>
-<pc:chgInfo xmlns:a="http://schemas.openxmlformats.org/drawingml/2006/main" xmlns:r="http://schemas.openxmlformats.org/officeDocument/2006/relationships" xmlns:ac="http://schemas.microsoft.com/office/drawing/2013/main/command" xmlns:pc="http://schemas.microsoft.com/office/powerpoint/2013/main/command">
-  <pc:docChgLst>
-    <pc:chgData name="Freek Driesenaar" userId="S::freek.driesenaar@qiy.eu::8a610ddd-2d43-48fb-8de7-c62ed8386364" providerId="AD" clId="Web-{CB68C916-AC33-4A4E-A60C-1D7E82BE0A92}"/>
-    <pc:docChg chg="addSld modSld">
-      <pc:chgData name="Freek Driesenaar" userId="S::freek.driesenaar@qiy.eu::8a610ddd-2d43-48fb-8de7-c62ed8386364" providerId="AD" clId="Web-{CB68C916-AC33-4A4E-A60C-1D7E82BE0A92}" dt="2019-06-03T13:11:26.720" v="1971" actId="20577"/>
-      <pc:docMkLst>
-        <pc:docMk/>
-      </pc:docMkLst>
-      <pc:sldChg chg="modSp">
-        <pc:chgData name="Freek Driesenaar" userId="S::freek.driesenaar@qiy.eu::8a610ddd-2d43-48fb-8de7-c62ed8386364" providerId="AD" clId="Web-{CB68C916-AC33-4A4E-A60C-1D7E82BE0A92}" dt="2019-06-03T12:41:04.074" v="167" actId="20577"/>
-        <pc:sldMkLst>
-          <pc:docMk/>
-          <pc:sldMk cId="3351439039" sldId="256"/>
-        </pc:sldMkLst>
-        <pc:spChg chg="mod">
-          <ac:chgData name="Freek Driesenaar" userId="S::freek.driesenaar@qiy.eu::8a610ddd-2d43-48fb-8de7-c62ed8386364" providerId="AD" clId="Web-{CB68C916-AC33-4A4E-A60C-1D7E82BE0A92}" dt="2019-06-03T12:38:20.934" v="5" actId="20577"/>
-          <ac:spMkLst>
-            <pc:docMk/>
-            <pc:sldMk cId="3351439039" sldId="256"/>
-            <ac:spMk id="2" creationId="{00000000-0000-0000-0000-000000000000}"/>
-          </ac:spMkLst>
-        </pc:spChg>
-        <pc:spChg chg="mod">
-          <ac:chgData name="Freek Driesenaar" userId="S::freek.driesenaar@qiy.eu::8a610ddd-2d43-48fb-8de7-c62ed8386364" providerId="AD" clId="Web-{CB68C916-AC33-4A4E-A60C-1D7E82BE0A92}" dt="2019-06-03T12:41:04.074" v="167" actId="20577"/>
-          <ac:spMkLst>
-            <pc:docMk/>
-            <pc:sldMk cId="3351439039" sldId="256"/>
-            <ac:spMk id="3" creationId="{00000000-0000-0000-0000-000000000000}"/>
-          </ac:spMkLst>
-        </pc:spChg>
-      </pc:sldChg>
-      <pc:sldChg chg="modSp new">
-        <pc:chgData name="Freek Driesenaar" userId="S::freek.driesenaar@qiy.eu::8a610ddd-2d43-48fb-8de7-c62ed8386364" providerId="AD" clId="Web-{CB68C916-AC33-4A4E-A60C-1D7E82BE0A92}" dt="2019-06-03T13:08:46.268" v="1908" actId="20577"/>
-        <pc:sldMkLst>
-          <pc:docMk/>
-          <pc:sldMk cId="2542678002" sldId="257"/>
-        </pc:sldMkLst>
-        <pc:spChg chg="mod">
-          <ac:chgData name="Freek Driesenaar" userId="S::freek.driesenaar@qiy.eu::8a610ddd-2d43-48fb-8de7-c62ed8386364" providerId="AD" clId="Web-{CB68C916-AC33-4A4E-A60C-1D7E82BE0A92}" dt="2019-06-03T12:41:14.887" v="182" actId="20577"/>
-          <ac:spMkLst>
-            <pc:docMk/>
-            <pc:sldMk cId="2542678002" sldId="257"/>
-            <ac:spMk id="2" creationId="{13FF23C3-1446-47B4-A144-B1E311B5CCE2}"/>
-          </ac:spMkLst>
-        </pc:spChg>
-        <pc:spChg chg="mod">
-          <ac:chgData name="Freek Driesenaar" userId="S::freek.driesenaar@qiy.eu::8a610ddd-2d43-48fb-8de7-c62ed8386364" providerId="AD" clId="Web-{CB68C916-AC33-4A4E-A60C-1D7E82BE0A92}" dt="2019-06-03T13:08:46.268" v="1908" actId="20577"/>
-          <ac:spMkLst>
-            <pc:docMk/>
-            <pc:sldMk cId="2542678002" sldId="257"/>
-            <ac:spMk id="3" creationId="{83429C38-9E77-4110-B383-A434A08FF96E}"/>
-          </ac:spMkLst>
-        </pc:spChg>
-      </pc:sldChg>
-      <pc:sldChg chg="modSp new">
-        <pc:chgData name="Freek Driesenaar" userId="S::freek.driesenaar@qiy.eu::8a610ddd-2d43-48fb-8de7-c62ed8386364" providerId="AD" clId="Web-{CB68C916-AC33-4A4E-A60C-1D7E82BE0A92}" dt="2019-06-03T12:47:52.947" v="690" actId="20577"/>
-        <pc:sldMkLst>
-          <pc:docMk/>
-          <pc:sldMk cId="3209328664" sldId="258"/>
-        </pc:sldMkLst>
-        <pc:spChg chg="mod">
-          <ac:chgData name="Freek Driesenaar" userId="S::freek.driesenaar@qiy.eu::8a610ddd-2d43-48fb-8de7-c62ed8386364" providerId="AD" clId="Web-{CB68C916-AC33-4A4E-A60C-1D7E82BE0A92}" dt="2019-06-03T12:45:14.838" v="447" actId="20577"/>
-          <ac:spMkLst>
-            <pc:docMk/>
-            <pc:sldMk cId="3209328664" sldId="258"/>
-            <ac:spMk id="2" creationId="{EEFFB041-63B4-4752-B1FA-200F3532C9D0}"/>
-          </ac:spMkLst>
-        </pc:spChg>
-        <pc:spChg chg="mod">
-          <ac:chgData name="Freek Driesenaar" userId="S::freek.driesenaar@qiy.eu::8a610ddd-2d43-48fb-8de7-c62ed8386364" providerId="AD" clId="Web-{CB68C916-AC33-4A4E-A60C-1D7E82BE0A92}" dt="2019-06-03T12:47:52.947" v="690" actId="20577"/>
-          <ac:spMkLst>
-            <pc:docMk/>
-            <pc:sldMk cId="3209328664" sldId="258"/>
-            <ac:spMk id="3" creationId="{E455350F-95B1-450D-B938-F3F0882FBDB1}"/>
-          </ac:spMkLst>
-        </pc:spChg>
-      </pc:sldChg>
-      <pc:sldChg chg="modSp new">
-        <pc:chgData name="Freek Driesenaar" userId="S::freek.driesenaar@qiy.eu::8a610ddd-2d43-48fb-8de7-c62ed8386364" providerId="AD" clId="Web-{CB68C916-AC33-4A4E-A60C-1D7E82BE0A92}" dt="2019-06-03T12:56:56.928" v="953" actId="20577"/>
-        <pc:sldMkLst>
-          <pc:docMk/>
-          <pc:sldMk cId="370089361" sldId="259"/>
-        </pc:sldMkLst>
-        <pc:spChg chg="mod">
-          <ac:chgData name="Freek Driesenaar" userId="S::freek.driesenaar@qiy.eu::8a610ddd-2d43-48fb-8de7-c62ed8386364" providerId="AD" clId="Web-{CB68C916-AC33-4A4E-A60C-1D7E82BE0A92}" dt="2019-06-03T12:48:31.994" v="751" actId="20577"/>
-          <ac:spMkLst>
-            <pc:docMk/>
-            <pc:sldMk cId="370089361" sldId="259"/>
-            <ac:spMk id="2" creationId="{BFE6C493-AD4F-4293-B4BD-CE1C0F343C0D}"/>
-          </ac:spMkLst>
-        </pc:spChg>
-        <pc:spChg chg="mod">
-          <ac:chgData name="Freek Driesenaar" userId="S::freek.driesenaar@qiy.eu::8a610ddd-2d43-48fb-8de7-c62ed8386364" providerId="AD" clId="Web-{CB68C916-AC33-4A4E-A60C-1D7E82BE0A92}" dt="2019-06-03T12:56:56.928" v="953" actId="20577"/>
-          <ac:spMkLst>
-            <pc:docMk/>
-            <pc:sldMk cId="370089361" sldId="259"/>
-            <ac:spMk id="3" creationId="{1254824B-0798-4731-8364-896AD6A47E0B}"/>
-          </ac:spMkLst>
-        </pc:spChg>
-      </pc:sldChg>
-      <pc:sldChg chg="modSp new">
-        <pc:chgData name="Freek Driesenaar" userId="S::freek.driesenaar@qiy.eu::8a610ddd-2d43-48fb-8de7-c62ed8386364" providerId="AD" clId="Web-{CB68C916-AC33-4A4E-A60C-1D7E82BE0A92}" dt="2019-06-03T13:03:46.629" v="1581" actId="20577"/>
-        <pc:sldMkLst>
-          <pc:docMk/>
-          <pc:sldMk cId="2192957403" sldId="260"/>
-        </pc:sldMkLst>
-        <pc:spChg chg="mod">
-          <ac:chgData name="Freek Driesenaar" userId="S::freek.driesenaar@qiy.eu::8a610ddd-2d43-48fb-8de7-c62ed8386364" providerId="AD" clId="Web-{CB68C916-AC33-4A4E-A60C-1D7E82BE0A92}" dt="2019-06-03T12:57:36.459" v="979" actId="20577"/>
-          <ac:spMkLst>
-            <pc:docMk/>
-            <pc:sldMk cId="2192957403" sldId="260"/>
-            <ac:spMk id="2" creationId="{F20A624C-4BE5-4BA5-9CAD-93A1BCBAE749}"/>
-          </ac:spMkLst>
-        </pc:spChg>
-        <pc:spChg chg="mod">
-          <ac:chgData name="Freek Driesenaar" userId="S::freek.driesenaar@qiy.eu::8a610ddd-2d43-48fb-8de7-c62ed8386364" providerId="AD" clId="Web-{CB68C916-AC33-4A4E-A60C-1D7E82BE0A92}" dt="2019-06-03T13:03:46.629" v="1581" actId="20577"/>
-          <ac:spMkLst>
-            <pc:docMk/>
-            <pc:sldMk cId="2192957403" sldId="260"/>
-            <ac:spMk id="3" creationId="{DDE4FC46-0BFC-4572-9567-661B00621ECE}"/>
-          </ac:spMkLst>
-        </pc:spChg>
-      </pc:sldChg>
-      <pc:sldChg chg="modSp new">
-        <pc:chgData name="Freek Driesenaar" userId="S::freek.driesenaar@qiy.eu::8a610ddd-2d43-48fb-8de7-c62ed8386364" providerId="AD" clId="Web-{CB68C916-AC33-4A4E-A60C-1D7E82BE0A92}" dt="2019-06-03T13:04:53.004" v="1647" actId="20577"/>
-        <pc:sldMkLst>
-          <pc:docMk/>
-          <pc:sldMk cId="1474770734" sldId="261"/>
-        </pc:sldMkLst>
-        <pc:spChg chg="mod">
-          <ac:chgData name="Freek Driesenaar" userId="S::freek.driesenaar@qiy.eu::8a610ddd-2d43-48fb-8de7-c62ed8386364" providerId="AD" clId="Web-{CB68C916-AC33-4A4E-A60C-1D7E82BE0A92}" dt="2019-06-03T13:03:58.301" v="1588" actId="20577"/>
-          <ac:spMkLst>
-            <pc:docMk/>
-            <pc:sldMk cId="1474770734" sldId="261"/>
-            <ac:spMk id="2" creationId="{BE0B67F0-622B-425E-AE51-2E446105D95C}"/>
-          </ac:spMkLst>
-        </pc:spChg>
-        <pc:spChg chg="mod">
-          <ac:chgData name="Freek Driesenaar" userId="S::freek.driesenaar@qiy.eu::8a610ddd-2d43-48fb-8de7-c62ed8386364" providerId="AD" clId="Web-{CB68C916-AC33-4A4E-A60C-1D7E82BE0A92}" dt="2019-06-03T13:04:53.004" v="1647" actId="20577"/>
-          <ac:spMkLst>
-            <pc:docMk/>
-            <pc:sldMk cId="1474770734" sldId="261"/>
-            <ac:spMk id="3" creationId="{B8DF9218-F807-43B7-90FD-C49D365C3EBC}"/>
-          </ac:spMkLst>
-        </pc:spChg>
-      </pc:sldChg>
-      <pc:sldChg chg="modSp new">
-        <pc:chgData name="Freek Driesenaar" userId="S::freek.driesenaar@qiy.eu::8a610ddd-2d43-48fb-8de7-c62ed8386364" providerId="AD" clId="Web-{CB68C916-AC33-4A4E-A60C-1D7E82BE0A92}" dt="2019-06-03T13:11:26.720" v="1970" actId="20577"/>
-        <pc:sldMkLst>
-          <pc:docMk/>
-          <pc:sldMk cId="1440797108" sldId="262"/>
-        </pc:sldMkLst>
-        <pc:spChg chg="mod">
-          <ac:chgData name="Freek Driesenaar" userId="S::freek.driesenaar@qiy.eu::8a610ddd-2d43-48fb-8de7-c62ed8386364" providerId="AD" clId="Web-{CB68C916-AC33-4A4E-A60C-1D7E82BE0A92}" dt="2019-06-03T13:07:14.862" v="1831" actId="20577"/>
-          <ac:spMkLst>
-            <pc:docMk/>
-            <pc:sldMk cId="1440797108" sldId="262"/>
-            <ac:spMk id="2" creationId="{608E626A-C18B-450D-B617-815E5E042AD8}"/>
-          </ac:spMkLst>
-        </pc:spChg>
-        <pc:spChg chg="mod">
-          <ac:chgData name="Freek Driesenaar" userId="S::freek.driesenaar@qiy.eu::8a610ddd-2d43-48fb-8de7-c62ed8386364" providerId="AD" clId="Web-{CB68C916-AC33-4A4E-A60C-1D7E82BE0A92}" dt="2019-06-03T13:11:26.720" v="1970" actId="20577"/>
-          <ac:spMkLst>
-            <pc:docMk/>
-            <pc:sldMk cId="1440797108" sldId="262"/>
-            <ac:spMk id="3" creationId="{877433EC-6FE1-4EC4-B474-47C884A1623B}"/>
-          </ac:spMkLst>
-        </pc:spChg>
-      </pc:sldChg>
-      <pc:sldChg chg="modSp new">
-        <pc:chgData name="Freek Driesenaar" userId="S::freek.driesenaar@qiy.eu::8a610ddd-2d43-48fb-8de7-c62ed8386364" providerId="AD" clId="Web-{CB68C916-AC33-4A4E-A60C-1D7E82BE0A92}" dt="2019-06-03T13:09:23.783" v="1951" actId="20577"/>
-        <pc:sldMkLst>
-          <pc:docMk/>
-          <pc:sldMk cId="2334769732" sldId="263"/>
-        </pc:sldMkLst>
-        <pc:spChg chg="mod">
-          <ac:chgData name="Freek Driesenaar" userId="S::freek.driesenaar@qiy.eu::8a610ddd-2d43-48fb-8de7-c62ed8386364" providerId="AD" clId="Web-{CB68C916-AC33-4A4E-A60C-1D7E82BE0A92}" dt="2019-06-03T13:08:56.690" v="1923" actId="20577"/>
-          <ac:spMkLst>
-            <pc:docMk/>
-            <pc:sldMk cId="2334769732" sldId="263"/>
-            <ac:spMk id="2" creationId="{E0BE9DA0-9C52-479A-BCC9-426BB8D1C3EE}"/>
-          </ac:spMkLst>
-        </pc:spChg>
-        <pc:spChg chg="mod">
-          <ac:chgData name="Freek Driesenaar" userId="S::freek.driesenaar@qiy.eu::8a610ddd-2d43-48fb-8de7-c62ed8386364" providerId="AD" clId="Web-{CB68C916-AC33-4A4E-A60C-1D7E82BE0A92}" dt="2019-06-03T13:09:23.783" v="1951" actId="20577"/>
-          <ac:spMkLst>
-            <pc:docMk/>
-            <pc:sldMk cId="2334769732" sldId="263"/>
-            <ac:spMk id="3" creationId="{4BEB074D-C4FC-4A13-B933-00126DEFBDB0}"/>
-          </ac:spMkLst>
-        </pc:spChg>
-      </pc:sldChg>
-    </pc:docChg>
-  </pc:docChgLst>
-  <pc:docChgLst>
-    <pc:chgData name="Freek Driesenaar" userId="S::freek.driesenaar@qiy.eu::8a610ddd-2d43-48fb-8de7-c62ed8386364" providerId="AD" clId="Web-{3B63374C-0901-8781-4790-3A2CCE0D3837}"/>
-    <pc:docChg chg="addSld delSld modSld">
-      <pc:chgData name="Freek Driesenaar" userId="S::freek.driesenaar@qiy.eu::8a610ddd-2d43-48fb-8de7-c62ed8386364" providerId="AD" clId="Web-{3B63374C-0901-8781-4790-3A2CCE0D3837}" dt="2019-06-03T14:10:14.871" v="197"/>
-      <pc:docMkLst>
-        <pc:docMk/>
-      </pc:docMkLst>
-      <pc:sldChg chg="modSp">
-        <pc:chgData name="Freek Driesenaar" userId="S::freek.driesenaar@qiy.eu::8a610ddd-2d43-48fb-8de7-c62ed8386364" providerId="AD" clId="Web-{3B63374C-0901-8781-4790-3A2CCE0D3837}" dt="2019-06-03T13:56:35.524" v="18" actId="20577"/>
-        <pc:sldMkLst>
-          <pc:docMk/>
-          <pc:sldMk cId="2542678002" sldId="257"/>
-        </pc:sldMkLst>
-        <pc:spChg chg="mod">
-          <ac:chgData name="Freek Driesenaar" userId="S::freek.driesenaar@qiy.eu::8a610ddd-2d43-48fb-8de7-c62ed8386364" providerId="AD" clId="Web-{3B63374C-0901-8781-4790-3A2CCE0D3837}" dt="2019-06-03T13:56:35.524" v="18" actId="20577"/>
-          <ac:spMkLst>
-            <pc:docMk/>
-            <pc:sldMk cId="2542678002" sldId="257"/>
-            <ac:spMk id="3" creationId="{83429C38-9E77-4110-B383-A434A08FF96E}"/>
-          </ac:spMkLst>
-        </pc:spChg>
-      </pc:sldChg>
-      <pc:sldChg chg="addSp modSp">
-        <pc:chgData name="Freek Driesenaar" userId="S::freek.driesenaar@qiy.eu::8a610ddd-2d43-48fb-8de7-c62ed8386364" providerId="AD" clId="Web-{3B63374C-0901-8781-4790-3A2CCE0D3837}" dt="2019-06-03T14:10:14.871" v="197"/>
-        <pc:sldMkLst>
-          <pc:docMk/>
-          <pc:sldMk cId="3209328664" sldId="258"/>
-        </pc:sldMkLst>
-        <pc:spChg chg="mod">
-          <ac:chgData name="Freek Driesenaar" userId="S::freek.driesenaar@qiy.eu::8a610ddd-2d43-48fb-8de7-c62ed8386364" providerId="AD" clId="Web-{3B63374C-0901-8781-4790-3A2CCE0D3837}" dt="2019-06-03T14:09:39.731" v="190" actId="20577"/>
-          <ac:spMkLst>
-            <pc:docMk/>
-            <pc:sldMk cId="3209328664" sldId="258"/>
-            <ac:spMk id="2" creationId="{EEFFB041-63B4-4752-B1FA-200F3532C9D0}"/>
-          </ac:spMkLst>
-        </pc:spChg>
-        <pc:spChg chg="mod">
-          <ac:chgData name="Freek Driesenaar" userId="S::freek.driesenaar@qiy.eu::8a610ddd-2d43-48fb-8de7-c62ed8386364" providerId="AD" clId="Web-{3B63374C-0901-8781-4790-3A2CCE0D3837}" dt="2019-06-03T14:09:48.184" v="193" actId="1076"/>
-          <ac:spMkLst>
-            <pc:docMk/>
-            <pc:sldMk cId="3209328664" sldId="258"/>
-            <ac:spMk id="3" creationId="{E455350F-95B1-450D-B938-F3F0882FBDB1}"/>
-          </ac:spMkLst>
-        </pc:spChg>
-        <pc:spChg chg="add">
-          <ac:chgData name="Freek Driesenaar" userId="S::freek.driesenaar@qiy.eu::8a610ddd-2d43-48fb-8de7-c62ed8386364" providerId="AD" clId="Web-{3B63374C-0901-8781-4790-3A2CCE0D3837}" dt="2019-06-03T14:09:13.309" v="169"/>
-          <ac:spMkLst>
-            <pc:docMk/>
-            <pc:sldMk cId="3209328664" sldId="258"/>
-            <ac:spMk id="5" creationId="{8505B497-BA31-438B-BC7E-04811412A13C}"/>
-          </ac:spMkLst>
-        </pc:spChg>
-        <pc:spChg chg="add">
-          <ac:chgData name="Freek Driesenaar" userId="S::freek.driesenaar@qiy.eu::8a610ddd-2d43-48fb-8de7-c62ed8386364" providerId="AD" clId="Web-{3B63374C-0901-8781-4790-3A2CCE0D3837}" dt="2019-06-03T14:09:13.324" v="170"/>
-          <ac:spMkLst>
-            <pc:docMk/>
-            <pc:sldMk cId="3209328664" sldId="258"/>
-            <ac:spMk id="7" creationId="{D5D7B2E9-9AEB-4962-B3D4-F6DD1FF333EF}"/>
-          </ac:spMkLst>
-        </pc:spChg>
-        <pc:spChg chg="add">
-          <ac:chgData name="Freek Driesenaar" userId="S::freek.driesenaar@qiy.eu::8a610ddd-2d43-48fb-8de7-c62ed8386364" providerId="AD" clId="Web-{3B63374C-0901-8781-4790-3A2CCE0D3837}" dt="2019-06-03T14:09:13.324" v="171"/>
-          <ac:spMkLst>
-            <pc:docMk/>
-            <pc:sldMk cId="3209328664" sldId="258"/>
-            <ac:spMk id="9" creationId="{69DD1E17-FFD2-4C37-A7AE-544FCCEE6FBA}"/>
-          </ac:spMkLst>
-        </pc:spChg>
-        <pc:spChg chg="add">
-          <ac:chgData name="Freek Driesenaar" userId="S::freek.driesenaar@qiy.eu::8a610ddd-2d43-48fb-8de7-c62ed8386364" providerId="AD" clId="Web-{3B63374C-0901-8781-4790-3A2CCE0D3837}" dt="2019-06-03T14:09:13.340" v="172"/>
-          <ac:spMkLst>
-            <pc:docMk/>
-            <pc:sldMk cId="3209328664" sldId="258"/>
-            <ac:spMk id="11" creationId="{E49E3AF7-2A33-4166-BF9B-7E83095054A2}"/>
-          </ac:spMkLst>
-        </pc:spChg>
-        <pc:spChg chg="add">
-          <ac:chgData name="Freek Driesenaar" userId="S::freek.driesenaar@qiy.eu::8a610ddd-2d43-48fb-8de7-c62ed8386364" providerId="AD" clId="Web-{3B63374C-0901-8781-4790-3A2CCE0D3837}" dt="2019-06-03T14:09:13.355" v="173"/>
-          <ac:spMkLst>
-            <pc:docMk/>
-            <pc:sldMk cId="3209328664" sldId="258"/>
-            <ac:spMk id="13" creationId="{C3C2CCCE-5FE6-45DD-9905-22A1CB2327AB}"/>
-          </ac:spMkLst>
-        </pc:spChg>
-        <pc:spChg chg="add">
-          <ac:chgData name="Freek Driesenaar" userId="S::freek.driesenaar@qiy.eu::8a610ddd-2d43-48fb-8de7-c62ed8386364" providerId="AD" clId="Web-{3B63374C-0901-8781-4790-3A2CCE0D3837}" dt="2019-06-03T14:09:13.371" v="174"/>
-          <ac:spMkLst>
-            <pc:docMk/>
-            <pc:sldMk cId="3209328664" sldId="258"/>
-            <ac:spMk id="15" creationId="{C299C659-F774-42CD-82A8-B78DA3B8B196}"/>
-          </ac:spMkLst>
-        </pc:spChg>
-        <pc:spChg chg="add">
-          <ac:chgData name="Freek Driesenaar" userId="S::freek.driesenaar@qiy.eu::8a610ddd-2d43-48fb-8de7-c62ed8386364" providerId="AD" clId="Web-{3B63374C-0901-8781-4790-3A2CCE0D3837}" dt="2019-06-03T14:09:13.387" v="175"/>
-          <ac:spMkLst>
-            <pc:docMk/>
-            <pc:sldMk cId="3209328664" sldId="258"/>
-            <ac:spMk id="17" creationId="{9D5A5B66-6562-4569-B668-F3A8D65C1788}"/>
-          </ac:spMkLst>
-        </pc:spChg>
-        <pc:spChg chg="add">
-          <ac:chgData name="Freek Driesenaar" userId="S::freek.driesenaar@qiy.eu::8a610ddd-2d43-48fb-8de7-c62ed8386364" providerId="AD" clId="Web-{3B63374C-0901-8781-4790-3A2CCE0D3837}" dt="2019-06-03T14:09:13.402" v="176"/>
-          <ac:spMkLst>
-            <pc:docMk/>
-            <pc:sldMk cId="3209328664" sldId="258"/>
-            <ac:spMk id="19" creationId="{C85A266B-7EEC-4E66-BA26-4076C8DDFAA5}"/>
-          </ac:spMkLst>
-        </pc:spChg>
-        <pc:spChg chg="add">
-          <ac:chgData name="Freek Driesenaar" userId="S::freek.driesenaar@qiy.eu::8a610ddd-2d43-48fb-8de7-c62ed8386364" providerId="AD" clId="Web-{3B63374C-0901-8781-4790-3A2CCE0D3837}" dt="2019-06-03T14:09:13.418" v="177"/>
-          <ac:spMkLst>
-            <pc:docMk/>
-            <pc:sldMk cId="3209328664" sldId="258"/>
-            <ac:spMk id="21" creationId="{66F8A70F-D43B-4F7A-A03E-2EC6DEDA572B}"/>
-          </ac:spMkLst>
-        </pc:spChg>
-        <pc:spChg chg="add">
-          <ac:chgData name="Freek Driesenaar" userId="S::freek.driesenaar@qiy.eu::8a610ddd-2d43-48fb-8de7-c62ed8386364" providerId="AD" clId="Web-{3B63374C-0901-8781-4790-3A2CCE0D3837}" dt="2019-06-03T14:09:13.434" v="178"/>
-          <ac:spMkLst>
-            <pc:docMk/>
-            <pc:sldMk cId="3209328664" sldId="258"/>
-            <ac:spMk id="23" creationId="{FA537E0B-5860-4DF9-A1AA-1561544B0E9E}"/>
-          </ac:spMkLst>
-        </pc:spChg>
-        <pc:spChg chg="add mod">
-          <ac:chgData name="Freek Driesenaar" userId="S::freek.driesenaar@qiy.eu::8a610ddd-2d43-48fb-8de7-c62ed8386364" providerId="AD" clId="Web-{3B63374C-0901-8781-4790-3A2CCE0D3837}" dt="2019-06-03T14:10:14.871" v="197"/>
-          <ac:spMkLst>
-            <pc:docMk/>
-            <pc:sldMk cId="3209328664" sldId="258"/>
-            <ac:spMk id="42" creationId="{F5FBEA59-614E-4A55-BD67-9983964766EE}"/>
-          </ac:spMkLst>
-        </pc:spChg>
-        <pc:cxnChg chg="add">
-          <ac:chgData name="Freek Driesenaar" userId="S::freek.driesenaar@qiy.eu::8a610ddd-2d43-48fb-8de7-c62ed8386364" providerId="AD" clId="Web-{3B63374C-0901-8781-4790-3A2CCE0D3837}" dt="2019-06-03T14:09:13.449" v="179"/>
-          <ac:cxnSpMkLst>
-            <pc:docMk/>
-            <pc:sldMk cId="3209328664" sldId="258"/>
-            <ac:cxnSpMk id="25" creationId="{A04A049F-1EBB-4335-B91A-F49E51980950}"/>
-          </ac:cxnSpMkLst>
-        </pc:cxnChg>
-        <pc:cxnChg chg="add">
-          <ac:chgData name="Freek Driesenaar" userId="S::freek.driesenaar@qiy.eu::8a610ddd-2d43-48fb-8de7-c62ed8386364" providerId="AD" clId="Web-{3B63374C-0901-8781-4790-3A2CCE0D3837}" dt="2019-06-03T14:09:13.465" v="180"/>
-          <ac:cxnSpMkLst>
-            <pc:docMk/>
-            <pc:sldMk cId="3209328664" sldId="258"/>
-            <ac:cxnSpMk id="27" creationId="{2E982B15-2B07-4DB9-BFF7-47F87B7A4381}"/>
-          </ac:cxnSpMkLst>
-        </pc:cxnChg>
-        <pc:cxnChg chg="add">
-          <ac:chgData name="Freek Driesenaar" userId="S::freek.driesenaar@qiy.eu::8a610ddd-2d43-48fb-8de7-c62ed8386364" providerId="AD" clId="Web-{3B63374C-0901-8781-4790-3A2CCE0D3837}" dt="2019-06-03T14:09:13.481" v="181"/>
-          <ac:cxnSpMkLst>
-            <pc:docMk/>
-            <pc:sldMk cId="3209328664" sldId="258"/>
-            <ac:cxnSpMk id="29" creationId="{63CA5F7F-055E-4D67-A041-70A1954825FF}"/>
-          </ac:cxnSpMkLst>
-        </pc:cxnChg>
-        <pc:cxnChg chg="add">
-          <ac:chgData name="Freek Driesenaar" userId="S::freek.driesenaar@qiy.eu::8a610ddd-2d43-48fb-8de7-c62ed8386364" providerId="AD" clId="Web-{3B63374C-0901-8781-4790-3A2CCE0D3837}" dt="2019-06-03T14:09:13.496" v="182"/>
-          <ac:cxnSpMkLst>
-            <pc:docMk/>
-            <pc:sldMk cId="3209328664" sldId="258"/>
-            <ac:cxnSpMk id="31" creationId="{E9F44252-CD55-43E5-ACAC-1EAF1D85FC06}"/>
-          </ac:cxnSpMkLst>
-        </pc:cxnChg>
-        <pc:cxnChg chg="add">
-          <ac:chgData name="Freek Driesenaar" userId="S::freek.driesenaar@qiy.eu::8a610ddd-2d43-48fb-8de7-c62ed8386364" providerId="AD" clId="Web-{3B63374C-0901-8781-4790-3A2CCE0D3837}" dt="2019-06-03T14:09:13.512" v="183"/>
-          <ac:cxnSpMkLst>
-            <pc:docMk/>
-            <pc:sldMk cId="3209328664" sldId="258"/>
-            <ac:cxnSpMk id="33" creationId="{13500F0C-7194-4B19-B7E5-F0AC8637B210}"/>
-          </ac:cxnSpMkLst>
-        </pc:cxnChg>
-        <pc:cxnChg chg="add">
-          <ac:chgData name="Freek Driesenaar" userId="S::freek.driesenaar@qiy.eu::8a610ddd-2d43-48fb-8de7-c62ed8386364" providerId="AD" clId="Web-{3B63374C-0901-8781-4790-3A2CCE0D3837}" dt="2019-06-03T14:09:13.527" v="184"/>
-          <ac:cxnSpMkLst>
-            <pc:docMk/>
-            <pc:sldMk cId="3209328664" sldId="258"/>
-            <ac:cxnSpMk id="35" creationId="{4A47DCCB-8A3A-4D7E-9925-0B5589A72B40}"/>
-          </ac:cxnSpMkLst>
-        </pc:cxnChg>
-        <pc:cxnChg chg="add">
-          <ac:chgData name="Freek Driesenaar" userId="S::freek.driesenaar@qiy.eu::8a610ddd-2d43-48fb-8de7-c62ed8386364" providerId="AD" clId="Web-{3B63374C-0901-8781-4790-3A2CCE0D3837}" dt="2019-06-03T14:09:13.527" v="185"/>
-          <ac:cxnSpMkLst>
-            <pc:docMk/>
-            <pc:sldMk cId="3209328664" sldId="258"/>
-            <ac:cxnSpMk id="37" creationId="{D86B4245-6723-4B52-9288-FEACC62D3891}"/>
-          </ac:cxnSpMkLst>
-        </pc:cxnChg>
-        <pc:cxnChg chg="add">
-          <ac:chgData name="Freek Driesenaar" userId="S::freek.driesenaar@qiy.eu::8a610ddd-2d43-48fb-8de7-c62ed8386364" providerId="AD" clId="Web-{3B63374C-0901-8781-4790-3A2CCE0D3837}" dt="2019-06-03T14:09:13.543" v="186"/>
-          <ac:cxnSpMkLst>
-            <pc:docMk/>
-            <pc:sldMk cId="3209328664" sldId="258"/>
-            <ac:cxnSpMk id="39" creationId="{4F86135E-DD9A-458A-B535-B9C78492C399}"/>
-          </ac:cxnSpMkLst>
-        </pc:cxnChg>
-        <pc:cxnChg chg="add">
-          <ac:chgData name="Freek Driesenaar" userId="S::freek.driesenaar@qiy.eu::8a610ddd-2d43-48fb-8de7-c62ed8386364" providerId="AD" clId="Web-{3B63374C-0901-8781-4790-3A2CCE0D3837}" dt="2019-06-03T14:09:13.559" v="187"/>
-          <ac:cxnSpMkLst>
-            <pc:docMk/>
-            <pc:sldMk cId="3209328664" sldId="258"/>
-            <ac:cxnSpMk id="41" creationId="{29FAA799-0780-4078-AA3F-3A4CA00339D2}"/>
-          </ac:cxnSpMkLst>
-        </pc:cxnChg>
-      </pc:sldChg>
-      <pc:sldChg chg="addSp delSp modSp new">
-        <pc:chgData name="Freek Driesenaar" userId="S::freek.driesenaar@qiy.eu::8a610ddd-2d43-48fb-8de7-c62ed8386364" providerId="AD" clId="Web-{3B63374C-0901-8781-4790-3A2CCE0D3837}" dt="2019-06-03T14:08:07.543" v="168" actId="14100"/>
-        <pc:sldMkLst>
-          <pc:docMk/>
-          <pc:sldMk cId="1255680768" sldId="264"/>
-        </pc:sldMkLst>
-        <pc:spChg chg="mod">
-          <ac:chgData name="Freek Driesenaar" userId="S::freek.driesenaar@qiy.eu::8a610ddd-2d43-48fb-8de7-c62ed8386364" providerId="AD" clId="Web-{3B63374C-0901-8781-4790-3A2CCE0D3837}" dt="2019-06-03T13:56:45.977" v="21" actId="20577"/>
-          <ac:spMkLst>
-            <pc:docMk/>
-            <pc:sldMk cId="1255680768" sldId="264"/>
-            <ac:spMk id="2" creationId="{B44E0FA2-B32C-4211-8EC2-689C434CA4EB}"/>
-          </ac:spMkLst>
-        </pc:spChg>
-        <pc:spChg chg="del mod">
-          <ac:chgData name="Freek Driesenaar" userId="S::freek.driesenaar@qiy.eu::8a610ddd-2d43-48fb-8de7-c62ed8386364" providerId="AD" clId="Web-{3B63374C-0901-8781-4790-3A2CCE0D3837}" dt="2019-06-03T14:00:31.713" v="65"/>
-          <ac:spMkLst>
-            <pc:docMk/>
-            <pc:sldMk cId="1255680768" sldId="264"/>
-            <ac:spMk id="3" creationId="{FCFF4079-527A-4B69-9404-E2E959EA6991}"/>
-          </ac:spMkLst>
-        </pc:spChg>
-        <pc:spChg chg="add mod">
-          <ac:chgData name="Freek Driesenaar" userId="S::freek.driesenaar@qiy.eu::8a610ddd-2d43-48fb-8de7-c62ed8386364" providerId="AD" clId="Web-{3B63374C-0901-8781-4790-3A2CCE0D3837}" dt="2019-06-03T14:00:18.478" v="63" actId="14100"/>
-          <ac:spMkLst>
-            <pc:docMk/>
-            <pc:sldMk cId="1255680768" sldId="264"/>
-            <ac:spMk id="4" creationId="{46FC7650-6DA6-4932-99D5-6A87A860152A}"/>
-          </ac:spMkLst>
-        </pc:spChg>
-        <pc:spChg chg="add del mod">
-          <ac:chgData name="Freek Driesenaar" userId="S::freek.driesenaar@qiy.eu::8a610ddd-2d43-48fb-8de7-c62ed8386364" providerId="AD" clId="Web-{3B63374C-0901-8781-4790-3A2CCE0D3837}" dt="2019-06-03T13:59:21.275" v="53"/>
-          <ac:spMkLst>
-            <pc:docMk/>
-            <pc:sldMk cId="1255680768" sldId="264"/>
-            <ac:spMk id="5" creationId="{CD7E4476-3F1D-4A00-9FD3-37E41DD0B35E}"/>
-          </ac:spMkLst>
-        </pc:spChg>
-        <pc:spChg chg="add del mod">
-          <ac:chgData name="Freek Driesenaar" userId="S::freek.driesenaar@qiy.eu::8a610ddd-2d43-48fb-8de7-c62ed8386364" providerId="AD" clId="Web-{3B63374C-0901-8781-4790-3A2CCE0D3837}" dt="2019-06-03T13:59:19.337" v="52"/>
-          <ac:spMkLst>
-            <pc:docMk/>
-            <pc:sldMk cId="1255680768" sldId="264"/>
-            <ac:spMk id="6" creationId="{FD92190C-1777-448F-BC4A-8B4012FAC47A}"/>
-          </ac:spMkLst>
-        </pc:spChg>
-        <pc:spChg chg="add del mod">
-          <ac:chgData name="Freek Driesenaar" userId="S::freek.driesenaar@qiy.eu::8a610ddd-2d43-48fb-8de7-c62ed8386364" providerId="AD" clId="Web-{3B63374C-0901-8781-4790-3A2CCE0D3837}" dt="2019-06-03T14:00:08.416" v="61"/>
-          <ac:spMkLst>
-            <pc:docMk/>
-            <pc:sldMk cId="1255680768" sldId="264"/>
-            <ac:spMk id="7" creationId="{17BA7266-49CE-488B-AE5D-DE76FD535866}"/>
-          </ac:spMkLst>
-        </pc:spChg>
-        <pc:spChg chg="add">
-          <ac:chgData name="Freek Driesenaar" userId="S::freek.driesenaar@qiy.eu::8a610ddd-2d43-48fb-8de7-c62ed8386364" providerId="AD" clId="Web-{3B63374C-0901-8781-4790-3A2CCE0D3837}" dt="2019-06-03T13:59:24.103" v="54"/>
-          <ac:spMkLst>
-            <pc:docMk/>
-            <pc:sldMk cId="1255680768" sldId="264"/>
-            <ac:spMk id="8" creationId="{B592F9DF-F709-4804-8CE2-FC677C543D96}"/>
-          </ac:spMkLst>
-        </pc:spChg>
-        <pc:spChg chg="add mod">
-          <ac:chgData name="Freek Driesenaar" userId="S::freek.driesenaar@qiy.eu::8a610ddd-2d43-48fb-8de7-c62ed8386364" providerId="AD" clId="Web-{3B63374C-0901-8781-4790-3A2CCE0D3837}" dt="2019-06-03T14:05:37.355" v="125" actId="1076"/>
-          <ac:spMkLst>
-            <pc:docMk/>
-            <pc:sldMk cId="1255680768" sldId="264"/>
-            <ac:spMk id="9" creationId="{6762E355-7866-4BF3-A35B-D7A0AF79A82F}"/>
-          </ac:spMkLst>
-        </pc:spChg>
-        <pc:spChg chg="add mod">
-          <ac:chgData name="Freek Driesenaar" userId="S::freek.driesenaar@qiy.eu::8a610ddd-2d43-48fb-8de7-c62ed8386364" providerId="AD" clId="Web-{3B63374C-0901-8781-4790-3A2CCE0D3837}" dt="2019-06-03T14:07:28.308" v="161" actId="1076"/>
-          <ac:spMkLst>
-            <pc:docMk/>
-            <pc:sldMk cId="1255680768" sldId="264"/>
-            <ac:spMk id="10" creationId="{276AAE1C-2670-4738-8CA6-7643AB482CC5}"/>
-          </ac:spMkLst>
-        </pc:spChg>
-        <pc:spChg chg="add mod">
-          <ac:chgData name="Freek Driesenaar" userId="S::freek.driesenaar@qiy.eu::8a610ddd-2d43-48fb-8de7-c62ed8386364" providerId="AD" clId="Web-{3B63374C-0901-8781-4790-3A2CCE0D3837}" dt="2019-06-03T14:05:47.792" v="129" actId="1076"/>
-          <ac:spMkLst>
-            <pc:docMk/>
-            <pc:sldMk cId="1255680768" sldId="264"/>
-            <ac:spMk id="11" creationId="{A34DA225-7F53-4C9D-AF3D-0A0936F4D819}"/>
-          </ac:spMkLst>
-        </pc:spChg>
-        <pc:spChg chg="add mod">
-          <ac:chgData name="Freek Driesenaar" userId="S::freek.driesenaar@qiy.eu::8a610ddd-2d43-48fb-8de7-c62ed8386364" providerId="AD" clId="Web-{3B63374C-0901-8781-4790-3A2CCE0D3837}" dt="2019-06-03T14:05:47.792" v="130" actId="1076"/>
-          <ac:spMkLst>
-            <pc:docMk/>
-            <pc:sldMk cId="1255680768" sldId="264"/>
-            <ac:spMk id="12" creationId="{310FBF8D-3DBC-4C8A-8F94-504A6B3CA609}"/>
-          </ac:spMkLst>
-        </pc:spChg>
-        <pc:spChg chg="add del">
-          <ac:chgData name="Freek Driesenaar" userId="S::freek.driesenaar@qiy.eu::8a610ddd-2d43-48fb-8de7-c62ed8386364" providerId="AD" clId="Web-{3B63374C-0901-8781-4790-3A2CCE0D3837}" dt="2019-06-03T14:03:31.901" v="94"/>
-          <ac:spMkLst>
-            <pc:docMk/>
-            <pc:sldMk cId="1255680768" sldId="264"/>
-            <ac:spMk id="13" creationId="{530591B0-14D7-4CB5-83D1-96BEF5C4DC78}"/>
-          </ac:spMkLst>
-        </pc:spChg>
-        <pc:spChg chg="add del">
-          <ac:chgData name="Freek Driesenaar" userId="S::freek.driesenaar@qiy.eu::8a610ddd-2d43-48fb-8de7-c62ed8386364" providerId="AD" clId="Web-{3B63374C-0901-8781-4790-3A2CCE0D3837}" dt="2019-06-03T14:03:28.776" v="93"/>
-          <ac:spMkLst>
-            <pc:docMk/>
-            <pc:sldMk cId="1255680768" sldId="264"/>
-            <ac:spMk id="14" creationId="{530591B0-14D7-4CB5-83D1-96BEF5C4DC78}"/>
-          </ac:spMkLst>
-        </pc:spChg>
-        <pc:spChg chg="add mod">
-          <ac:chgData name="Freek Driesenaar" userId="S::freek.driesenaar@qiy.eu::8a610ddd-2d43-48fb-8de7-c62ed8386364" providerId="AD" clId="Web-{3B63374C-0901-8781-4790-3A2CCE0D3837}" dt="2019-06-03T14:05:37.370" v="126" actId="1076"/>
-          <ac:spMkLst>
-            <pc:docMk/>
-            <pc:sldMk cId="1255680768" sldId="264"/>
-            <ac:spMk id="15" creationId="{D8B6A9C5-A0BE-4B47-91C9-A1E457DA9A64}"/>
-          </ac:spMkLst>
-        </pc:spChg>
-        <pc:spChg chg="add mod">
-          <ac:chgData name="Freek Driesenaar" userId="S::freek.driesenaar@qiy.eu::8a610ddd-2d43-48fb-8de7-c62ed8386364" providerId="AD" clId="Web-{3B63374C-0901-8781-4790-3A2CCE0D3837}" dt="2019-06-03T14:04:50.979" v="116" actId="1076"/>
-          <ac:spMkLst>
-            <pc:docMk/>
-            <pc:sldMk cId="1255680768" sldId="264"/>
-            <ac:spMk id="16" creationId="{C05DA5D3-8638-42A3-9DCA-1782B3793FAE}"/>
-          </ac:spMkLst>
-        </pc:spChg>
-        <pc:spChg chg="add mod">
-          <ac:chgData name="Freek Driesenaar" userId="S::freek.driesenaar@qiy.eu::8a610ddd-2d43-48fb-8de7-c62ed8386364" providerId="AD" clId="Web-{3B63374C-0901-8781-4790-3A2CCE0D3837}" dt="2019-06-03T14:05:37.401" v="127" actId="1076"/>
-          <ac:spMkLst>
-            <pc:docMk/>
-            <pc:sldMk cId="1255680768" sldId="264"/>
-            <ac:spMk id="17" creationId="{9771A032-1BD3-4CE0-AB29-C01359A57D51}"/>
-          </ac:spMkLst>
-        </pc:spChg>
-        <pc:spChg chg="add mod">
-          <ac:chgData name="Freek Driesenaar" userId="S::freek.driesenaar@qiy.eu::8a610ddd-2d43-48fb-8de7-c62ed8386364" providerId="AD" clId="Web-{3B63374C-0901-8781-4790-3A2CCE0D3837}" dt="2019-06-03T14:04:54.496" v="118" actId="20577"/>
-          <ac:spMkLst>
-            <pc:docMk/>
-            <pc:sldMk cId="1255680768" sldId="264"/>
-            <ac:spMk id="18" creationId="{B94D1B04-DD32-4EBE-8606-65F49CE41528}"/>
-          </ac:spMkLst>
-        </pc:spChg>
-        <pc:cxnChg chg="add mod">
-          <ac:chgData name="Freek Driesenaar" userId="S::freek.driesenaar@qiy.eu::8a610ddd-2d43-48fb-8de7-c62ed8386364" providerId="AD" clId="Web-{3B63374C-0901-8781-4790-3A2CCE0D3837}" dt="2019-06-03T14:06:15.058" v="136" actId="14100"/>
-          <ac:cxnSpMkLst>
-            <pc:docMk/>
-            <pc:sldMk cId="1255680768" sldId="264"/>
-            <ac:cxnSpMk id="19" creationId="{DCF87217-B139-4083-871C-C105837C9E6D}"/>
-          </ac:cxnSpMkLst>
-        </pc:cxnChg>
-        <pc:cxnChg chg="add mod">
-          <ac:chgData name="Freek Driesenaar" userId="S::freek.driesenaar@qiy.eu::8a610ddd-2d43-48fb-8de7-c62ed8386364" providerId="AD" clId="Web-{3B63374C-0901-8781-4790-3A2CCE0D3837}" dt="2019-06-03T14:06:32.027" v="141" actId="14100"/>
-          <ac:cxnSpMkLst>
-            <pc:docMk/>
-            <pc:sldMk cId="1255680768" sldId="264"/>
-            <ac:cxnSpMk id="20" creationId="{DDFD0552-C8B2-4381-B57C-BD773E0EEA06}"/>
-          </ac:cxnSpMkLst>
-        </pc:cxnChg>
-        <pc:cxnChg chg="add mod">
-          <ac:chgData name="Freek Driesenaar" userId="S::freek.driesenaar@qiy.eu::8a610ddd-2d43-48fb-8de7-c62ed8386364" providerId="AD" clId="Web-{3B63374C-0901-8781-4790-3A2CCE0D3837}" dt="2019-06-03T14:06:58.403" v="148" actId="14100"/>
-          <ac:cxnSpMkLst>
-            <pc:docMk/>
-            <pc:sldMk cId="1255680768" sldId="264"/>
-            <ac:cxnSpMk id="21" creationId="{D45D98B7-DFD2-4293-891A-4F8FBAA6D65D}"/>
-          </ac:cxnSpMkLst>
-        </pc:cxnChg>
-        <pc:cxnChg chg="add mod">
-          <ac:chgData name="Freek Driesenaar" userId="S::freek.driesenaar@qiy.eu::8a610ddd-2d43-48fb-8de7-c62ed8386364" providerId="AD" clId="Web-{3B63374C-0901-8781-4790-3A2CCE0D3837}" dt="2019-06-03T14:08:07.543" v="168" actId="14100"/>
-          <ac:cxnSpMkLst>
-            <pc:docMk/>
-            <pc:sldMk cId="1255680768" sldId="264"/>
-            <ac:cxnSpMk id="22" creationId="{E3C853E9-DEC8-45E4-98C0-BD474A0DF7D2}"/>
-          </ac:cxnSpMkLst>
-        </pc:cxnChg>
-        <pc:cxnChg chg="add mod">
-          <ac:chgData name="Freek Driesenaar" userId="S::freek.driesenaar@qiy.eu::8a610ddd-2d43-48fb-8de7-c62ed8386364" providerId="AD" clId="Web-{3B63374C-0901-8781-4790-3A2CCE0D3837}" dt="2019-06-03T14:07:44.355" v="165" actId="14100"/>
-          <ac:cxnSpMkLst>
-            <pc:docMk/>
-            <pc:sldMk cId="1255680768" sldId="264"/>
-            <ac:cxnSpMk id="23" creationId="{0A879B24-31BB-4F43-9B9F-39378027A234}"/>
-          </ac:cxnSpMkLst>
-        </pc:cxnChg>
-        <pc:cxnChg chg="add mod">
-          <ac:chgData name="Freek Driesenaar" userId="S::freek.driesenaar@qiy.eu::8a610ddd-2d43-48fb-8de7-c62ed8386364" providerId="AD" clId="Web-{3B63374C-0901-8781-4790-3A2CCE0D3837}" dt="2019-06-03T14:07:37.762" v="164" actId="1076"/>
-          <ac:cxnSpMkLst>
-            <pc:docMk/>
-            <pc:sldMk cId="1255680768" sldId="264"/>
-            <ac:cxnSpMk id="24" creationId="{5B987EEF-FEA4-4C90-8FE7-116C9A3711F3}"/>
-          </ac:cxnSpMkLst>
-        </pc:cxnChg>
-        <pc:cxnChg chg="add mod">
-          <ac:chgData name="Freek Driesenaar" userId="S::freek.driesenaar@qiy.eu::8a610ddd-2d43-48fb-8de7-c62ed8386364" providerId="AD" clId="Web-{3B63374C-0901-8781-4790-3A2CCE0D3837}" dt="2019-06-03T14:07:22.636" v="158" actId="1076"/>
-          <ac:cxnSpMkLst>
-            <pc:docMk/>
-            <pc:sldMk cId="1255680768" sldId="264"/>
-            <ac:cxnSpMk id="25" creationId="{1E7CED55-42E1-49F9-A31C-EEF13A933C7C}"/>
-          </ac:cxnSpMkLst>
-        </pc:cxnChg>
-        <pc:cxnChg chg="add mod">
-          <ac:chgData name="Freek Driesenaar" userId="S::freek.driesenaar@qiy.eu::8a610ddd-2d43-48fb-8de7-c62ed8386364" providerId="AD" clId="Web-{3B63374C-0901-8781-4790-3A2CCE0D3837}" dt="2019-06-03T14:07:22.636" v="159" actId="1076"/>
-          <ac:cxnSpMkLst>
-            <pc:docMk/>
-            <pc:sldMk cId="1255680768" sldId="264"/>
-            <ac:cxnSpMk id="26" creationId="{3275DAE9-78E6-40D3-89E1-B7AD5448C398}"/>
-          </ac:cxnSpMkLst>
-        </pc:cxnChg>
-        <pc:cxnChg chg="add mod">
-          <ac:chgData name="Freek Driesenaar" userId="S::freek.driesenaar@qiy.eu::8a610ddd-2d43-48fb-8de7-c62ed8386364" providerId="AD" clId="Web-{3B63374C-0901-8781-4790-3A2CCE0D3837}" dt="2019-06-03T14:07:56.652" v="166" actId="14100"/>
-          <ac:cxnSpMkLst>
-            <pc:docMk/>
-            <pc:sldMk cId="1255680768" sldId="264"/>
-            <ac:cxnSpMk id="27" creationId="{0344BFD9-011A-4F24-96F2-771141F95BB8}"/>
-          </ac:cxnSpMkLst>
-        </pc:cxnChg>
-      </pc:sldChg>
-      <pc:sldChg chg="add del replId">
-        <pc:chgData name="Freek Driesenaar" userId="S::freek.driesenaar@qiy.eu::8a610ddd-2d43-48fb-8de7-c62ed8386364" providerId="AD" clId="Web-{3B63374C-0901-8781-4790-3A2CCE0D3837}" dt="2019-06-03T14:02:57.542" v="87"/>
-        <pc:sldMkLst>
-          <pc:docMk/>
-          <pc:sldMk cId="1771326830" sldId="265"/>
-        </pc:sldMkLst>
-      </pc:sldChg>
-    </pc:docChg>
-  </pc:docChgLst>
-  <pc:docChgLst>
-    <pc:chgData name="Friso Vrolijken" userId="S::fvrolijken@qiy.nl::eccebddf-6cfa-436c-911d-56cd8533f010" providerId="AD" clId="Web-{788EFEF4-B8A5-345C-286E-0A34FF405E82}"/>
-    <pc:docChg chg="modSld">
-      <pc:chgData name="Friso Vrolijken" userId="S::fvrolijken@qiy.nl::eccebddf-6cfa-436c-911d-56cd8533f010" providerId="AD" clId="Web-{788EFEF4-B8A5-345C-286E-0A34FF405E82}" dt="2019-06-04T06:47:03.023" v="41" actId="20577"/>
-      <pc:docMkLst>
-        <pc:docMk/>
-      </pc:docMkLst>
-      <pc:sldChg chg="modSp">
-        <pc:chgData name="Friso Vrolijken" userId="S::fvrolijken@qiy.nl::eccebddf-6cfa-436c-911d-56cd8533f010" providerId="AD" clId="Web-{788EFEF4-B8A5-345C-286E-0A34FF405E82}" dt="2019-06-04T06:47:03.008" v="40" actId="20577"/>
-        <pc:sldMkLst>
-          <pc:docMk/>
-          <pc:sldMk cId="1474770734" sldId="261"/>
-        </pc:sldMkLst>
-        <pc:spChg chg="mod">
-          <ac:chgData name="Friso Vrolijken" userId="S::fvrolijken@qiy.nl::eccebddf-6cfa-436c-911d-56cd8533f010" providerId="AD" clId="Web-{788EFEF4-B8A5-345C-286E-0A34FF405E82}" dt="2019-06-04T06:47:03.008" v="40" actId="20577"/>
-          <ac:spMkLst>
-            <pc:docMk/>
-            <pc:sldMk cId="1474770734" sldId="261"/>
-            <ac:spMk id="3" creationId="{B8DF9218-F807-43B7-90FD-C49D365C3EBC}"/>
-          </ac:spMkLst>
-        </pc:spChg>
-      </pc:sldChg>
-    </pc:docChg>
-  </pc:docChgLst>
-  <pc:docChgLst>
-    <pc:chgData name="Freek Driesenaar" userId="S::freek.driesenaar@qiy.eu::8a610ddd-2d43-48fb-8de7-c62ed8386364" providerId="AD" clId="Web-{098C72FC-AE60-E4CD-85A6-D8811150A563}"/>
-    <pc:docChg chg="addSld delSld modSld sldOrd">
-      <pc:chgData name="Freek Driesenaar" userId="S::freek.driesenaar@qiy.eu::8a610ddd-2d43-48fb-8de7-c62ed8386364" providerId="AD" clId="Web-{098C72FC-AE60-E4CD-85A6-D8811150A563}" dt="2019-06-04T08:16:17.276" v="1072" actId="1076"/>
-      <pc:docMkLst>
-        <pc:docMk/>
-      </pc:docMkLst>
-      <pc:sldChg chg="modSp">
-        <pc:chgData name="Freek Driesenaar" userId="S::freek.driesenaar@qiy.eu::8a610ddd-2d43-48fb-8de7-c62ed8386364" providerId="AD" clId="Web-{098C72FC-AE60-E4CD-85A6-D8811150A563}" dt="2019-06-04T05:38:11.233" v="543" actId="20577"/>
-        <pc:sldMkLst>
-          <pc:docMk/>
-          <pc:sldMk cId="2542678002" sldId="257"/>
-        </pc:sldMkLst>
-        <pc:spChg chg="mod">
-          <ac:chgData name="Freek Driesenaar" userId="S::freek.driesenaar@qiy.eu::8a610ddd-2d43-48fb-8de7-c62ed8386364" providerId="AD" clId="Web-{098C72FC-AE60-E4CD-85A6-D8811150A563}" dt="2019-06-04T05:38:11.233" v="543" actId="20577"/>
-          <ac:spMkLst>
-            <pc:docMk/>
-            <pc:sldMk cId="2542678002" sldId="257"/>
-            <ac:spMk id="3" creationId="{83429C38-9E77-4110-B383-A434A08FF96E}"/>
-          </ac:spMkLst>
-        </pc:spChg>
-      </pc:sldChg>
-      <pc:sldChg chg="addSp delSp modSp">
-        <pc:chgData name="Freek Driesenaar" userId="S::freek.driesenaar@qiy.eu::8a610ddd-2d43-48fb-8de7-c62ed8386364" providerId="AD" clId="Web-{098C72FC-AE60-E4CD-85A6-D8811150A563}" dt="2019-06-04T04:41:45.130" v="99" actId="14100"/>
-        <pc:sldMkLst>
-          <pc:docMk/>
-          <pc:sldMk cId="3209328664" sldId="258"/>
-        </pc:sldMkLst>
-        <pc:spChg chg="mod">
-          <ac:chgData name="Freek Driesenaar" userId="S::freek.driesenaar@qiy.eu::8a610ddd-2d43-48fb-8de7-c62ed8386364" providerId="AD" clId="Web-{098C72FC-AE60-E4CD-85A6-D8811150A563}" dt="2019-06-04T04:41:45.130" v="99" actId="14100"/>
-          <ac:spMkLst>
-            <pc:docMk/>
-            <pc:sldMk cId="3209328664" sldId="258"/>
-            <ac:spMk id="3" creationId="{E455350F-95B1-450D-B938-F3F0882FBDB1}"/>
-          </ac:spMkLst>
-        </pc:spChg>
-        <pc:spChg chg="add">
-          <ac:chgData name="Freek Driesenaar" userId="S::freek.driesenaar@qiy.eu::8a610ddd-2d43-48fb-8de7-c62ed8386364" providerId="AD" clId="Web-{098C72FC-AE60-E4CD-85A6-D8811150A563}" dt="2019-06-04T04:37:24.817" v="30"/>
-          <ac:spMkLst>
-            <pc:docMk/>
-            <pc:sldMk cId="3209328664" sldId="258"/>
-            <ac:spMk id="4" creationId="{6F7B979C-F36E-4633-9FA4-963174B1BED6}"/>
-          </ac:spMkLst>
-        </pc:spChg>
-        <pc:spChg chg="del">
-          <ac:chgData name="Freek Driesenaar" userId="S::freek.driesenaar@qiy.eu::8a610ddd-2d43-48fb-8de7-c62ed8386364" providerId="AD" clId="Web-{098C72FC-AE60-E4CD-85A6-D8811150A563}" dt="2019-06-04T04:37:22.786" v="29"/>
-          <ac:spMkLst>
-            <pc:docMk/>
-            <pc:sldMk cId="3209328664" sldId="258"/>
-            <ac:spMk id="5" creationId="{8505B497-BA31-438B-BC7E-04811412A13C}"/>
-          </ac:spMkLst>
-        </pc:spChg>
-        <pc:spChg chg="add">
-          <ac:chgData name="Freek Driesenaar" userId="S::freek.driesenaar@qiy.eu::8a610ddd-2d43-48fb-8de7-c62ed8386364" providerId="AD" clId="Web-{098C72FC-AE60-E4CD-85A6-D8811150A563}" dt="2019-06-04T04:37:24.833" v="31"/>
-          <ac:spMkLst>
-            <pc:docMk/>
-            <pc:sldMk cId="3209328664" sldId="258"/>
-            <ac:spMk id="6" creationId="{E719695D-18F1-427E-92B2-DEDE85954C38}"/>
-          </ac:spMkLst>
-        </pc:spChg>
-        <pc:spChg chg="del">
-          <ac:chgData name="Freek Driesenaar" userId="S::freek.driesenaar@qiy.eu::8a610ddd-2d43-48fb-8de7-c62ed8386364" providerId="AD" clId="Web-{098C72FC-AE60-E4CD-85A6-D8811150A563}" dt="2019-06-04T04:37:22.786" v="28"/>
-          <ac:spMkLst>
-            <pc:docMk/>
-            <pc:sldMk cId="3209328664" sldId="258"/>
-            <ac:spMk id="7" creationId="{D5D7B2E9-9AEB-4962-B3D4-F6DD1FF333EF}"/>
-          </ac:spMkLst>
-        </pc:spChg>
-        <pc:spChg chg="add">
-          <ac:chgData name="Freek Driesenaar" userId="S::freek.driesenaar@qiy.eu::8a610ddd-2d43-48fb-8de7-c62ed8386364" providerId="AD" clId="Web-{098C72FC-AE60-E4CD-85A6-D8811150A563}" dt="2019-06-04T04:37:24.848" v="32"/>
-          <ac:spMkLst>
-            <pc:docMk/>
-            <pc:sldMk cId="3209328664" sldId="258"/>
-            <ac:spMk id="8" creationId="{916878B0-9878-42A7-8DE9-4C148EA33003}"/>
-          </ac:spMkLst>
-        </pc:spChg>
-        <pc:spChg chg="del">
-          <ac:chgData name="Freek Driesenaar" userId="S::freek.driesenaar@qiy.eu::8a610ddd-2d43-48fb-8de7-c62ed8386364" providerId="AD" clId="Web-{098C72FC-AE60-E4CD-85A6-D8811150A563}" dt="2019-06-04T04:37:22.786" v="27"/>
-          <ac:spMkLst>
-            <pc:docMk/>
-            <pc:sldMk cId="3209328664" sldId="258"/>
-            <ac:spMk id="9" creationId="{69DD1E17-FFD2-4C37-A7AE-544FCCEE6FBA}"/>
-          </ac:spMkLst>
-        </pc:spChg>
-        <pc:spChg chg="add">
-          <ac:chgData name="Freek Driesenaar" userId="S::freek.driesenaar@qiy.eu::8a610ddd-2d43-48fb-8de7-c62ed8386364" providerId="AD" clId="Web-{098C72FC-AE60-E4CD-85A6-D8811150A563}" dt="2019-06-04T04:37:24.864" v="33"/>
-          <ac:spMkLst>
-            <pc:docMk/>
-            <pc:sldMk cId="3209328664" sldId="258"/>
-            <ac:spMk id="10" creationId="{F5A10C9E-0BB7-45B6-B065-846479345FAE}"/>
-          </ac:spMkLst>
-        </pc:spChg>
-        <pc:spChg chg="del">
-          <ac:chgData name="Freek Driesenaar" userId="S::freek.driesenaar@qiy.eu::8a610ddd-2d43-48fb-8de7-c62ed8386364" providerId="AD" clId="Web-{098C72FC-AE60-E4CD-85A6-D8811150A563}" dt="2019-06-04T04:37:22.786" v="26"/>
-          <ac:spMkLst>
-            <pc:docMk/>
-            <pc:sldMk cId="3209328664" sldId="258"/>
-            <ac:spMk id="11" creationId="{E49E3AF7-2A33-4166-BF9B-7E83095054A2}"/>
-          </ac:spMkLst>
-        </pc:spChg>
-        <pc:spChg chg="add">
-          <ac:chgData name="Freek Driesenaar" userId="S::freek.driesenaar@qiy.eu::8a610ddd-2d43-48fb-8de7-c62ed8386364" providerId="AD" clId="Web-{098C72FC-AE60-E4CD-85A6-D8811150A563}" dt="2019-06-04T04:37:24.879" v="34"/>
-          <ac:spMkLst>
-            <pc:docMk/>
-            <pc:sldMk cId="3209328664" sldId="258"/>
-            <ac:spMk id="12" creationId="{B205402D-7857-4378-B96C-83C546FD48C3}"/>
-          </ac:spMkLst>
-        </pc:spChg>
-        <pc:spChg chg="del">
-          <ac:chgData name="Freek Driesenaar" userId="S::freek.driesenaar@qiy.eu::8a610ddd-2d43-48fb-8de7-c62ed8386364" providerId="AD" clId="Web-{098C72FC-AE60-E4CD-85A6-D8811150A563}" dt="2019-06-04T04:37:22.786" v="25"/>
-          <ac:spMkLst>
-            <pc:docMk/>
-            <pc:sldMk cId="3209328664" sldId="258"/>
-            <ac:spMk id="13" creationId="{C3C2CCCE-5FE6-45DD-9905-22A1CB2327AB}"/>
-          </ac:spMkLst>
-        </pc:spChg>
-        <pc:spChg chg="add">
-          <ac:chgData name="Freek Driesenaar" userId="S::freek.driesenaar@qiy.eu::8a610ddd-2d43-48fb-8de7-c62ed8386364" providerId="AD" clId="Web-{098C72FC-AE60-E4CD-85A6-D8811150A563}" dt="2019-06-04T04:37:24.895" v="35"/>
-          <ac:spMkLst>
-            <pc:docMk/>
-            <pc:sldMk cId="3209328664" sldId="258"/>
-            <ac:spMk id="14" creationId="{532BBED1-49EB-4239-B777-099C006FCEA4}"/>
-          </ac:spMkLst>
-        </pc:spChg>
-        <pc:spChg chg="del">
-          <ac:chgData name="Freek Driesenaar" userId="S::freek.driesenaar@qiy.eu::8a610ddd-2d43-48fb-8de7-c62ed8386364" providerId="AD" clId="Web-{098C72FC-AE60-E4CD-85A6-D8811150A563}" dt="2019-06-04T04:37:22.770" v="24"/>
-          <ac:spMkLst>
-            <pc:docMk/>
-            <pc:sldMk cId="3209328664" sldId="258"/>
-            <ac:spMk id="15" creationId="{C299C659-F774-42CD-82A8-B78DA3B8B196}"/>
-          </ac:spMkLst>
-        </pc:spChg>
-        <pc:spChg chg="del">
-          <ac:chgData name="Freek Driesenaar" userId="S::freek.driesenaar@qiy.eu::8a610ddd-2d43-48fb-8de7-c62ed8386364" providerId="AD" clId="Web-{098C72FC-AE60-E4CD-85A6-D8811150A563}" dt="2019-06-04T04:37:22.770" v="23"/>
-          <ac:spMkLst>
-            <pc:docMk/>
-            <pc:sldMk cId="3209328664" sldId="258"/>
-            <ac:spMk id="17" creationId="{9D5A5B66-6562-4569-B668-F3A8D65C1788}"/>
-          </ac:spMkLst>
-        </pc:spChg>
-        <pc:spChg chg="del">
-          <ac:chgData name="Freek Driesenaar" userId="S::freek.driesenaar@qiy.eu::8a610ddd-2d43-48fb-8de7-c62ed8386364" providerId="AD" clId="Web-{098C72FC-AE60-E4CD-85A6-D8811150A563}" dt="2019-06-04T04:37:22.770" v="22"/>
-          <ac:spMkLst>
-            <pc:docMk/>
-            <pc:sldMk cId="3209328664" sldId="258"/>
-            <ac:spMk id="19" creationId="{C85A266B-7EEC-4E66-BA26-4076C8DDFAA5}"/>
-          </ac:spMkLst>
-        </pc:spChg>
-        <pc:spChg chg="del">
-          <ac:chgData name="Freek Driesenaar" userId="S::freek.driesenaar@qiy.eu::8a610ddd-2d43-48fb-8de7-c62ed8386364" providerId="AD" clId="Web-{098C72FC-AE60-E4CD-85A6-D8811150A563}" dt="2019-06-04T04:37:22.770" v="21"/>
-          <ac:spMkLst>
-            <pc:docMk/>
-            <pc:sldMk cId="3209328664" sldId="258"/>
-            <ac:spMk id="21" creationId="{66F8A70F-D43B-4F7A-A03E-2EC6DEDA572B}"/>
-          </ac:spMkLst>
-        </pc:spChg>
-        <pc:spChg chg="del">
-          <ac:chgData name="Freek Driesenaar" userId="S::freek.driesenaar@qiy.eu::8a610ddd-2d43-48fb-8de7-c62ed8386364" providerId="AD" clId="Web-{098C72FC-AE60-E4CD-85A6-D8811150A563}" dt="2019-06-04T04:37:22.770" v="20"/>
-          <ac:spMkLst>
-            <pc:docMk/>
-            <pc:sldMk cId="3209328664" sldId="258"/>
-            <ac:spMk id="23" creationId="{FA537E0B-5860-4DF9-A1AA-1561544B0E9E}"/>
-          </ac:spMkLst>
-        </pc:spChg>
-        <pc:spChg chg="mod">
-          <ac:chgData name="Freek Driesenaar" userId="S::freek.driesenaar@qiy.eu::8a610ddd-2d43-48fb-8de7-c62ed8386364" providerId="AD" clId="Web-{098C72FC-AE60-E4CD-85A6-D8811150A563}" dt="2019-06-04T04:38:25.770" v="64" actId="20577"/>
-          <ac:spMkLst>
-            <pc:docMk/>
-            <pc:sldMk cId="3209328664" sldId="258"/>
-            <ac:spMk id="42" creationId="{F5FBEA59-614E-4A55-BD67-9983964766EE}"/>
-          </ac:spMkLst>
-        </pc:spChg>
-        <pc:spChg chg="add">
-          <ac:chgData name="Freek Driesenaar" userId="S::freek.driesenaar@qiy.eu::8a610ddd-2d43-48fb-8de7-c62ed8386364" providerId="AD" clId="Web-{098C72FC-AE60-E4CD-85A6-D8811150A563}" dt="2019-06-04T04:37:25.004" v="44"/>
-          <ac:spMkLst>
-            <pc:docMk/>
-            <pc:sldMk cId="3209328664" sldId="258"/>
-            <ac:spMk id="53" creationId="{E526CB37-93B5-4CF6-B19B-173EBC79929F}"/>
-          </ac:spMkLst>
-        </pc:spChg>
-        <pc:spChg chg="add">
-          <ac:chgData name="Freek Driesenaar" userId="S::freek.driesenaar@qiy.eu::8a610ddd-2d43-48fb-8de7-c62ed8386364" providerId="AD" clId="Web-{098C72FC-AE60-E4CD-85A6-D8811150A563}" dt="2019-06-04T04:37:25.020" v="45"/>
-          <ac:spMkLst>
-            <pc:docMk/>
-            <pc:sldMk cId="3209328664" sldId="258"/>
-            <ac:spMk id="55" creationId="{DE6C1831-2270-481A-85F5-498B13D4878F}"/>
-          </ac:spMkLst>
-        </pc:spChg>
-        <pc:spChg chg="add">
-          <ac:chgData name="Freek Driesenaar" userId="S::freek.driesenaar@qiy.eu::8a610ddd-2d43-48fb-8de7-c62ed8386364" providerId="AD" clId="Web-{098C72FC-AE60-E4CD-85A6-D8811150A563}" dt="2019-06-04T04:37:25.036" v="46"/>
-          <ac:spMkLst>
-            <pc:docMk/>
-            <pc:sldMk cId="3209328664" sldId="258"/>
-            <ac:spMk id="57" creationId="{3206A779-BC16-4D44-A103-CB1A75A33D64}"/>
-          </ac:spMkLst>
-        </pc:spChg>
-        <pc:spChg chg="add">
-          <ac:chgData name="Freek Driesenaar" userId="S::freek.driesenaar@qiy.eu::8a610ddd-2d43-48fb-8de7-c62ed8386364" providerId="AD" clId="Web-{098C72FC-AE60-E4CD-85A6-D8811150A563}" dt="2019-06-04T04:37:25.051" v="47"/>
-          <ac:spMkLst>
-            <pc:docMk/>
-            <pc:sldMk cId="3209328664" sldId="258"/>
-            <ac:spMk id="59" creationId="{6A9998FF-0946-4692-9981-D7A74F814AA2}"/>
-          </ac:spMkLst>
-        </pc:spChg>
-        <pc:spChg chg="add mod">
-          <ac:chgData name="Freek Driesenaar" userId="S::freek.driesenaar@qiy.eu::8a610ddd-2d43-48fb-8de7-c62ed8386364" providerId="AD" clId="Web-{098C72FC-AE60-E4CD-85A6-D8811150A563}" dt="2019-06-04T04:39:55.942" v="69" actId="1076"/>
-          <ac:spMkLst>
-            <pc:docMk/>
-            <pc:sldMk cId="3209328664" sldId="258"/>
-            <ac:spMk id="60" creationId="{96BAD980-D27A-4E7B-A018-FAF92CD72D00}"/>
-          </ac:spMkLst>
-        </pc:spChg>
-        <pc:spChg chg="add mod">
-          <ac:chgData name="Freek Driesenaar" userId="S::freek.driesenaar@qiy.eu::8a610ddd-2d43-48fb-8de7-c62ed8386364" providerId="AD" clId="Web-{098C72FC-AE60-E4CD-85A6-D8811150A563}" dt="2019-06-04T04:41:24.161" v="98" actId="1076"/>
-          <ac:spMkLst>
-            <pc:docMk/>
-            <pc:sldMk cId="3209328664" sldId="258"/>
-            <ac:spMk id="61" creationId="{7804F504-DF5E-4DF1-BB5B-528230C87E68}"/>
-          </ac:spMkLst>
-        </pc:spChg>
-        <pc:cxnChg chg="add">
-          <ac:chgData name="Freek Driesenaar" userId="S::freek.driesenaar@qiy.eu::8a610ddd-2d43-48fb-8de7-c62ed8386364" providerId="AD" clId="Web-{098C72FC-AE60-E4CD-85A6-D8811150A563}" dt="2019-06-04T04:37:24.895" v="36"/>
-          <ac:cxnSpMkLst>
-            <pc:docMk/>
-            <pc:sldMk cId="3209328664" sldId="258"/>
-            <ac:cxnSpMk id="16" creationId="{71BC3B90-D72E-489A-BE28-AAE5B457CC13}"/>
-          </ac:cxnSpMkLst>
-        </pc:cxnChg>
-        <pc:cxnChg chg="add">
-          <ac:chgData name="Freek Driesenaar" userId="S::freek.driesenaar@qiy.eu::8a610ddd-2d43-48fb-8de7-c62ed8386364" providerId="AD" clId="Web-{098C72FC-AE60-E4CD-85A6-D8811150A563}" dt="2019-06-04T04:37:24.911" v="37"/>
-          <ac:cxnSpMkLst>
-            <pc:docMk/>
-            <pc:sldMk cId="3209328664" sldId="258"/>
-            <ac:cxnSpMk id="18" creationId="{59A319DA-F22C-4ADC-A49F-57A70E97A79B}"/>
-          </ac:cxnSpMkLst>
-        </pc:cxnChg>
-        <pc:cxnChg chg="add">
-          <ac:chgData name="Freek Driesenaar" userId="S::freek.driesenaar@qiy.eu::8a610ddd-2d43-48fb-8de7-c62ed8386364" providerId="AD" clId="Web-{098C72FC-AE60-E4CD-85A6-D8811150A563}" dt="2019-06-04T04:37:24.926" v="38"/>
-          <ac:cxnSpMkLst>
-            <pc:docMk/>
-            <pc:sldMk cId="3209328664" sldId="258"/>
-            <ac:cxnSpMk id="20" creationId="{1BFE6B9D-970D-476F-B873-E74264572F72}"/>
-          </ac:cxnSpMkLst>
-        </pc:cxnChg>
-        <pc:cxnChg chg="add">
-          <ac:chgData name="Freek Driesenaar" userId="S::freek.driesenaar@qiy.eu::8a610ddd-2d43-48fb-8de7-c62ed8386364" providerId="AD" clId="Web-{098C72FC-AE60-E4CD-85A6-D8811150A563}" dt="2019-06-04T04:37:24.926" v="39"/>
-          <ac:cxnSpMkLst>
-            <pc:docMk/>
-            <pc:sldMk cId="3209328664" sldId="258"/>
-            <ac:cxnSpMk id="22" creationId="{D8F7CAAB-5794-4240-BC1C-D5C62081132A}"/>
-          </ac:cxnSpMkLst>
-        </pc:cxnChg>
-        <pc:cxnChg chg="del">
-          <ac:chgData name="Freek Driesenaar" userId="S::freek.driesenaar@qiy.eu::8a610ddd-2d43-48fb-8de7-c62ed8386364" providerId="AD" clId="Web-{098C72FC-AE60-E4CD-85A6-D8811150A563}" dt="2019-06-04T04:37:22.770" v="19"/>
-          <ac:cxnSpMkLst>
-            <pc:docMk/>
-            <pc:sldMk cId="3209328664" sldId="258"/>
-            <ac:cxnSpMk id="25" creationId="{A04A049F-1EBB-4335-B91A-F49E51980950}"/>
-          </ac:cxnSpMkLst>
-        </pc:cxnChg>
-        <pc:cxnChg chg="del">
-          <ac:chgData name="Freek Driesenaar" userId="S::freek.driesenaar@qiy.eu::8a610ddd-2d43-48fb-8de7-c62ed8386364" providerId="AD" clId="Web-{098C72FC-AE60-E4CD-85A6-D8811150A563}" dt="2019-06-04T04:37:22.770" v="18"/>
-          <ac:cxnSpMkLst>
-            <pc:docMk/>
-            <pc:sldMk cId="3209328664" sldId="258"/>
-            <ac:cxnSpMk id="27" creationId="{2E982B15-2B07-4DB9-BFF7-47F87B7A4381}"/>
-          </ac:cxnSpMkLst>
-        </pc:cxnChg>
-        <pc:cxnChg chg="del">
-          <ac:chgData name="Freek Driesenaar" userId="S::freek.driesenaar@qiy.eu::8a610ddd-2d43-48fb-8de7-c62ed8386364" providerId="AD" clId="Web-{098C72FC-AE60-E4CD-85A6-D8811150A563}" dt="2019-06-04T04:37:22.770" v="17"/>
-          <ac:cxnSpMkLst>
-            <pc:docMk/>
-            <pc:sldMk cId="3209328664" sldId="258"/>
-            <ac:cxnSpMk id="29" creationId="{63CA5F7F-055E-4D67-A041-70A1954825FF}"/>
-          </ac:cxnSpMkLst>
-        </pc:cxnChg>
-        <pc:cxnChg chg="del">
-          <ac:chgData name="Freek Driesenaar" userId="S::freek.driesenaar@qiy.eu::8a610ddd-2d43-48fb-8de7-c62ed8386364" providerId="AD" clId="Web-{098C72FC-AE60-E4CD-85A6-D8811150A563}" dt="2019-06-04T04:37:22.770" v="16"/>
-          <ac:cxnSpMkLst>
-            <pc:docMk/>
-            <pc:sldMk cId="3209328664" sldId="258"/>
-            <ac:cxnSpMk id="31" creationId="{E9F44252-CD55-43E5-ACAC-1EAF1D85FC06}"/>
-          </ac:cxnSpMkLst>
-        </pc:cxnChg>
-        <pc:cxnChg chg="del">
-          <ac:chgData name="Freek Driesenaar" userId="S::freek.driesenaar@qiy.eu::8a610ddd-2d43-48fb-8de7-c62ed8386364" providerId="AD" clId="Web-{098C72FC-AE60-E4CD-85A6-D8811150A563}" dt="2019-06-04T04:37:22.770" v="15"/>
-          <ac:cxnSpMkLst>
-            <pc:docMk/>
-            <pc:sldMk cId="3209328664" sldId="258"/>
-            <ac:cxnSpMk id="33" creationId="{13500F0C-7194-4B19-B7E5-F0AC8637B210}"/>
-          </ac:cxnSpMkLst>
-        </pc:cxnChg>
-        <pc:cxnChg chg="del">
-          <ac:chgData name="Freek Driesenaar" userId="S::freek.driesenaar@qiy.eu::8a610ddd-2d43-48fb-8de7-c62ed8386364" providerId="AD" clId="Web-{098C72FC-AE60-E4CD-85A6-D8811150A563}" dt="2019-06-04T04:37:22.770" v="14"/>
-          <ac:cxnSpMkLst>
-            <pc:docMk/>
-            <pc:sldMk cId="3209328664" sldId="258"/>
-            <ac:cxnSpMk id="35" creationId="{4A47DCCB-8A3A-4D7E-9925-0B5589A72B40}"/>
-          </ac:cxnSpMkLst>
-        </pc:cxnChg>
-        <pc:cxnChg chg="del">
-          <ac:chgData name="Freek Driesenaar" userId="S::freek.driesenaar@qiy.eu::8a610ddd-2d43-48fb-8de7-c62ed8386364" providerId="AD" clId="Web-{098C72FC-AE60-E4CD-85A6-D8811150A563}" dt="2019-06-04T04:37:22.770" v="13"/>
-          <ac:cxnSpMkLst>
-            <pc:docMk/>
-            <pc:sldMk cId="3209328664" sldId="258"/>
-            <ac:cxnSpMk id="37" creationId="{D86B4245-6723-4B52-9288-FEACC62D3891}"/>
-          </ac:cxnSpMkLst>
-        </pc:cxnChg>
-        <pc:cxnChg chg="del">
-          <ac:chgData name="Freek Driesenaar" userId="S::freek.driesenaar@qiy.eu::8a610ddd-2d43-48fb-8de7-c62ed8386364" providerId="AD" clId="Web-{098C72FC-AE60-E4CD-85A6-D8811150A563}" dt="2019-06-04T04:37:22.770" v="12"/>
-          <ac:cxnSpMkLst>
-            <pc:docMk/>
-            <pc:sldMk cId="3209328664" sldId="258"/>
-            <ac:cxnSpMk id="39" creationId="{4F86135E-DD9A-458A-B535-B9C78492C399}"/>
-          </ac:cxnSpMkLst>
-        </pc:cxnChg>
-        <pc:cxnChg chg="del">
-          <ac:chgData name="Freek Driesenaar" userId="S::freek.driesenaar@qiy.eu::8a610ddd-2d43-48fb-8de7-c62ed8386364" providerId="AD" clId="Web-{098C72FC-AE60-E4CD-85A6-D8811150A563}" dt="2019-06-04T04:37:22.770" v="11"/>
-          <ac:cxnSpMkLst>
-            <pc:docMk/>
-            <pc:sldMk cId="3209328664" sldId="258"/>
-            <ac:cxnSpMk id="41" creationId="{29FAA799-0780-4078-AA3F-3A4CA00339D2}"/>
-          </ac:cxnSpMkLst>
-        </pc:cxnChg>
-        <pc:cxnChg chg="add">
-          <ac:chgData name="Freek Driesenaar" userId="S::freek.driesenaar@qiy.eu::8a610ddd-2d43-48fb-8de7-c62ed8386364" providerId="AD" clId="Web-{098C72FC-AE60-E4CD-85A6-D8811150A563}" dt="2019-06-04T04:37:24.942" v="40"/>
-          <ac:cxnSpMkLst>
-            <pc:docMk/>
-            <pc:sldMk cId="3209328664" sldId="258"/>
-            <ac:cxnSpMk id="45" creationId="{D7DE1B2F-ED96-4E77-94FE-B0529582E102}"/>
-          </ac:cxnSpMkLst>
-        </pc:cxnChg>
-        <pc:cxnChg chg="add">
-          <ac:chgData name="Freek Driesenaar" userId="S::freek.driesenaar@qiy.eu::8a610ddd-2d43-48fb-8de7-c62ed8386364" providerId="AD" clId="Web-{098C72FC-AE60-E4CD-85A6-D8811150A563}" dt="2019-06-04T04:37:24.958" v="41"/>
-          <ac:cxnSpMkLst>
-            <pc:docMk/>
-            <pc:sldMk cId="3209328664" sldId="258"/>
-            <ac:cxnSpMk id="47" creationId="{87E9B162-62BE-4A04-B28F-45ACF8F589E6}"/>
-          </ac:cxnSpMkLst>
-        </pc:cxnChg>
-        <pc:cxnChg chg="add">
-          <ac:chgData name="Freek Driesenaar" userId="S::freek.driesenaar@qiy.eu::8a610ddd-2d43-48fb-8de7-c62ed8386364" providerId="AD" clId="Web-{098C72FC-AE60-E4CD-85A6-D8811150A563}" dt="2019-06-04T04:37:24.973" v="42"/>
-          <ac:cxnSpMkLst>
-            <pc:docMk/>
-            <pc:sldMk cId="3209328664" sldId="258"/>
-            <ac:cxnSpMk id="49" creationId="{5F5CA8FC-4FFA-40EB-9250-6C86945210A0}"/>
-          </ac:cxnSpMkLst>
-        </pc:cxnChg>
-        <pc:cxnChg chg="add">
-          <ac:chgData name="Freek Driesenaar" userId="S::freek.driesenaar@qiy.eu::8a610ddd-2d43-48fb-8de7-c62ed8386364" providerId="AD" clId="Web-{098C72FC-AE60-E4CD-85A6-D8811150A563}" dt="2019-06-04T04:37:24.989" v="43"/>
-          <ac:cxnSpMkLst>
-            <pc:docMk/>
-            <pc:sldMk cId="3209328664" sldId="258"/>
-            <ac:cxnSpMk id="51" creationId="{4B73A8C1-36CC-4F5B-A8F7-3F6B769A2220}"/>
-          </ac:cxnSpMkLst>
-        </pc:cxnChg>
-      </pc:sldChg>
-      <pc:sldChg chg="addSp delSp modSp">
-        <pc:chgData name="Freek Driesenaar" userId="S::freek.driesenaar@qiy.eu::8a610ddd-2d43-48fb-8de7-c62ed8386364" providerId="AD" clId="Web-{098C72FC-AE60-E4CD-85A6-D8811150A563}" dt="2019-06-04T04:49:54.772" v="251"/>
-        <pc:sldMkLst>
-          <pc:docMk/>
-          <pc:sldMk cId="370089361" sldId="259"/>
-        </pc:sldMkLst>
-        <pc:spChg chg="mod">
-          <ac:chgData name="Freek Driesenaar" userId="S::freek.driesenaar@qiy.eu::8a610ddd-2d43-48fb-8de7-c62ed8386364" providerId="AD" clId="Web-{098C72FC-AE60-E4CD-85A6-D8811150A563}" dt="2019-06-04T04:42:48.318" v="100" actId="14100"/>
-          <ac:spMkLst>
-            <pc:docMk/>
-            <pc:sldMk cId="370089361" sldId="259"/>
-            <ac:spMk id="3" creationId="{1254824B-0798-4731-8364-896AD6A47E0B}"/>
-          </ac:spMkLst>
-        </pc:spChg>
-        <pc:spChg chg="add">
-          <ac:chgData name="Freek Driesenaar" userId="S::freek.driesenaar@qiy.eu::8a610ddd-2d43-48fb-8de7-c62ed8386364" providerId="AD" clId="Web-{098C72FC-AE60-E4CD-85A6-D8811150A563}" dt="2019-06-04T04:41:02.239" v="74"/>
-          <ac:spMkLst>
-            <pc:docMk/>
-            <pc:sldMk cId="370089361" sldId="259"/>
-            <ac:spMk id="5" creationId="{12B18297-3378-4DB3-B9D1-669BD355F2C1}"/>
-          </ac:spMkLst>
-        </pc:spChg>
-        <pc:spChg chg="add">
-          <ac:chgData name="Freek Driesenaar" userId="S::freek.driesenaar@qiy.eu::8a610ddd-2d43-48fb-8de7-c62ed8386364" providerId="AD" clId="Web-{098C72FC-AE60-E4CD-85A6-D8811150A563}" dt="2019-06-04T04:41:02.255" v="75"/>
-          <ac:spMkLst>
-            <pc:docMk/>
-            <pc:sldMk cId="370089361" sldId="259"/>
-            <ac:spMk id="7" creationId="{A265ADF6-EB70-4FA0-97AA-FC46EA7580B0}"/>
-          </ac:spMkLst>
-        </pc:spChg>
-        <pc:spChg chg="add">
-          <ac:chgData name="Freek Driesenaar" userId="S::freek.driesenaar@qiy.eu::8a610ddd-2d43-48fb-8de7-c62ed8386364" providerId="AD" clId="Web-{098C72FC-AE60-E4CD-85A6-D8811150A563}" dt="2019-06-04T04:41:02.271" v="76"/>
-          <ac:spMkLst>
-            <pc:docMk/>
-            <pc:sldMk cId="370089361" sldId="259"/>
-            <ac:spMk id="9" creationId="{A62CF2C8-5BCB-4B16-9280-AD7AF3279620}"/>
-          </ac:spMkLst>
-        </pc:spChg>
-        <pc:spChg chg="add">
-          <ac:chgData name="Freek Driesenaar" userId="S::freek.driesenaar@qiy.eu::8a610ddd-2d43-48fb-8de7-c62ed8386364" providerId="AD" clId="Web-{098C72FC-AE60-E4CD-85A6-D8811150A563}" dt="2019-06-04T04:41:02.286" v="77"/>
-          <ac:spMkLst>
-            <pc:docMk/>
-            <pc:sldMk cId="370089361" sldId="259"/>
-            <ac:spMk id="11" creationId="{1A6DB321-4E46-40E4-9009-6CD3A3B713A0}"/>
-          </ac:spMkLst>
-        </pc:spChg>
-        <pc:spChg chg="add">
-          <ac:chgData name="Freek Driesenaar" userId="S::freek.driesenaar@qiy.eu::8a610ddd-2d43-48fb-8de7-c62ed8386364" providerId="AD" clId="Web-{098C72FC-AE60-E4CD-85A6-D8811150A563}" dt="2019-06-04T04:41:02.286" v="78"/>
-          <ac:spMkLst>
-            <pc:docMk/>
-            <pc:sldMk cId="370089361" sldId="259"/>
-            <ac:spMk id="13" creationId="{B16E5F16-7E1F-4DE2-9375-7AAEBC70D42B}"/>
-          </ac:spMkLst>
-        </pc:spChg>
-        <pc:spChg chg="add">
-          <ac:chgData name="Freek Driesenaar" userId="S::freek.driesenaar@qiy.eu::8a610ddd-2d43-48fb-8de7-c62ed8386364" providerId="AD" clId="Web-{098C72FC-AE60-E4CD-85A6-D8811150A563}" dt="2019-06-04T04:41:02.302" v="79"/>
-          <ac:spMkLst>
-            <pc:docMk/>
-            <pc:sldMk cId="370089361" sldId="259"/>
-            <ac:spMk id="15" creationId="{84CF2148-D1BF-48DB-B561-E9CF47E4CDD4}"/>
-          </ac:spMkLst>
-        </pc:spChg>
-        <pc:spChg chg="add">
-          <ac:chgData name="Freek Driesenaar" userId="S::freek.driesenaar@qiy.eu::8a610ddd-2d43-48fb-8de7-c62ed8386364" providerId="AD" clId="Web-{098C72FC-AE60-E4CD-85A6-D8811150A563}" dt="2019-06-04T04:41:02.318" v="80"/>
-          <ac:spMkLst>
-            <pc:docMk/>
-            <pc:sldMk cId="370089361" sldId="259"/>
-            <ac:spMk id="17" creationId="{EFD11C76-1ACD-4415-A7E5-C32DC09DE62F}"/>
-          </ac:spMkLst>
-        </pc:spChg>
-        <pc:spChg chg="add">
-          <ac:chgData name="Freek Driesenaar" userId="S::freek.driesenaar@qiy.eu::8a610ddd-2d43-48fb-8de7-c62ed8386364" providerId="AD" clId="Web-{098C72FC-AE60-E4CD-85A6-D8811150A563}" dt="2019-06-04T04:41:02.443" v="89"/>
-          <ac:spMkLst>
-            <pc:docMk/>
-            <pc:sldMk cId="370089361" sldId="259"/>
-            <ac:spMk id="35" creationId="{B9E76DA2-EAB4-43CE-B7AE-FAF77044EEAC}"/>
-          </ac:spMkLst>
-        </pc:spChg>
-        <pc:spChg chg="add">
-          <ac:chgData name="Freek Driesenaar" userId="S::freek.driesenaar@qiy.eu::8a610ddd-2d43-48fb-8de7-c62ed8386364" providerId="AD" clId="Web-{098C72FC-AE60-E4CD-85A6-D8811150A563}" dt="2019-06-04T04:41:02.458" v="90"/>
-          <ac:spMkLst>
-            <pc:docMk/>
-            <pc:sldMk cId="370089361" sldId="259"/>
-            <ac:spMk id="37" creationId="{C82DDB97-1860-42B0-AE13-4629BB2A8A99}"/>
-          </ac:spMkLst>
-        </pc:spChg>
-        <pc:spChg chg="add">
-          <ac:chgData name="Freek Driesenaar" userId="S::freek.driesenaar@qiy.eu::8a610ddd-2d43-48fb-8de7-c62ed8386364" providerId="AD" clId="Web-{098C72FC-AE60-E4CD-85A6-D8811150A563}" dt="2019-06-04T04:41:02.474" v="91"/>
-          <ac:spMkLst>
-            <pc:docMk/>
-            <pc:sldMk cId="370089361" sldId="259"/>
-            <ac:spMk id="39" creationId="{1128F50D-4293-4CBE-AF3D-C656E582E25C}"/>
-          </ac:spMkLst>
-        </pc:spChg>
-        <pc:spChg chg="add">
-          <ac:chgData name="Freek Driesenaar" userId="S::freek.driesenaar@qiy.eu::8a610ddd-2d43-48fb-8de7-c62ed8386364" providerId="AD" clId="Web-{098C72FC-AE60-E4CD-85A6-D8811150A563}" dt="2019-06-04T04:41:02.489" v="92"/>
-          <ac:spMkLst>
-            <pc:docMk/>
-            <pc:sldMk cId="370089361" sldId="259"/>
-            <ac:spMk id="41" creationId="{7C34FF5F-452E-42AD-8491-0BA97D9F0F47}"/>
-          </ac:spMkLst>
-        </pc:spChg>
-        <pc:spChg chg="add">
-          <ac:chgData name="Freek Driesenaar" userId="S::freek.driesenaar@qiy.eu::8a610ddd-2d43-48fb-8de7-c62ed8386364" providerId="AD" clId="Web-{098C72FC-AE60-E4CD-85A6-D8811150A563}" dt="2019-06-04T04:41:02.505" v="93"/>
-          <ac:spMkLst>
-            <pc:docMk/>
-            <pc:sldMk cId="370089361" sldId="259"/>
-            <ac:spMk id="43" creationId="{8951E14E-CCF4-4664-AC71-404533555B94}"/>
-          </ac:spMkLst>
-        </pc:spChg>
-        <pc:spChg chg="add">
-          <ac:chgData name="Freek Driesenaar" userId="S::freek.driesenaar@qiy.eu::8a610ddd-2d43-48fb-8de7-c62ed8386364" providerId="AD" clId="Web-{098C72FC-AE60-E4CD-85A6-D8811150A563}" dt="2019-06-04T04:41:02.521" v="94"/>
-          <ac:spMkLst>
-            <pc:docMk/>
-            <pc:sldMk cId="370089361" sldId="259"/>
-            <ac:spMk id="45" creationId="{3CF363C7-EFDC-4D13-9124-9140F23121EF}"/>
-          </ac:spMkLst>
-        </pc:spChg>
-        <pc:spChg chg="add del">
-          <ac:chgData name="Freek Driesenaar" userId="S::freek.driesenaar@qiy.eu::8a610ddd-2d43-48fb-8de7-c62ed8386364" providerId="AD" clId="Web-{098C72FC-AE60-E4CD-85A6-D8811150A563}" dt="2019-06-04T04:49:54.772" v="251"/>
-          <ac:spMkLst>
-            <pc:docMk/>
-            <pc:sldMk cId="370089361" sldId="259"/>
-            <ac:spMk id="46" creationId="{7B0272D9-A55C-4DB6-AF23-3DEEB96A5BCF}"/>
-          </ac:spMkLst>
-        </pc:spChg>
-        <pc:cxnChg chg="add">
-          <ac:chgData name="Freek Driesenaar" userId="S::freek.driesenaar@qiy.eu::8a610ddd-2d43-48fb-8de7-c62ed8386364" providerId="AD" clId="Web-{098C72FC-AE60-E4CD-85A6-D8811150A563}" dt="2019-06-04T04:41:02.333" v="81"/>
-          <ac:cxnSpMkLst>
-            <pc:docMk/>
-            <pc:sldMk cId="370089361" sldId="259"/>
-            <ac:cxnSpMk id="19" creationId="{BD8D858C-AEA0-4627-B19E-4C8BBFD074FC}"/>
-          </ac:cxnSpMkLst>
-        </pc:cxnChg>
-        <pc:cxnChg chg="add">
-          <ac:chgData name="Freek Driesenaar" userId="S::freek.driesenaar@qiy.eu::8a610ddd-2d43-48fb-8de7-c62ed8386364" providerId="AD" clId="Web-{098C72FC-AE60-E4CD-85A6-D8811150A563}" dt="2019-06-04T04:41:02.349" v="82"/>
-          <ac:cxnSpMkLst>
-            <pc:docMk/>
-            <pc:sldMk cId="370089361" sldId="259"/>
-            <ac:cxnSpMk id="21" creationId="{BE34676A-5F6B-444F-B918-B63A2A7DCB6B}"/>
-          </ac:cxnSpMkLst>
-        </pc:cxnChg>
-        <pc:cxnChg chg="add">
-          <ac:chgData name="Freek Driesenaar" userId="S::freek.driesenaar@qiy.eu::8a610ddd-2d43-48fb-8de7-c62ed8386364" providerId="AD" clId="Web-{098C72FC-AE60-E4CD-85A6-D8811150A563}" dt="2019-06-04T04:41:02.364" v="83"/>
-          <ac:cxnSpMkLst>
-            <pc:docMk/>
-            <pc:sldMk cId="370089361" sldId="259"/>
-            <ac:cxnSpMk id="23" creationId="{9D27FA8D-9994-4BF1-B126-231BFE093443}"/>
-          </ac:cxnSpMkLst>
-        </pc:cxnChg>
-        <pc:cxnChg chg="add">
-          <ac:chgData name="Freek Driesenaar" userId="S::freek.driesenaar@qiy.eu::8a610ddd-2d43-48fb-8de7-c62ed8386364" providerId="AD" clId="Web-{098C72FC-AE60-E4CD-85A6-D8811150A563}" dt="2019-06-04T04:41:02.364" v="84"/>
-          <ac:cxnSpMkLst>
-            <pc:docMk/>
-            <pc:sldMk cId="370089361" sldId="259"/>
-            <ac:cxnSpMk id="25" creationId="{D342D65B-4566-4BEA-AB3B-22DF9431A1FA}"/>
-          </ac:cxnSpMkLst>
-        </pc:cxnChg>
-        <pc:cxnChg chg="add">
-          <ac:chgData name="Freek Driesenaar" userId="S::freek.driesenaar@qiy.eu::8a610ddd-2d43-48fb-8de7-c62ed8386364" providerId="AD" clId="Web-{098C72FC-AE60-E4CD-85A6-D8811150A563}" dt="2019-06-04T04:41:02.380" v="85"/>
-          <ac:cxnSpMkLst>
-            <pc:docMk/>
-            <pc:sldMk cId="370089361" sldId="259"/>
-            <ac:cxnSpMk id="27" creationId="{14E396DF-C8E7-43B1-A6DE-71E11D264161}"/>
-          </ac:cxnSpMkLst>
-        </pc:cxnChg>
-        <pc:cxnChg chg="add">
-          <ac:chgData name="Freek Driesenaar" userId="S::freek.driesenaar@qiy.eu::8a610ddd-2d43-48fb-8de7-c62ed8386364" providerId="AD" clId="Web-{098C72FC-AE60-E4CD-85A6-D8811150A563}" dt="2019-06-04T04:41:02.396" v="86"/>
-          <ac:cxnSpMkLst>
-            <pc:docMk/>
-            <pc:sldMk cId="370089361" sldId="259"/>
-            <ac:cxnSpMk id="29" creationId="{BA67C10C-6CBB-4784-B1D2-98A4CEA6C903}"/>
-          </ac:cxnSpMkLst>
-        </pc:cxnChg>
-        <pc:cxnChg chg="add">
-          <ac:chgData name="Freek Driesenaar" userId="S::freek.driesenaar@qiy.eu::8a610ddd-2d43-48fb-8de7-c62ed8386364" providerId="AD" clId="Web-{098C72FC-AE60-E4CD-85A6-D8811150A563}" dt="2019-06-04T04:41:02.411" v="87"/>
-          <ac:cxnSpMkLst>
-            <pc:docMk/>
-            <pc:sldMk cId="370089361" sldId="259"/>
-            <ac:cxnSpMk id="31" creationId="{AF6AE2BC-ABB6-481D-AD13-271A763B3154}"/>
-          </ac:cxnSpMkLst>
-        </pc:cxnChg>
-        <pc:cxnChg chg="add">
-          <ac:chgData name="Freek Driesenaar" userId="S::freek.driesenaar@qiy.eu::8a610ddd-2d43-48fb-8de7-c62ed8386364" providerId="AD" clId="Web-{098C72FC-AE60-E4CD-85A6-D8811150A563}" dt="2019-06-04T04:41:02.427" v="88"/>
-          <ac:cxnSpMkLst>
-            <pc:docMk/>
-            <pc:sldMk cId="370089361" sldId="259"/>
-            <ac:cxnSpMk id="33" creationId="{B29EE4C8-7B52-48CC-891A-AF4FD45D8CF7}"/>
-          </ac:cxnSpMkLst>
-        </pc:cxnChg>
-      </pc:sldChg>
-      <pc:sldChg chg="addSp modSp">
-        <pc:chgData name="Freek Driesenaar" userId="S::freek.driesenaar@qiy.eu::8a610ddd-2d43-48fb-8de7-c62ed8386364" providerId="AD" clId="Web-{098C72FC-AE60-E4CD-85A6-D8811150A563}" dt="2019-06-04T08:16:17.276" v="1072" actId="1076"/>
-        <pc:sldMkLst>
-          <pc:docMk/>
-          <pc:sldMk cId="2192957403" sldId="260"/>
-        </pc:sldMkLst>
-        <pc:spChg chg="mod">
-          <ac:chgData name="Freek Driesenaar" userId="S::freek.driesenaar@qiy.eu::8a610ddd-2d43-48fb-8de7-c62ed8386364" providerId="AD" clId="Web-{098C72FC-AE60-E4CD-85A6-D8811150A563}" dt="2019-06-04T08:16:09.104" v="1071" actId="14100"/>
-          <ac:spMkLst>
-            <pc:docMk/>
-            <pc:sldMk cId="2192957403" sldId="260"/>
-            <ac:spMk id="3" creationId="{DDE4FC46-0BFC-4572-9567-661B00621ECE}"/>
-          </ac:spMkLst>
-        </pc:spChg>
-        <pc:spChg chg="add mod">
-          <ac:chgData name="Freek Driesenaar" userId="S::freek.driesenaar@qiy.eu::8a610ddd-2d43-48fb-8de7-c62ed8386364" providerId="AD" clId="Web-{098C72FC-AE60-E4CD-85A6-D8811150A563}" dt="2019-06-04T08:16:17.276" v="1072" actId="1076"/>
-          <ac:spMkLst>
-            <pc:docMk/>
-            <pc:sldMk cId="2192957403" sldId="260"/>
-            <ac:spMk id="4" creationId="{DFF14317-8CE5-416C-AE1A-74D7EDE4777C}"/>
-          </ac:spMkLst>
-        </pc:spChg>
-      </pc:sldChg>
-      <pc:sldChg chg="modSp">
-        <pc:chgData name="Freek Driesenaar" userId="S::freek.driesenaar@qiy.eu::8a610ddd-2d43-48fb-8de7-c62ed8386364" providerId="AD" clId="Web-{098C72FC-AE60-E4CD-85A6-D8811150A563}" dt="2019-06-04T07:42:00.141" v="694" actId="20577"/>
-        <pc:sldMkLst>
-          <pc:docMk/>
-          <pc:sldMk cId="1474770734" sldId="261"/>
-        </pc:sldMkLst>
-        <pc:spChg chg="mod">
-          <ac:chgData name="Freek Driesenaar" userId="S::freek.driesenaar@qiy.eu::8a610ddd-2d43-48fb-8de7-c62ed8386364" providerId="AD" clId="Web-{098C72FC-AE60-E4CD-85A6-D8811150A563}" dt="2019-06-04T05:38:02.061" v="540" actId="20577"/>
-          <ac:spMkLst>
-            <pc:docMk/>
-            <pc:sldMk cId="1474770734" sldId="261"/>
-            <ac:spMk id="2" creationId="{BE0B67F0-622B-425E-AE51-2E446105D95C}"/>
-          </ac:spMkLst>
-        </pc:spChg>
-        <pc:spChg chg="mod">
-          <ac:chgData name="Freek Driesenaar" userId="S::freek.driesenaar@qiy.eu::8a610ddd-2d43-48fb-8de7-c62ed8386364" providerId="AD" clId="Web-{098C72FC-AE60-E4CD-85A6-D8811150A563}" dt="2019-06-04T07:42:00.141" v="694" actId="20577"/>
-          <ac:spMkLst>
-            <pc:docMk/>
-            <pc:sldMk cId="1474770734" sldId="261"/>
-            <ac:spMk id="3" creationId="{B8DF9218-F807-43B7-90FD-C49D365C3EBC}"/>
-          </ac:spMkLst>
-        </pc:spChg>
-      </pc:sldChg>
-      <pc:sldChg chg="delSp modSp">
-        <pc:chgData name="Freek Driesenaar" userId="S::freek.driesenaar@qiy.eu::8a610ddd-2d43-48fb-8de7-c62ed8386364" providerId="AD" clId="Web-{098C72FC-AE60-E4CD-85A6-D8811150A563}" dt="2019-06-04T04:36:24.957" v="9"/>
-        <pc:sldMkLst>
-          <pc:docMk/>
-          <pc:sldMk cId="1255680768" sldId="264"/>
-        </pc:sldMkLst>
-        <pc:spChg chg="mod ord">
-          <ac:chgData name="Freek Driesenaar" userId="S::freek.driesenaar@qiy.eu::8a610ddd-2d43-48fb-8de7-c62ed8386364" providerId="AD" clId="Web-{098C72FC-AE60-E4CD-85A6-D8811150A563}" dt="2019-06-04T04:36:24.957" v="9"/>
-          <ac:spMkLst>
-            <pc:docMk/>
-            <pc:sldMk cId="1255680768" sldId="264"/>
-            <ac:spMk id="4" creationId="{46FC7650-6DA6-4932-99D5-6A87A860152A}"/>
-          </ac:spMkLst>
-        </pc:spChg>
-        <pc:spChg chg="mod ord">
-          <ac:chgData name="Freek Driesenaar" userId="S::freek.driesenaar@qiy.eu::8a610ddd-2d43-48fb-8de7-c62ed8386364" providerId="AD" clId="Web-{098C72FC-AE60-E4CD-85A6-D8811150A563}" dt="2019-06-04T04:35:18.317" v="3"/>
-          <ac:spMkLst>
-            <pc:docMk/>
-            <pc:sldMk cId="1255680768" sldId="264"/>
-            <ac:spMk id="8" creationId="{B592F9DF-F709-4804-8CE2-FC677C543D96}"/>
-          </ac:spMkLst>
-        </pc:spChg>
-        <pc:spChg chg="mod ord">
-          <ac:chgData name="Freek Driesenaar" userId="S::freek.driesenaar@qiy.eu::8a610ddd-2d43-48fb-8de7-c62ed8386364" providerId="AD" clId="Web-{098C72FC-AE60-E4CD-85A6-D8811150A563}" dt="2019-06-04T04:36:04.426" v="6"/>
-          <ac:spMkLst>
-            <pc:docMk/>
-            <pc:sldMk cId="1255680768" sldId="264"/>
-            <ac:spMk id="9" creationId="{6762E355-7866-4BF3-A35B-D7A0AF79A82F}"/>
-          </ac:spMkLst>
-        </pc:spChg>
-        <pc:spChg chg="mod ord">
-          <ac:chgData name="Freek Driesenaar" userId="S::freek.driesenaar@qiy.eu::8a610ddd-2d43-48fb-8de7-c62ed8386364" providerId="AD" clId="Web-{098C72FC-AE60-E4CD-85A6-D8811150A563}" dt="2019-06-04T04:36:09.067" v="7"/>
-          <ac:spMkLst>
-            <pc:docMk/>
-            <pc:sldMk cId="1255680768" sldId="264"/>
-            <ac:spMk id="10" creationId="{276AAE1C-2670-4738-8CA6-7643AB482CC5}"/>
-          </ac:spMkLst>
-        </pc:spChg>
-        <pc:cxnChg chg="mod">
-          <ac:chgData name="Freek Driesenaar" userId="S::freek.driesenaar@qiy.eu::8a610ddd-2d43-48fb-8de7-c62ed8386364" providerId="AD" clId="Web-{098C72FC-AE60-E4CD-85A6-D8811150A563}" dt="2019-06-04T04:34:51.129" v="1" actId="14100"/>
-          <ac:cxnSpMkLst>
-            <pc:docMk/>
-            <pc:sldMk cId="1255680768" sldId="264"/>
-            <ac:cxnSpMk id="26" creationId="{3275DAE9-78E6-40D3-89E1-B7AD5448C398}"/>
-          </ac:cxnSpMkLst>
-        </pc:cxnChg>
-        <pc:cxnChg chg="del">
-          <ac:chgData name="Freek Driesenaar" userId="S::freek.driesenaar@qiy.eu::8a610ddd-2d43-48fb-8de7-c62ed8386364" providerId="AD" clId="Web-{098C72FC-AE60-E4CD-85A6-D8811150A563}" dt="2019-06-04T04:34:45.223" v="0"/>
-          <ac:cxnSpMkLst>
-            <pc:docMk/>
-            <pc:sldMk cId="1255680768" sldId="264"/>
-            <ac:cxnSpMk id="27" creationId="{0344BFD9-011A-4F24-96F2-771141F95BB8}"/>
-          </ac:cxnSpMkLst>
-        </pc:cxnChg>
-      </pc:sldChg>
-      <pc:sldChg chg="addSp delSp modSp add del ord replId">
-        <pc:chgData name="Freek Driesenaar" userId="S::freek.driesenaar@qiy.eu::8a610ddd-2d43-48fb-8de7-c62ed8386364" providerId="AD" clId="Web-{098C72FC-AE60-E4CD-85A6-D8811150A563}" dt="2019-06-04T05:18:36.183" v="339"/>
-        <pc:sldMkLst>
-          <pc:docMk/>
-          <pc:sldMk cId="790814466" sldId="265"/>
-        </pc:sldMkLst>
-        <pc:spChg chg="mod">
-          <ac:chgData name="Freek Driesenaar" userId="S::freek.driesenaar@qiy.eu::8a610ddd-2d43-48fb-8de7-c62ed8386364" providerId="AD" clId="Web-{098C72FC-AE60-E4CD-85A6-D8811150A563}" dt="2019-06-04T04:47:22.209" v="241" actId="20577"/>
-          <ac:spMkLst>
-            <pc:docMk/>
-            <pc:sldMk cId="790814466" sldId="265"/>
-            <ac:spMk id="2" creationId="{BFE6C493-AD4F-4293-B4BD-CE1C0F343C0D}"/>
-          </ac:spMkLst>
-        </pc:spChg>
-        <pc:spChg chg="mod">
-          <ac:chgData name="Freek Driesenaar" userId="S::freek.driesenaar@qiy.eu::8a610ddd-2d43-48fb-8de7-c62ed8386364" providerId="AD" clId="Web-{098C72FC-AE60-E4CD-85A6-D8811150A563}" dt="2019-06-04T04:51:43.319" v="262" actId="14100"/>
-          <ac:spMkLst>
-            <pc:docMk/>
-            <pc:sldMk cId="790814466" sldId="265"/>
-            <ac:spMk id="3" creationId="{1254824B-0798-4731-8364-896AD6A47E0B}"/>
-          </ac:spMkLst>
-        </pc:spChg>
-        <pc:spChg chg="add mod">
-          <ac:chgData name="Freek Driesenaar" userId="S::freek.driesenaar@qiy.eu::8a610ddd-2d43-48fb-8de7-c62ed8386364" providerId="AD" clId="Web-{098C72FC-AE60-E4CD-85A6-D8811150A563}" dt="2019-06-04T04:59:13.726" v="292" actId="20577"/>
-          <ac:spMkLst>
-            <pc:docMk/>
-            <pc:sldMk cId="790814466" sldId="265"/>
-            <ac:spMk id="4" creationId="{A5BA0587-E311-4F27-8A15-5335BDF05B6B}"/>
-          </ac:spMkLst>
-        </pc:spChg>
-        <pc:spChg chg="add del mod">
-          <ac:chgData name="Freek Driesenaar" userId="S::freek.driesenaar@qiy.eu::8a610ddd-2d43-48fb-8de7-c62ed8386364" providerId="AD" clId="Web-{098C72FC-AE60-E4CD-85A6-D8811150A563}" dt="2019-06-04T04:54:03.101" v="273"/>
-          <ac:spMkLst>
-            <pc:docMk/>
-            <pc:sldMk cId="790814466" sldId="265"/>
-            <ac:spMk id="26" creationId="{1FEBABEB-EC35-471A-AF87-FDD496B77A29}"/>
-          </ac:spMkLst>
-        </pc:spChg>
-        <pc:spChg chg="add mod">
-          <ac:chgData name="Freek Driesenaar" userId="S::freek.driesenaar@qiy.eu::8a610ddd-2d43-48fb-8de7-c62ed8386364" providerId="AD" clId="Web-{098C72FC-AE60-E4CD-85A6-D8811150A563}" dt="2019-06-04T05:00:21.945" v="305" actId="1076"/>
-          <ac:spMkLst>
-            <pc:docMk/>
-            <pc:sldMk cId="790814466" sldId="265"/>
-            <ac:spMk id="28" creationId="{181E1A5D-F0E9-4BA2-AFBF-83EFF3B539B9}"/>
-          </ac:spMkLst>
-        </pc:spChg>
-        <pc:spChg chg="add mod">
-          <ac:chgData name="Freek Driesenaar" userId="S::freek.driesenaar@qiy.eu::8a610ddd-2d43-48fb-8de7-c62ed8386364" providerId="AD" clId="Web-{098C72FC-AE60-E4CD-85A6-D8811150A563}" dt="2019-06-04T05:00:47.242" v="310" actId="688"/>
-          <ac:spMkLst>
-            <pc:docMk/>
-            <pc:sldMk cId="790814466" sldId="265"/>
-            <ac:spMk id="30" creationId="{2DBB1C8B-89D2-4DDE-9C5E-0A6E29B137DE}"/>
-          </ac:spMkLst>
-        </pc:spChg>
-        <pc:spChg chg="add mod">
-          <ac:chgData name="Freek Driesenaar" userId="S::freek.driesenaar@qiy.eu::8a610ddd-2d43-48fb-8de7-c62ed8386364" providerId="AD" clId="Web-{098C72FC-AE60-E4CD-85A6-D8811150A563}" dt="2019-06-04T05:02:44.086" v="322" actId="14100"/>
-          <ac:spMkLst>
-            <pc:docMk/>
-            <pc:sldMk cId="790814466" sldId="265"/>
-            <ac:spMk id="32" creationId="{21EE46BC-14F8-422F-986C-A537D06C31E2}"/>
-          </ac:spMkLst>
-        </pc:spChg>
-      </pc:sldChg>
-      <pc:sldChg chg="addSp modSp add replId">
-        <pc:chgData name="Freek Driesenaar" userId="S::freek.driesenaar@qiy.eu::8a610ddd-2d43-48fb-8de7-c62ed8386364" providerId="AD" clId="Web-{098C72FC-AE60-E4CD-85A6-D8811150A563}" dt="2019-06-04T06:48:55.411" v="622" actId="1076"/>
-        <pc:sldMkLst>
-          <pc:docMk/>
-          <pc:sldMk cId="3097907584" sldId="266"/>
-        </pc:sldMkLst>
-        <pc:spChg chg="mod">
-          <ac:chgData name="Freek Driesenaar" userId="S::freek.driesenaar@qiy.eu::8a610ddd-2d43-48fb-8de7-c62ed8386364" providerId="AD" clId="Web-{098C72FC-AE60-E4CD-85A6-D8811150A563}" dt="2019-06-04T05:39:13.279" v="549" actId="20577"/>
-          <ac:spMkLst>
-            <pc:docMk/>
-            <pc:sldMk cId="3097907584" sldId="266"/>
-            <ac:spMk id="4" creationId="{A5BA0587-E311-4F27-8A15-5335BDF05B6B}"/>
-          </ac:spMkLst>
-        </pc:spChg>
-        <pc:spChg chg="add mod">
-          <ac:chgData name="Freek Driesenaar" userId="S::freek.driesenaar@qiy.eu::8a610ddd-2d43-48fb-8de7-c62ed8386364" providerId="AD" clId="Web-{098C72FC-AE60-E4CD-85A6-D8811150A563}" dt="2019-06-04T06:48:45.770" v="620" actId="1076"/>
-          <ac:spMkLst>
-            <pc:docMk/>
-            <pc:sldMk cId="3097907584" sldId="266"/>
-            <ac:spMk id="6" creationId="{F0559DAE-FA1F-45B5-B091-B24BE9565E3B}"/>
-          </ac:spMkLst>
-        </pc:spChg>
-        <pc:spChg chg="mod">
-          <ac:chgData name="Freek Driesenaar" userId="S::freek.driesenaar@qiy.eu::8a610ddd-2d43-48fb-8de7-c62ed8386364" providerId="AD" clId="Web-{098C72FC-AE60-E4CD-85A6-D8811150A563}" dt="2019-06-04T05:04:47.134" v="338" actId="1076"/>
-          <ac:spMkLst>
-            <pc:docMk/>
-            <pc:sldMk cId="3097907584" sldId="266"/>
-            <ac:spMk id="28" creationId="{181E1A5D-F0E9-4BA2-AFBF-83EFF3B539B9}"/>
-          </ac:spMkLst>
-        </pc:spChg>
-        <pc:spChg chg="add mod">
-          <ac:chgData name="Freek Driesenaar" userId="S::freek.driesenaar@qiy.eu::8a610ddd-2d43-48fb-8de7-c62ed8386364" providerId="AD" clId="Web-{098C72FC-AE60-E4CD-85A6-D8811150A563}" dt="2019-06-04T05:03:19.602" v="326" actId="1076"/>
-          <ac:spMkLst>
-            <pc:docMk/>
-            <pc:sldMk cId="3097907584" sldId="266"/>
-            <ac:spMk id="34" creationId="{2F416FCD-D13D-46C8-BE8E-7C9DD11BF429}"/>
-          </ac:spMkLst>
-        </pc:spChg>
-        <pc:spChg chg="add mod">
-          <ac:chgData name="Freek Driesenaar" userId="S::freek.driesenaar@qiy.eu::8a610ddd-2d43-48fb-8de7-c62ed8386364" providerId="AD" clId="Web-{098C72FC-AE60-E4CD-85A6-D8811150A563}" dt="2019-06-04T05:03:19.618" v="327" actId="1076"/>
-          <ac:spMkLst>
-            <pc:docMk/>
-            <pc:sldMk cId="3097907584" sldId="266"/>
-            <ac:spMk id="36" creationId="{973C462B-BE6B-45E8-B219-9E429453D593}"/>
-          </ac:spMkLst>
-        </pc:spChg>
-        <pc:spChg chg="add mod">
-          <ac:chgData name="Freek Driesenaar" userId="S::freek.driesenaar@qiy.eu::8a610ddd-2d43-48fb-8de7-c62ed8386364" providerId="AD" clId="Web-{098C72FC-AE60-E4CD-85A6-D8811150A563}" dt="2019-06-04T05:03:59.727" v="335" actId="688"/>
-          <ac:spMkLst>
-            <pc:docMk/>
-            <pc:sldMk cId="3097907584" sldId="266"/>
-            <ac:spMk id="38" creationId="{54511ED2-BF62-4D3D-8809-34E775850FFA}"/>
-          </ac:spMkLst>
-        </pc:spChg>
-        <pc:spChg chg="add mod">
-          <ac:chgData name="Freek Driesenaar" userId="S::freek.driesenaar@qiy.eu::8a610ddd-2d43-48fb-8de7-c62ed8386364" providerId="AD" clId="Web-{098C72FC-AE60-E4CD-85A6-D8811150A563}" dt="2019-06-04T05:04:10.680" v="336" actId="1076"/>
-          <ac:spMkLst>
-            <pc:docMk/>
-            <pc:sldMk cId="3097907584" sldId="266"/>
-            <ac:spMk id="40" creationId="{EC25009B-826D-4C94-A109-78F5F2D9B026}"/>
-          </ac:spMkLst>
-        </pc:spChg>
-        <pc:spChg chg="add mod">
-          <ac:chgData name="Freek Driesenaar" userId="S::freek.driesenaar@qiy.eu::8a610ddd-2d43-48fb-8de7-c62ed8386364" providerId="AD" clId="Web-{098C72FC-AE60-E4CD-85A6-D8811150A563}" dt="2019-06-04T05:04:10.696" v="337" actId="1076"/>
-          <ac:spMkLst>
-            <pc:docMk/>
-            <pc:sldMk cId="3097907584" sldId="266"/>
-            <ac:spMk id="42" creationId="{4C30152A-A52B-4552-AA74-E2742A00EEAB}"/>
-          </ac:spMkLst>
-        </pc:spChg>
-        <pc:spChg chg="add mod">
-          <ac:chgData name="Freek Driesenaar" userId="S::freek.driesenaar@qiy.eu::8a610ddd-2d43-48fb-8de7-c62ed8386364" providerId="AD" clId="Web-{098C72FC-AE60-E4CD-85A6-D8811150A563}" dt="2019-06-04T06:48:55.411" v="622" actId="1076"/>
-          <ac:spMkLst>
-            <pc:docMk/>
-            <pc:sldMk cId="3097907584" sldId="266"/>
-            <ac:spMk id="44" creationId="{45B79138-4781-4436-88C1-F58B9EA97A9B}"/>
-          </ac:spMkLst>
-        </pc:spChg>
-      </pc:sldChg>
-    </pc:docChg>
-  </pc:docChgLst>
-  <pc:docChgLst>
-    <pc:chgData clId="Web-{CB68C916-AC33-4A4E-A60C-1D7E82BE0A92}"/>
-    <pc:docChg chg="modSld">
-      <pc:chgData name="" userId="" providerId="" clId="Web-{CB68C916-AC33-4A4E-A60C-1D7E82BE0A92}" dt="2019-06-03T12:38:14.185" v="5" actId="20577"/>
-      <pc:docMkLst>
-        <pc:docMk/>
-      </pc:docMkLst>
-      <pc:sldChg chg="modSp">
-        <pc:chgData name="" userId="" providerId="" clId="Web-{CB68C916-AC33-4A4E-A60C-1D7E82BE0A92}" dt="2019-06-03T12:38:14.169" v="4" actId="20577"/>
-        <pc:sldMkLst>
-          <pc:docMk/>
-          <pc:sldMk cId="3351439039" sldId="256"/>
-        </pc:sldMkLst>
-        <pc:spChg chg="mod">
-          <ac:chgData name="" userId="" providerId="" clId="Web-{CB68C916-AC33-4A4E-A60C-1D7E82BE0A92}" dt="2019-06-03T12:38:14.169" v="4" actId="20577"/>
-          <ac:spMkLst>
-            <pc:docMk/>
-            <pc:sldMk cId="3351439039" sldId="256"/>
-            <ac:spMk id="2" creationId="{00000000-0000-0000-0000-000000000000}"/>
-          </ac:spMkLst>
-        </pc:spChg>
-      </pc:sldChg>
-    </pc:docChg>
-  </pc:docChgLst>
-</pc:chgInfo>
 </file>
 
 <file path=ppt/slideLayouts/slideLayout1.xml><?xml version="1.0" encoding="utf-8"?>
@@ -1730,7 +260,7 @@
           <a:p>
             <a:fld id="{CA953BDC-9EAE-49FE-9892-958C9F845175}" type="datetimeFigureOut">
               <a:rPr lang="de-DE" smtClean="0"/>
-              <a:t>04.06.2019</a:t>
+              <a:t>05.06.2019</a:t>
             </a:fld>
             <a:endParaRPr lang="de-DE"/>
           </a:p>
@@ -1900,7 +430,7 @@
           <a:p>
             <a:fld id="{CA953BDC-9EAE-49FE-9892-958C9F845175}" type="datetimeFigureOut">
               <a:rPr lang="de-DE" smtClean="0"/>
-              <a:t>04.06.2019</a:t>
+              <a:t>05.06.2019</a:t>
             </a:fld>
             <a:endParaRPr lang="de-DE"/>
           </a:p>
@@ -2080,7 +610,7 @@
           <a:p>
             <a:fld id="{CA953BDC-9EAE-49FE-9892-958C9F845175}" type="datetimeFigureOut">
               <a:rPr lang="de-DE" smtClean="0"/>
-              <a:t>04.06.2019</a:t>
+              <a:t>05.06.2019</a:t>
             </a:fld>
             <a:endParaRPr lang="de-DE"/>
           </a:p>
@@ -2250,7 +780,7 @@
           <a:p>
             <a:fld id="{CA953BDC-9EAE-49FE-9892-958C9F845175}" type="datetimeFigureOut">
               <a:rPr lang="de-DE" smtClean="0"/>
-              <a:t>04.06.2019</a:t>
+              <a:t>05.06.2019</a:t>
             </a:fld>
             <a:endParaRPr lang="de-DE"/>
           </a:p>
@@ -2496,7 +1026,7 @@
           <a:p>
             <a:fld id="{CA953BDC-9EAE-49FE-9892-958C9F845175}" type="datetimeFigureOut">
               <a:rPr lang="de-DE" smtClean="0"/>
-              <a:t>04.06.2019</a:t>
+              <a:t>05.06.2019</a:t>
             </a:fld>
             <a:endParaRPr lang="de-DE"/>
           </a:p>
@@ -2728,7 +1258,7 @@
           <a:p>
             <a:fld id="{CA953BDC-9EAE-49FE-9892-958C9F845175}" type="datetimeFigureOut">
               <a:rPr lang="de-DE" smtClean="0"/>
-              <a:t>04.06.2019</a:t>
+              <a:t>05.06.2019</a:t>
             </a:fld>
             <a:endParaRPr lang="de-DE"/>
           </a:p>
@@ -3095,7 +1625,7 @@
           <a:p>
             <a:fld id="{CA953BDC-9EAE-49FE-9892-958C9F845175}" type="datetimeFigureOut">
               <a:rPr lang="de-DE" smtClean="0"/>
-              <a:t>04.06.2019</a:t>
+              <a:t>05.06.2019</a:t>
             </a:fld>
             <a:endParaRPr lang="de-DE"/>
           </a:p>
@@ -3213,7 +1743,7 @@
           <a:p>
             <a:fld id="{CA953BDC-9EAE-49FE-9892-958C9F845175}" type="datetimeFigureOut">
               <a:rPr lang="de-DE" smtClean="0"/>
-              <a:t>04.06.2019</a:t>
+              <a:t>05.06.2019</a:t>
             </a:fld>
             <a:endParaRPr lang="de-DE"/>
           </a:p>
@@ -3308,7 +1838,7 @@
           <a:p>
             <a:fld id="{CA953BDC-9EAE-49FE-9892-958C9F845175}" type="datetimeFigureOut">
               <a:rPr lang="de-DE" smtClean="0"/>
-              <a:t>04.06.2019</a:t>
+              <a:t>05.06.2019</a:t>
             </a:fld>
             <a:endParaRPr lang="de-DE"/>
           </a:p>
@@ -3585,7 +2115,7 @@
           <a:p>
             <a:fld id="{CA953BDC-9EAE-49FE-9892-958C9F845175}" type="datetimeFigureOut">
               <a:rPr lang="de-DE" smtClean="0"/>
-              <a:t>04.06.2019</a:t>
+              <a:t>05.06.2019</a:t>
             </a:fld>
             <a:endParaRPr lang="de-DE"/>
           </a:p>
@@ -3838,7 +2368,7 @@
           <a:p>
             <a:fld id="{CA953BDC-9EAE-49FE-9892-958C9F845175}" type="datetimeFigureOut">
               <a:rPr lang="de-DE" smtClean="0"/>
-              <a:t>04.06.2019</a:t>
+              <a:t>05.06.2019</a:t>
             </a:fld>
             <a:endParaRPr lang="de-DE"/>
           </a:p>
@@ -4051,7 +2581,7 @@
           <a:p>
             <a:fld id="{CA953BDC-9EAE-49FE-9892-958C9F845175}" type="datetimeFigureOut">
               <a:rPr lang="de-DE" smtClean="0"/>
-              <a:t>04.06.2019</a:t>
+              <a:t>05.06.2019</a:t>
             </a:fld>
             <a:endParaRPr lang="de-DE"/>
           </a:p>
@@ -4511,82 +3041,76 @@
           <a:lstStyle/>
           <a:p>
             <a:r>
-              <a:rPr lang="de-DE" err="1">
+              <a:rPr lang="de-DE" dirty="0" err="1">
                 <a:cs typeface="Calibri"/>
               </a:rPr>
               <a:t>Qiy</a:t>
             </a:r>
             <a:r>
-              <a:rPr lang="de-DE">
+              <a:rPr lang="de-DE" dirty="0">
                 <a:cs typeface="Calibri"/>
               </a:rPr>
               <a:t> </a:t>
             </a:r>
             <a:r>
-              <a:rPr lang="de-DE" err="1">
+              <a:rPr lang="de-DE" dirty="0" err="1">
                 <a:cs typeface="Calibri"/>
               </a:rPr>
               <a:t>Scheme</a:t>
             </a:r>
             <a:r>
-              <a:rPr lang="de-DE">
+              <a:rPr lang="de-DE" dirty="0">
                 <a:cs typeface="Calibri"/>
               </a:rPr>
-              <a:t>  </a:t>
+              <a:t>  </a:t>
             </a:r>
             <a:endParaRPr lang="nl-NL"/>
           </a:p>
           <a:p>
             <a:r>
-              <a:rPr lang="de-DE" err="1">
+              <a:rPr lang="de-DE" dirty="0">
                 <a:cs typeface="Calibri"/>
               </a:rPr>
-              <a:t>Workstream</a:t>
-            </a:r>
-            <a:r>
-              <a:rPr lang="de-DE">
+              <a:t>Work Stream </a:t>
+            </a:r>
+            <a:r>
+              <a:rPr lang="de-DE" dirty="0" err="1">
                 <a:cs typeface="Calibri"/>
               </a:rPr>
+              <a:t>Functionality</a:t>
+            </a:r>
+            <a:r>
+              <a:rPr lang="de-DE" dirty="0">
+                <a:cs typeface="Calibri"/>
+              </a:rPr>
+              <a:t> &amp; Technology</a:t>
+            </a:r>
+            <a:endParaRPr lang="de-DE" dirty="0"/>
+          </a:p>
+          <a:p>
+            <a:r>
+              <a:rPr lang="de-DE" dirty="0">
+                <a:cs typeface="Calibri"/>
+              </a:rPr>
+              <a:t>Meeting 09-06-2019</a:t>
+            </a:r>
+          </a:p>
+          <a:p>
+            <a:pPr algn="r"/>
+            <a:r>
+              <a:rPr lang="de-DE" dirty="0" err="1">
+                <a:cs typeface="Calibri"/>
+              </a:rPr>
+              <a:t>Freek</a:t>
+            </a:r>
+            <a:r>
+              <a:rPr lang="de-DE" dirty="0">
+                <a:cs typeface="Calibri"/>
+              </a:rPr>
               <a:t> </a:t>
             </a:r>
             <a:r>
-              <a:rPr lang="de-DE" err="1">
-                <a:cs typeface="Calibri"/>
-              </a:rPr>
-              <a:t>Functionality</a:t>
-            </a:r>
-            <a:r>
-              <a:rPr lang="de-DE">
-                <a:cs typeface="Calibri"/>
-              </a:rPr>
-              <a:t> &amp; Technology</a:t>
-            </a:r>
-            <a:endParaRPr lang="de-DE"/>
-          </a:p>
-          <a:p>
-            <a:r>
-              <a:rPr lang="de-DE">
-                <a:cs typeface="Calibri"/>
-              </a:rPr>
-              <a:t>Meeting 09-06</a:t>
-            </a:r>
-          </a:p>
-          <a:p>
-            <a:pPr algn="r"/>
-            <a:r>
-              <a:rPr lang="de-DE" err="1">
-                <a:cs typeface="Calibri"/>
-              </a:rPr>
-              <a:t>Freek</a:t>
-            </a:r>
-            <a:r>
-              <a:rPr lang="de-DE">
-                <a:cs typeface="Calibri"/>
-              </a:rPr>
-              <a:t> </a:t>
-            </a:r>
-            <a:r>
-              <a:rPr lang="de-DE" err="1">
+              <a:rPr lang="de-DE" dirty="0" err="1">
                 <a:cs typeface="Calibri"/>
               </a:rPr>
               <a:t>Driesenaar</a:t>
@@ -4899,6 +3423,68 @@
       </p:grpSpPr>
       <p:sp>
         <p:nvSpPr>
+          <p:cNvPr id="5" name="Rectangle 4">
+            <a:extLst>
+              <a:ext uri="{FF2B5EF4-FFF2-40B4-BE49-F238E27FC236}">
+                <a16:creationId xmlns:a16="http://schemas.microsoft.com/office/drawing/2014/main" id="{3B4C39A0-17D8-4C45-A791-A634563970CE}"/>
+              </a:ext>
+            </a:extLst>
+          </p:cNvPr>
+          <p:cNvSpPr/>
+          <p:nvPr/>
+        </p:nvSpPr>
+        <p:spPr>
+          <a:xfrm>
+            <a:off x="345455" y="5549356"/>
+            <a:ext cx="11504341" cy="473927"/>
+          </a:xfrm>
+          <a:prstGeom prst="rect">
+            <a:avLst/>
+          </a:prstGeom>
+          <a:solidFill>
+            <a:srgbClr val="92D050"/>
+          </a:solidFill>
+          <a:ln>
+            <a:solidFill>
+              <a:srgbClr val="00B050"/>
+            </a:solidFill>
+          </a:ln>
+        </p:spPr>
+        <p:style>
+          <a:lnRef idx="2">
+            <a:schemeClr val="accent1">
+              <a:shade val="50000"/>
+            </a:schemeClr>
+          </a:lnRef>
+          <a:fillRef idx="1">
+            <a:schemeClr val="accent1"/>
+          </a:fillRef>
+          <a:effectRef idx="0">
+            <a:schemeClr val="accent1"/>
+          </a:effectRef>
+          <a:fontRef idx="minor">
+            <a:schemeClr val="lt1"/>
+          </a:fontRef>
+        </p:style>
+        <p:txBody>
+          <a:bodyPr rot="0" spcFirstLastPara="0" vertOverflow="overflow" horzOverflow="overflow" vert="horz" wrap="square" lIns="91440" tIns="45720" rIns="91440" bIns="45720" numCol="1" spcCol="0" rtlCol="0" fromWordArt="0" anchor="t" anchorCtr="0" forceAA="0" compatLnSpc="1">
+            <a:prstTxWarp prst="textNoShape">
+              <a:avLst/>
+            </a:prstTxWarp>
+            <a:noAutofit/>
+          </a:bodyPr>
+          <a:lstStyle/>
+          <a:p>
+            <a:pPr algn="ctr"/>
+            <a:endParaRPr lang="nl-NL" dirty="0">
+              <a:ea typeface="+mn-lt"/>
+              <a:cs typeface="+mn-lt"/>
+            </a:endParaRPr>
+          </a:p>
+        </p:txBody>
+      </p:sp>
+      <p:sp>
+        <p:nvSpPr>
           <p:cNvPr id="2" name="Title 1">
             <a:extLst>
               <a:ext uri="{FF2B5EF4-FFF2-40B4-BE49-F238E27FC236}">
@@ -4922,9 +3508,11 @@
               <a:rPr lang="nl-NL">
                 <a:cs typeface="Calibri Light"/>
               </a:rPr>
-              <a:t>Context</a:t>
-            </a:r>
-            <a:endParaRPr lang="nl-NL"/>
+              <a:t>Now</a:t>
+            </a:r>
+            <a:endParaRPr lang="nl-NL" dirty="0">
+              <a:cs typeface="Calibri Light"/>
+            </a:endParaRPr>
           </a:p>
         </p:txBody>
       </p:sp>
@@ -5761,6 +4349,593 @@
           <a:p>
             <a:pPr algn="ctr"/>
             <a:endParaRPr lang="nl-NL"/>
+          </a:p>
+        </p:txBody>
+      </p:sp>
+      <p:sp>
+        <p:nvSpPr>
+          <p:cNvPr id="6" name="TextBox 5">
+            <a:extLst>
+              <a:ext uri="{FF2B5EF4-FFF2-40B4-BE49-F238E27FC236}">
+                <a16:creationId xmlns:a16="http://schemas.microsoft.com/office/drawing/2014/main" id="{2E53EADD-FBD2-4171-9D03-95C3D6FB9E23}"/>
+              </a:ext>
+            </a:extLst>
+          </p:cNvPr>
+          <p:cNvSpPr txBox="1"/>
+          <p:nvPr/>
+        </p:nvSpPr>
+        <p:spPr>
+          <a:xfrm>
+            <a:off x="4591980" y="5103076"/>
+            <a:ext cx="2743200" cy="369332"/>
+          </a:xfrm>
+          <a:prstGeom prst="rect">
+            <a:avLst/>
+          </a:prstGeom>
+          <a:noFill/>
+        </p:spPr>
+        <p:txBody>
+          <a:bodyPr rot="0" spcFirstLastPara="0" vertOverflow="overflow" horzOverflow="overflow" vert="horz" wrap="square" lIns="91440" tIns="45720" rIns="91440" bIns="45720" numCol="1" spcCol="0" rtlCol="0" fromWordArt="0" anchor="t" anchorCtr="0" forceAA="0" compatLnSpc="1">
+            <a:prstTxWarp prst="textNoShape">
+              <a:avLst/>
+            </a:prstTxWarp>
+            <a:spAutoFit/>
+          </a:bodyPr>
+          <a:lstStyle/>
+          <a:p>
+            <a:pPr algn="ctr"/>
+            <a:r>
+              <a:rPr lang="nl-NL">
+                <a:solidFill>
+                  <a:srgbClr val="00B050"/>
+                </a:solidFill>
+              </a:rPr>
+              <a:t>Node-to-node</a:t>
+            </a:r>
+          </a:p>
+        </p:txBody>
+      </p:sp>
+      <p:sp>
+        <p:nvSpPr>
+          <p:cNvPr id="7" name="Frame 6">
+            <a:extLst>
+              <a:ext uri="{FF2B5EF4-FFF2-40B4-BE49-F238E27FC236}">
+                <a16:creationId xmlns:a16="http://schemas.microsoft.com/office/drawing/2014/main" id="{E7011F04-99DC-4BE4-A2C7-F1F186FBE765}"/>
+              </a:ext>
+            </a:extLst>
+          </p:cNvPr>
+          <p:cNvSpPr/>
+          <p:nvPr/>
+        </p:nvSpPr>
+        <p:spPr>
+          <a:xfrm>
+            <a:off x="4779840" y="5176271"/>
+            <a:ext cx="359433" cy="301923"/>
+          </a:xfrm>
+          <a:prstGeom prst="frame">
+            <a:avLst/>
+          </a:prstGeom>
+          <a:solidFill>
+            <a:srgbClr val="92D050"/>
+          </a:solidFill>
+          <a:ln>
+            <a:solidFill>
+              <a:srgbClr val="00B050"/>
+            </a:solidFill>
+          </a:ln>
+        </p:spPr>
+        <p:style>
+          <a:lnRef idx="2">
+            <a:schemeClr val="accent1">
+              <a:shade val="50000"/>
+            </a:schemeClr>
+          </a:lnRef>
+          <a:fillRef idx="1">
+            <a:schemeClr val="accent1"/>
+          </a:fillRef>
+          <a:effectRef idx="0">
+            <a:schemeClr val="accent1"/>
+          </a:effectRef>
+          <a:fontRef idx="minor">
+            <a:schemeClr val="lt1"/>
+          </a:fontRef>
+        </p:style>
+        <p:txBody>
+          <a:bodyPr rtlCol="0" anchor="ctr"/>
+          <a:lstStyle/>
+          <a:p>
+            <a:pPr algn="ctr"/>
+            <a:endParaRPr lang="nl-NL">
+              <a:solidFill>
+                <a:schemeClr val="tx1"/>
+              </a:solidFill>
+            </a:endParaRPr>
+          </a:p>
+        </p:txBody>
+      </p:sp>
+      <p:sp>
+        <p:nvSpPr>
+          <p:cNvPr id="13" name="Block Arc 12">
+            <a:extLst>
+              <a:ext uri="{FF2B5EF4-FFF2-40B4-BE49-F238E27FC236}">
+                <a16:creationId xmlns:a16="http://schemas.microsoft.com/office/drawing/2014/main" id="{95A6E658-94E1-4DDC-8D25-5F23B3B6D00D}"/>
+              </a:ext>
+            </a:extLst>
+          </p:cNvPr>
+          <p:cNvSpPr/>
+          <p:nvPr/>
+        </p:nvSpPr>
+        <p:spPr>
+          <a:xfrm>
+            <a:off x="4807696" y="4930956"/>
+            <a:ext cx="301924" cy="431320"/>
+          </a:xfrm>
+          <a:prstGeom prst="blockArc">
+            <a:avLst/>
+          </a:prstGeom>
+          <a:solidFill>
+            <a:srgbClr val="92D050"/>
+          </a:solidFill>
+          <a:ln>
+            <a:solidFill>
+              <a:srgbClr val="00B050"/>
+            </a:solidFill>
+          </a:ln>
+        </p:spPr>
+        <p:style>
+          <a:lnRef idx="2">
+            <a:schemeClr val="accent1">
+              <a:shade val="50000"/>
+            </a:schemeClr>
+          </a:lnRef>
+          <a:fillRef idx="1">
+            <a:schemeClr val="accent1"/>
+          </a:fillRef>
+          <a:effectRef idx="0">
+            <a:schemeClr val="accent1"/>
+          </a:effectRef>
+          <a:fontRef idx="minor">
+            <a:schemeClr val="lt1"/>
+          </a:fontRef>
+        </p:style>
+        <p:txBody>
+          <a:bodyPr rtlCol="0" anchor="ctr"/>
+          <a:lstStyle/>
+          <a:p>
+            <a:pPr algn="ctr"/>
+            <a:endParaRPr lang="nl-NL">
+              <a:solidFill>
+                <a:schemeClr val="tx1"/>
+              </a:solidFill>
+            </a:endParaRPr>
+          </a:p>
+        </p:txBody>
+      </p:sp>
+      <p:sp>
+        <p:nvSpPr>
+          <p:cNvPr id="14" name="TextBox 13">
+            <a:extLst>
+              <a:ext uri="{FF2B5EF4-FFF2-40B4-BE49-F238E27FC236}">
+                <a16:creationId xmlns:a16="http://schemas.microsoft.com/office/drawing/2014/main" id="{BCE2132D-1924-4967-9795-106F5619E4E7}"/>
+              </a:ext>
+            </a:extLst>
+          </p:cNvPr>
+          <p:cNvSpPr txBox="1"/>
+          <p:nvPr/>
+        </p:nvSpPr>
+        <p:spPr>
+          <a:xfrm>
+            <a:off x="1518424" y="4733692"/>
+            <a:ext cx="540835" cy="307777"/>
+          </a:xfrm>
+          <a:prstGeom prst="rect">
+            <a:avLst/>
+          </a:prstGeom>
+          <a:noFill/>
+        </p:spPr>
+        <p:txBody>
+          <a:bodyPr rot="0" spcFirstLastPara="0" vertOverflow="overflow" horzOverflow="overflow" vert="horz" wrap="square" lIns="91440" tIns="45720" rIns="91440" bIns="45720" numCol="1" spcCol="0" rtlCol="0" fromWordArt="0" anchor="t" anchorCtr="0" forceAA="0" compatLnSpc="1">
+            <a:prstTxWarp prst="textNoShape">
+              <a:avLst/>
+            </a:prstTxWarp>
+            <a:spAutoFit/>
+          </a:bodyPr>
+          <a:lstStyle/>
+          <a:p>
+            <a:pPr algn="l"/>
+            <a:r>
+              <a:rPr lang="nl-NL" sz="1400"/>
+              <a:t>TLS</a:t>
+            </a:r>
+            <a:endParaRPr lang="nl-NL" sz="1400">
+              <a:cs typeface="Calibri"/>
+            </a:endParaRPr>
+          </a:p>
+        </p:txBody>
+      </p:sp>
+      <p:sp>
+        <p:nvSpPr>
+          <p:cNvPr id="29" name="TextBox 28">
+            <a:extLst>
+              <a:ext uri="{FF2B5EF4-FFF2-40B4-BE49-F238E27FC236}">
+                <a16:creationId xmlns:a16="http://schemas.microsoft.com/office/drawing/2014/main" id="{2E4D99FF-0641-4A3A-8E07-3F6BD548C2B1}"/>
+              </a:ext>
+            </a:extLst>
+          </p:cNvPr>
+          <p:cNvSpPr txBox="1"/>
+          <p:nvPr/>
+        </p:nvSpPr>
+        <p:spPr>
+          <a:xfrm>
+            <a:off x="5951033" y="4733692"/>
+            <a:ext cx="540835" cy="307777"/>
+          </a:xfrm>
+          <a:prstGeom prst="rect">
+            <a:avLst/>
+          </a:prstGeom>
+          <a:noFill/>
+        </p:spPr>
+        <p:txBody>
+          <a:bodyPr rot="0" spcFirstLastPara="0" vertOverflow="overflow" horzOverflow="overflow" vert="horz" wrap="square" lIns="91440" tIns="45720" rIns="91440" bIns="45720" numCol="1" spcCol="0" rtlCol="0" fromWordArt="0" anchor="t" anchorCtr="0" forceAA="0" compatLnSpc="1">
+            <a:prstTxWarp prst="textNoShape">
+              <a:avLst/>
+            </a:prstTxWarp>
+            <a:spAutoFit/>
+          </a:bodyPr>
+          <a:lstStyle/>
+          <a:p>
+            <a:pPr algn="l"/>
+            <a:r>
+              <a:rPr lang="nl-NL" sz="1400"/>
+              <a:t>TLS</a:t>
+            </a:r>
+            <a:endParaRPr lang="nl-NL" sz="1400">
+              <a:cs typeface="Calibri"/>
+            </a:endParaRPr>
+          </a:p>
+        </p:txBody>
+      </p:sp>
+      <p:sp>
+        <p:nvSpPr>
+          <p:cNvPr id="30" name="TextBox 29">
+            <a:extLst>
+              <a:ext uri="{FF2B5EF4-FFF2-40B4-BE49-F238E27FC236}">
+                <a16:creationId xmlns:a16="http://schemas.microsoft.com/office/drawing/2014/main" id="{C17B072F-BB57-4041-A445-C959A7890573}"/>
+              </a:ext>
+            </a:extLst>
+          </p:cNvPr>
+          <p:cNvSpPr txBox="1"/>
+          <p:nvPr/>
+        </p:nvSpPr>
+        <p:spPr>
+          <a:xfrm>
+            <a:off x="10095569" y="4733692"/>
+            <a:ext cx="540835" cy="307777"/>
+          </a:xfrm>
+          <a:prstGeom prst="rect">
+            <a:avLst/>
+          </a:prstGeom>
+          <a:noFill/>
+        </p:spPr>
+        <p:txBody>
+          <a:bodyPr rot="0" spcFirstLastPara="0" vertOverflow="overflow" horzOverflow="overflow" vert="horz" wrap="square" lIns="91440" tIns="45720" rIns="91440" bIns="45720" numCol="1" spcCol="0" rtlCol="0" fromWordArt="0" anchor="t" anchorCtr="0" forceAA="0" compatLnSpc="1">
+            <a:prstTxWarp prst="textNoShape">
+              <a:avLst/>
+            </a:prstTxWarp>
+            <a:spAutoFit/>
+          </a:bodyPr>
+          <a:lstStyle/>
+          <a:p>
+            <a:pPr algn="l"/>
+            <a:r>
+              <a:rPr lang="nl-NL" sz="1400"/>
+              <a:t>TLS</a:t>
+            </a:r>
+            <a:endParaRPr lang="nl-NL" sz="1400">
+              <a:cs typeface="Calibri"/>
+            </a:endParaRPr>
+          </a:p>
+        </p:txBody>
+      </p:sp>
+      <p:sp>
+        <p:nvSpPr>
+          <p:cNvPr id="45" name="Arrow: Right 44">
+            <a:extLst>
+              <a:ext uri="{FF2B5EF4-FFF2-40B4-BE49-F238E27FC236}">
+                <a16:creationId xmlns:a16="http://schemas.microsoft.com/office/drawing/2014/main" id="{F2C02B9B-05F7-4548-AA2F-9C5C86FCB414}"/>
+              </a:ext>
+            </a:extLst>
+          </p:cNvPr>
+          <p:cNvSpPr/>
+          <p:nvPr/>
+        </p:nvSpPr>
+        <p:spPr>
+          <a:xfrm rot="16200000">
+            <a:off x="711305" y="4818511"/>
+            <a:ext cx="1035169" cy="345058"/>
+          </a:xfrm>
+          <a:prstGeom prst="rightArrow">
+            <a:avLst/>
+          </a:prstGeom>
+          <a:solidFill>
+            <a:srgbClr val="00B0F0"/>
+          </a:solidFill>
+        </p:spPr>
+        <p:style>
+          <a:lnRef idx="2">
+            <a:schemeClr val="accent1">
+              <a:shade val="50000"/>
+            </a:schemeClr>
+          </a:lnRef>
+          <a:fillRef idx="1">
+            <a:schemeClr val="accent1"/>
+          </a:fillRef>
+          <a:effectRef idx="0">
+            <a:schemeClr val="accent1"/>
+          </a:effectRef>
+          <a:fontRef idx="minor">
+            <a:schemeClr val="lt1"/>
+          </a:fontRef>
+        </p:style>
+        <p:txBody>
+          <a:bodyPr rtlCol="0" anchor="ctr"/>
+          <a:lstStyle/>
+          <a:p>
+            <a:pPr algn="ctr"/>
+            <a:endParaRPr lang="nl-NL">
+              <a:cs typeface="Calibri"/>
+            </a:endParaRPr>
+          </a:p>
+        </p:txBody>
+      </p:sp>
+      <p:sp>
+        <p:nvSpPr>
+          <p:cNvPr id="47" name="Frame 46">
+            <a:extLst>
+              <a:ext uri="{FF2B5EF4-FFF2-40B4-BE49-F238E27FC236}">
+                <a16:creationId xmlns:a16="http://schemas.microsoft.com/office/drawing/2014/main" id="{9D35A419-FAE2-44AE-B0D4-477782D9846B}"/>
+              </a:ext>
+            </a:extLst>
+          </p:cNvPr>
+          <p:cNvSpPr/>
+          <p:nvPr/>
+        </p:nvSpPr>
+        <p:spPr>
+          <a:xfrm>
+            <a:off x="649856" y="4927120"/>
+            <a:ext cx="359433" cy="301923"/>
+          </a:xfrm>
+          <a:prstGeom prst="frame">
+            <a:avLst/>
+          </a:prstGeom>
+        </p:spPr>
+        <p:style>
+          <a:lnRef idx="2">
+            <a:schemeClr val="accent1">
+              <a:shade val="50000"/>
+            </a:schemeClr>
+          </a:lnRef>
+          <a:fillRef idx="1">
+            <a:schemeClr val="accent1"/>
+          </a:fillRef>
+          <a:effectRef idx="0">
+            <a:schemeClr val="accent1"/>
+          </a:effectRef>
+          <a:fontRef idx="minor">
+            <a:schemeClr val="lt1"/>
+          </a:fontRef>
+        </p:style>
+        <p:txBody>
+          <a:bodyPr rtlCol="0" anchor="ctr"/>
+          <a:lstStyle/>
+          <a:p>
+            <a:pPr algn="ctr"/>
+            <a:endParaRPr lang="nl-NL">
+              <a:solidFill>
+                <a:schemeClr val="tx1"/>
+              </a:solidFill>
+            </a:endParaRPr>
+          </a:p>
+        </p:txBody>
+      </p:sp>
+      <p:sp>
+        <p:nvSpPr>
+          <p:cNvPr id="49" name="Block Arc 48">
+            <a:extLst>
+              <a:ext uri="{FF2B5EF4-FFF2-40B4-BE49-F238E27FC236}">
+                <a16:creationId xmlns:a16="http://schemas.microsoft.com/office/drawing/2014/main" id="{2605E799-B2AF-4D70-AA42-27C63C5DA887}"/>
+              </a:ext>
+            </a:extLst>
+          </p:cNvPr>
+          <p:cNvSpPr/>
+          <p:nvPr/>
+        </p:nvSpPr>
+        <p:spPr>
+          <a:xfrm rot="-2280000">
+            <a:off x="677712" y="4681805"/>
+            <a:ext cx="301924" cy="431320"/>
+          </a:xfrm>
+          <a:prstGeom prst="blockArc">
+            <a:avLst/>
+          </a:prstGeom>
+        </p:spPr>
+        <p:style>
+          <a:lnRef idx="2">
+            <a:schemeClr val="accent1">
+              <a:shade val="50000"/>
+            </a:schemeClr>
+          </a:lnRef>
+          <a:fillRef idx="1">
+            <a:schemeClr val="accent1"/>
+          </a:fillRef>
+          <a:effectRef idx="0">
+            <a:schemeClr val="accent1"/>
+          </a:effectRef>
+          <a:fontRef idx="minor">
+            <a:schemeClr val="lt1"/>
+          </a:fontRef>
+        </p:style>
+        <p:txBody>
+          <a:bodyPr rtlCol="0" anchor="ctr"/>
+          <a:lstStyle/>
+          <a:p>
+            <a:pPr algn="ctr"/>
+            <a:endParaRPr lang="nl-NL">
+              <a:solidFill>
+                <a:schemeClr val="tx1"/>
+              </a:solidFill>
+            </a:endParaRPr>
+          </a:p>
+        </p:txBody>
+      </p:sp>
+      <p:sp>
+        <p:nvSpPr>
+          <p:cNvPr id="51" name="Arrow: Right 50">
+            <a:extLst>
+              <a:ext uri="{FF2B5EF4-FFF2-40B4-BE49-F238E27FC236}">
+                <a16:creationId xmlns:a16="http://schemas.microsoft.com/office/drawing/2014/main" id="{C2E16151-F177-4B71-BF8D-A9D9B8191B48}"/>
+              </a:ext>
+            </a:extLst>
+          </p:cNvPr>
+          <p:cNvSpPr/>
+          <p:nvPr/>
+        </p:nvSpPr>
+        <p:spPr>
+          <a:xfrm rot="5400000">
+            <a:off x="10344135" y="4832889"/>
+            <a:ext cx="1035169" cy="345058"/>
+          </a:xfrm>
+          <a:prstGeom prst="rightArrow">
+            <a:avLst/>
+          </a:prstGeom>
+          <a:solidFill>
+            <a:srgbClr val="00B0F0"/>
+          </a:solidFill>
+        </p:spPr>
+        <p:style>
+          <a:lnRef idx="2">
+            <a:schemeClr val="accent1">
+              <a:shade val="50000"/>
+            </a:schemeClr>
+          </a:lnRef>
+          <a:fillRef idx="1">
+            <a:schemeClr val="accent1"/>
+          </a:fillRef>
+          <a:effectRef idx="0">
+            <a:schemeClr val="accent1"/>
+          </a:effectRef>
+          <a:fontRef idx="minor">
+            <a:schemeClr val="lt1"/>
+          </a:fontRef>
+        </p:style>
+        <p:txBody>
+          <a:bodyPr rtlCol="0" anchor="ctr"/>
+          <a:lstStyle/>
+          <a:p>
+            <a:pPr algn="ctr"/>
+            <a:endParaRPr lang="nl-NL">
+              <a:cs typeface="Calibri"/>
+            </a:endParaRPr>
+          </a:p>
+        </p:txBody>
+      </p:sp>
+      <p:sp>
+        <p:nvSpPr>
+          <p:cNvPr id="53" name="Frame 52">
+            <a:extLst>
+              <a:ext uri="{FF2B5EF4-FFF2-40B4-BE49-F238E27FC236}">
+                <a16:creationId xmlns:a16="http://schemas.microsoft.com/office/drawing/2014/main" id="{E600B4CB-12D4-4B3E-9694-B2ADD42D373E}"/>
+              </a:ext>
+            </a:extLst>
+          </p:cNvPr>
+          <p:cNvSpPr/>
+          <p:nvPr/>
+        </p:nvSpPr>
+        <p:spPr>
+          <a:xfrm>
+            <a:off x="11030309" y="4927121"/>
+            <a:ext cx="359433" cy="301923"/>
+          </a:xfrm>
+          <a:prstGeom prst="frame">
+            <a:avLst/>
+          </a:prstGeom>
+        </p:spPr>
+        <p:style>
+          <a:lnRef idx="2">
+            <a:schemeClr val="accent1">
+              <a:shade val="50000"/>
+            </a:schemeClr>
+          </a:lnRef>
+          <a:fillRef idx="1">
+            <a:schemeClr val="accent1"/>
+          </a:fillRef>
+          <a:effectRef idx="0">
+            <a:schemeClr val="accent1"/>
+          </a:effectRef>
+          <a:fontRef idx="minor">
+            <a:schemeClr val="lt1"/>
+          </a:fontRef>
+        </p:style>
+        <p:txBody>
+          <a:bodyPr rtlCol="0" anchor="ctr"/>
+          <a:lstStyle/>
+          <a:p>
+            <a:pPr algn="ctr"/>
+            <a:endParaRPr lang="nl-NL">
+              <a:solidFill>
+                <a:schemeClr val="tx1"/>
+              </a:solidFill>
+            </a:endParaRPr>
+          </a:p>
+        </p:txBody>
+      </p:sp>
+      <p:sp>
+        <p:nvSpPr>
+          <p:cNvPr id="55" name="Block Arc 54">
+            <a:extLst>
+              <a:ext uri="{FF2B5EF4-FFF2-40B4-BE49-F238E27FC236}">
+                <a16:creationId xmlns:a16="http://schemas.microsoft.com/office/drawing/2014/main" id="{9C2DE9AB-0068-44E2-B7B1-CD464DD0E8B6}"/>
+              </a:ext>
+            </a:extLst>
+          </p:cNvPr>
+          <p:cNvSpPr/>
+          <p:nvPr/>
+        </p:nvSpPr>
+        <p:spPr>
+          <a:xfrm rot="-2580000">
+            <a:off x="11058165" y="4681806"/>
+            <a:ext cx="301924" cy="431320"/>
+          </a:xfrm>
+          <a:prstGeom prst="blockArc">
+            <a:avLst/>
+          </a:prstGeom>
+        </p:spPr>
+        <p:style>
+          <a:lnRef idx="2">
+            <a:schemeClr val="accent1">
+              <a:shade val="50000"/>
+            </a:schemeClr>
+          </a:lnRef>
+          <a:fillRef idx="1">
+            <a:schemeClr val="accent1"/>
+          </a:fillRef>
+          <a:effectRef idx="0">
+            <a:schemeClr val="accent1"/>
+          </a:effectRef>
+          <a:fontRef idx="minor">
+            <a:schemeClr val="lt1"/>
+          </a:fontRef>
+        </p:style>
+        <p:txBody>
+          <a:bodyPr rtlCol="0" anchor="ctr"/>
+          <a:lstStyle/>
+          <a:p>
+            <a:pPr algn="ctr"/>
+            <a:endParaRPr lang="nl-NL">
+              <a:solidFill>
+                <a:schemeClr val="tx1"/>
+              </a:solidFill>
+            </a:endParaRPr>
           </a:p>
         </p:txBody>
       </p:sp>
@@ -5815,154 +4990,28 @@
           <a:bodyPr/>
           <a:lstStyle/>
           <a:p>
-            <a:r>
-              <a:rPr lang="nl-NL" err="1">
-                <a:cs typeface="Calibri Light"/>
-              </a:rPr>
-              <a:t>Current</a:t>
-            </a:r>
+            <a:pPr>
+              <a:spcBef>
+                <a:spcPts val="1000"/>
+              </a:spcBef>
+            </a:pPr>
             <a:r>
               <a:rPr lang="nl-NL">
                 <a:cs typeface="Calibri Light"/>
               </a:rPr>
-              <a:t> state:</a:t>
-            </a:r>
-            <a:endParaRPr lang="nl-NL" err="1"/>
-          </a:p>
-        </p:txBody>
-      </p:sp>
-      <p:sp>
-        <p:nvSpPr>
-          <p:cNvPr id="3" name="Content Placeholder 2">
-            <a:extLst>
-              <a:ext uri="{FF2B5EF4-FFF2-40B4-BE49-F238E27FC236}">
-                <a16:creationId xmlns:a16="http://schemas.microsoft.com/office/drawing/2014/main" id="{E455350F-95B1-450D-B938-F3F0882FBDB1}"/>
-              </a:ext>
-            </a:extLst>
-          </p:cNvPr>
-          <p:cNvSpPr>
-            <a:spLocks noGrp="1"/>
-          </p:cNvSpPr>
-          <p:nvPr>
-            <p:ph idx="1"/>
-          </p:nvPr>
-        </p:nvSpPr>
-        <p:spPr>
-          <a:xfrm>
-            <a:off x="4245634" y="244116"/>
-            <a:ext cx="7697638" cy="4351338"/>
-          </a:xfrm>
-        </p:spPr>
-        <p:txBody>
-          <a:bodyPr vert="horz" lIns="91440" tIns="45720" rIns="91440" bIns="45720" rtlCol="0" anchor="t">
-            <a:normAutofit/>
-          </a:bodyPr>
-          <a:lstStyle/>
-          <a:p>
-            <a:r>
-              <a:rPr lang="nl-NL" err="1">
-                <a:cs typeface="Calibri"/>
-              </a:rPr>
-              <a:t>Individual</a:t>
+              <a:t>fiKks: </a:t>
             </a:r>
             <a:r>
               <a:rPr lang="nl-NL">
-                <a:cs typeface="Calibri"/>
-              </a:rPr>
-              <a:t> </a:t>
-            </a:r>
-            <a:r>
-              <a:rPr lang="nl-NL" err="1">
-                <a:cs typeface="Calibri"/>
-              </a:rPr>
-              <a:t>can</a:t>
-            </a:r>
-            <a:r>
-              <a:rPr lang="nl-NL">
-                <a:cs typeface="Calibri"/>
-              </a:rPr>
-              <a:t> </a:t>
-            </a:r>
-            <a:r>
-              <a:rPr lang="nl-NL" err="1">
-                <a:cs typeface="Calibri"/>
-              </a:rPr>
-              <a:t>acquire</a:t>
-            </a:r>
-            <a:r>
-              <a:rPr lang="nl-NL">
-                <a:cs typeface="Calibri"/>
-              </a:rPr>
-              <a:t> Personal Data </a:t>
-            </a:r>
-            <a:r>
-              <a:rPr lang="nl-NL" err="1">
-                <a:cs typeface="Calibri"/>
-              </a:rPr>
-              <a:t>from</a:t>
-            </a:r>
-            <a:r>
-              <a:rPr lang="nl-NL">
-                <a:cs typeface="Calibri"/>
-              </a:rPr>
-              <a:t> a Data Provider via a </a:t>
-            </a:r>
-            <a:r>
-              <a:rPr lang="nl-NL" err="1">
-                <a:cs typeface="Calibri"/>
-              </a:rPr>
-              <a:t>Relying</a:t>
-            </a:r>
-            <a:r>
-              <a:rPr lang="nl-NL">
-                <a:cs typeface="Calibri"/>
-              </a:rPr>
-              <a:t> Party.</a:t>
-            </a:r>
-          </a:p>
-          <a:p>
-            <a:r>
-              <a:rPr lang="nl-NL">
-                <a:cs typeface="Calibri"/>
-              </a:rPr>
-              <a:t>The </a:t>
-            </a:r>
-            <a:r>
-              <a:rPr lang="nl-NL" err="1">
-                <a:cs typeface="Calibri"/>
-              </a:rPr>
-              <a:t>Relying</a:t>
-            </a:r>
-            <a:r>
-              <a:rPr lang="nl-NL">
-                <a:cs typeface="Calibri"/>
-              </a:rPr>
-              <a:t> Party </a:t>
-            </a:r>
-            <a:r>
-              <a:rPr lang="nl-NL" err="1">
-                <a:cs typeface="Calibri"/>
-              </a:rPr>
-              <a:t>receives</a:t>
-            </a:r>
-            <a:r>
-              <a:rPr lang="nl-NL">
-                <a:cs typeface="Calibri"/>
-              </a:rPr>
-              <a:t> </a:t>
-            </a:r>
-            <a:r>
-              <a:rPr lang="nl-NL" err="1">
-                <a:cs typeface="Calibri"/>
-              </a:rPr>
-              <a:t>the</a:t>
-            </a:r>
-            <a:r>
-              <a:rPr lang="nl-NL">
-                <a:cs typeface="Calibri"/>
-              </a:rPr>
-              <a:t> Personal Data as-is. </a:t>
-            </a:r>
+                <a:ea typeface="+mj-lt"/>
+                <a:cs typeface="+mj-lt"/>
+              </a:rPr>
+              <a:t>Backend enriches Personal Data</a:t>
+            </a:r>
+            <a:endParaRPr lang="en-US">
+              <a:ea typeface="+mj-lt"/>
+              <a:cs typeface="+mj-lt"/>
+            </a:endParaRPr>
           </a:p>
         </p:txBody>
       </p:sp>
@@ -6920,8 +5969,8 @@
           <p:nvPr/>
         </p:nvSpPr>
         <p:spPr>
-          <a:xfrm rot="-2820000">
-            <a:off x="3553184" y="3028410"/>
+          <a:xfrm rot="18780000">
+            <a:off x="3543891" y="3074873"/>
             <a:ext cx="301924" cy="431320"/>
           </a:xfrm>
           <a:prstGeom prst="blockArc">
@@ -6954,6 +6003,211 @@
                 <a:schemeClr val="tx1"/>
               </a:solidFill>
             </a:endParaRPr>
+          </a:p>
+        </p:txBody>
+      </p:sp>
+      <p:sp>
+        <p:nvSpPr>
+          <p:cNvPr id="5" name="Arrow: Right 4">
+            <a:extLst>
+              <a:ext uri="{FF2B5EF4-FFF2-40B4-BE49-F238E27FC236}">
+                <a16:creationId xmlns:a16="http://schemas.microsoft.com/office/drawing/2014/main" id="{0FF5533E-C640-4D4A-9491-3629E4388BF4}"/>
+              </a:ext>
+            </a:extLst>
+          </p:cNvPr>
+          <p:cNvSpPr/>
+          <p:nvPr/>
+        </p:nvSpPr>
+        <p:spPr>
+          <a:xfrm rot="16200000">
+            <a:off x="711305" y="4818511"/>
+            <a:ext cx="1035169" cy="345058"/>
+          </a:xfrm>
+          <a:prstGeom prst="rightArrow">
+            <a:avLst/>
+          </a:prstGeom>
+          <a:solidFill>
+            <a:srgbClr val="00B0F0"/>
+          </a:solidFill>
+        </p:spPr>
+        <p:style>
+          <a:lnRef idx="2">
+            <a:schemeClr val="accent1">
+              <a:shade val="50000"/>
+            </a:schemeClr>
+          </a:lnRef>
+          <a:fillRef idx="1">
+            <a:schemeClr val="accent1"/>
+          </a:fillRef>
+          <a:effectRef idx="0">
+            <a:schemeClr val="accent1"/>
+          </a:effectRef>
+          <a:fontRef idx="minor">
+            <a:schemeClr val="lt1"/>
+          </a:fontRef>
+        </p:style>
+        <p:txBody>
+          <a:bodyPr rtlCol="0" anchor="ctr"/>
+          <a:lstStyle/>
+          <a:p>
+            <a:pPr algn="ctr"/>
+            <a:endParaRPr lang="nl-NL">
+              <a:cs typeface="Calibri"/>
+            </a:endParaRPr>
+          </a:p>
+        </p:txBody>
+      </p:sp>
+      <p:sp>
+        <p:nvSpPr>
+          <p:cNvPr id="7" name="Frame 6">
+            <a:extLst>
+              <a:ext uri="{FF2B5EF4-FFF2-40B4-BE49-F238E27FC236}">
+                <a16:creationId xmlns:a16="http://schemas.microsoft.com/office/drawing/2014/main" id="{981EA4FA-3ADC-47F9-8209-7A754BFE1459}"/>
+              </a:ext>
+            </a:extLst>
+          </p:cNvPr>
+          <p:cNvSpPr/>
+          <p:nvPr/>
+        </p:nvSpPr>
+        <p:spPr>
+          <a:xfrm>
+            <a:off x="649856" y="4927120"/>
+            <a:ext cx="359433" cy="301923"/>
+          </a:xfrm>
+          <a:prstGeom prst="frame">
+            <a:avLst/>
+          </a:prstGeom>
+        </p:spPr>
+        <p:style>
+          <a:lnRef idx="2">
+            <a:schemeClr val="accent1">
+              <a:shade val="50000"/>
+            </a:schemeClr>
+          </a:lnRef>
+          <a:fillRef idx="1">
+            <a:schemeClr val="accent1"/>
+          </a:fillRef>
+          <a:effectRef idx="0">
+            <a:schemeClr val="accent1"/>
+          </a:effectRef>
+          <a:fontRef idx="minor">
+            <a:schemeClr val="lt1"/>
+          </a:fontRef>
+        </p:style>
+        <p:txBody>
+          <a:bodyPr rtlCol="0" anchor="ctr"/>
+          <a:lstStyle/>
+          <a:p>
+            <a:pPr algn="ctr"/>
+            <a:endParaRPr lang="nl-NL">
+              <a:solidFill>
+                <a:schemeClr val="tx1"/>
+              </a:solidFill>
+            </a:endParaRPr>
+          </a:p>
+        </p:txBody>
+      </p:sp>
+      <p:sp>
+        <p:nvSpPr>
+          <p:cNvPr id="9" name="Block Arc 8">
+            <a:extLst>
+              <a:ext uri="{FF2B5EF4-FFF2-40B4-BE49-F238E27FC236}">
+                <a16:creationId xmlns:a16="http://schemas.microsoft.com/office/drawing/2014/main" id="{C0CEE7E9-6DAB-4EFB-B269-E05C3D0D2B93}"/>
+              </a:ext>
+            </a:extLst>
+          </p:cNvPr>
+          <p:cNvSpPr/>
+          <p:nvPr/>
+        </p:nvSpPr>
+        <p:spPr>
+          <a:xfrm rot="-2280000">
+            <a:off x="677712" y="4681805"/>
+            <a:ext cx="301924" cy="431320"/>
+          </a:xfrm>
+          <a:prstGeom prst="blockArc">
+            <a:avLst/>
+          </a:prstGeom>
+        </p:spPr>
+        <p:style>
+          <a:lnRef idx="2">
+            <a:schemeClr val="accent1">
+              <a:shade val="50000"/>
+            </a:schemeClr>
+          </a:lnRef>
+          <a:fillRef idx="1">
+            <a:schemeClr val="accent1"/>
+          </a:fillRef>
+          <a:effectRef idx="0">
+            <a:schemeClr val="accent1"/>
+          </a:effectRef>
+          <a:fontRef idx="minor">
+            <a:schemeClr val="lt1"/>
+          </a:fontRef>
+        </p:style>
+        <p:txBody>
+          <a:bodyPr rtlCol="0" anchor="ctr"/>
+          <a:lstStyle/>
+          <a:p>
+            <a:pPr algn="ctr"/>
+            <a:endParaRPr lang="nl-NL">
+              <a:solidFill>
+                <a:schemeClr val="tx1"/>
+              </a:solidFill>
+            </a:endParaRPr>
+          </a:p>
+        </p:txBody>
+      </p:sp>
+      <p:sp>
+        <p:nvSpPr>
+          <p:cNvPr id="11" name="Star: 5 Points 10">
+            <a:extLst>
+              <a:ext uri="{FF2B5EF4-FFF2-40B4-BE49-F238E27FC236}">
+                <a16:creationId xmlns:a16="http://schemas.microsoft.com/office/drawing/2014/main" id="{7997B96C-AE20-4A83-B92A-F9AFEB377AFB}"/>
+              </a:ext>
+            </a:extLst>
+          </p:cNvPr>
+          <p:cNvSpPr/>
+          <p:nvPr/>
+        </p:nvSpPr>
+        <p:spPr>
+          <a:xfrm rot="240000">
+            <a:off x="1429215" y="2953215"/>
+            <a:ext cx="1012901" cy="780585"/>
+          </a:xfrm>
+          <a:prstGeom prst="star5">
+            <a:avLst/>
+          </a:prstGeom>
+          <a:solidFill>
+            <a:srgbClr val="FFC000"/>
+          </a:solidFill>
+          <a:ln>
+            <a:solidFill>
+              <a:srgbClr val="FFC000"/>
+            </a:solidFill>
+          </a:ln>
+        </p:spPr>
+        <p:style>
+          <a:lnRef idx="2">
+            <a:schemeClr val="accent1">
+              <a:shade val="50000"/>
+            </a:schemeClr>
+          </a:lnRef>
+          <a:fillRef idx="1">
+            <a:schemeClr val="accent1"/>
+          </a:fillRef>
+          <a:effectRef idx="0">
+            <a:schemeClr val="accent1"/>
+          </a:effectRef>
+          <a:fontRef idx="minor">
+            <a:schemeClr val="lt1"/>
+          </a:fontRef>
+        </p:style>
+        <p:txBody>
+          <a:bodyPr rtlCol="0" anchor="ctr"/>
+          <a:lstStyle/>
+          <a:p>
+            <a:pPr algn="ctr"/>
+            <a:endParaRPr lang="nl-NL"/>
           </a:p>
         </p:txBody>
       </p:sp>
@@ -6989,10 +6243,248 @@
       </p:grpSpPr>
       <p:sp>
         <p:nvSpPr>
+          <p:cNvPr id="5" name="Arrow: Right 4">
+            <a:extLst>
+              <a:ext uri="{FF2B5EF4-FFF2-40B4-BE49-F238E27FC236}">
+                <a16:creationId xmlns:a16="http://schemas.microsoft.com/office/drawing/2014/main" id="{0FF5533E-C640-4D4A-9491-3629E4388BF4}"/>
+              </a:ext>
+            </a:extLst>
+          </p:cNvPr>
+          <p:cNvSpPr/>
+          <p:nvPr/>
+        </p:nvSpPr>
+        <p:spPr>
+          <a:xfrm rot="16200000">
+            <a:off x="711305" y="4818511"/>
+            <a:ext cx="1035169" cy="345058"/>
+          </a:xfrm>
+          <a:prstGeom prst="rightArrow">
+            <a:avLst/>
+          </a:prstGeom>
+          <a:solidFill>
+            <a:srgbClr val="00B0F0"/>
+          </a:solidFill>
+        </p:spPr>
+        <p:style>
+          <a:lnRef idx="2">
+            <a:schemeClr val="accent1">
+              <a:shade val="50000"/>
+            </a:schemeClr>
+          </a:lnRef>
+          <a:fillRef idx="1">
+            <a:schemeClr val="accent1"/>
+          </a:fillRef>
+          <a:effectRef idx="0">
+            <a:schemeClr val="accent1"/>
+          </a:effectRef>
+          <a:fontRef idx="minor">
+            <a:schemeClr val="lt1"/>
+          </a:fontRef>
+        </p:style>
+        <p:txBody>
+          <a:bodyPr rtlCol="0" anchor="ctr"/>
+          <a:lstStyle/>
+          <a:p>
+            <a:pPr algn="ctr"/>
+            <a:endParaRPr lang="nl-NL">
+              <a:cs typeface="Calibri"/>
+            </a:endParaRPr>
+          </a:p>
+        </p:txBody>
+      </p:sp>
+      <p:sp>
+        <p:nvSpPr>
+          <p:cNvPr id="30" name="Cloud 29">
+            <a:extLst>
+              <a:ext uri="{FF2B5EF4-FFF2-40B4-BE49-F238E27FC236}">
+                <a16:creationId xmlns:a16="http://schemas.microsoft.com/office/drawing/2014/main" id="{2060B753-3436-47F0-8FFA-8499B541F914}"/>
+              </a:ext>
+            </a:extLst>
+          </p:cNvPr>
+          <p:cNvSpPr/>
+          <p:nvPr/>
+        </p:nvSpPr>
+        <p:spPr>
+          <a:xfrm>
+            <a:off x="202581" y="4514385"/>
+            <a:ext cx="1338143" cy="994316"/>
+          </a:xfrm>
+          <a:prstGeom prst="cloud">
+            <a:avLst/>
+          </a:prstGeom>
+          <a:solidFill>
+            <a:schemeClr val="accent4">
+              <a:lumMod val="40000"/>
+              <a:lumOff val="60000"/>
+            </a:schemeClr>
+          </a:solidFill>
+          <a:ln>
+            <a:noFill/>
+          </a:ln>
+        </p:spPr>
+        <p:style>
+          <a:lnRef idx="2">
+            <a:schemeClr val="accent1">
+              <a:shade val="50000"/>
+            </a:schemeClr>
+          </a:lnRef>
+          <a:fillRef idx="1">
+            <a:schemeClr val="accent1"/>
+          </a:fillRef>
+          <a:effectRef idx="0">
+            <a:schemeClr val="accent1"/>
+          </a:effectRef>
+          <a:fontRef idx="minor">
+            <a:schemeClr val="lt1"/>
+          </a:fontRef>
+        </p:style>
+        <p:txBody>
+          <a:bodyPr rtlCol="0" anchor="ctr"/>
+          <a:lstStyle/>
+          <a:p>
+            <a:pPr algn="r"/>
+            <a:r>
+              <a:rPr lang="nl-NL">
+                <a:solidFill>
+                  <a:schemeClr val="accent4">
+                    <a:lumMod val="75000"/>
+                  </a:schemeClr>
+                </a:solidFill>
+                <a:cs typeface="Calibri"/>
+              </a:rPr>
+              <a:t>     ?</a:t>
+            </a:r>
+            <a:endParaRPr lang="nl-NL"/>
+          </a:p>
+        </p:txBody>
+      </p:sp>
+      <p:sp>
+        <p:nvSpPr>
+          <p:cNvPr id="42" name="Arrow: Right 41">
+            <a:extLst>
+              <a:ext uri="{FF2B5EF4-FFF2-40B4-BE49-F238E27FC236}">
+                <a16:creationId xmlns:a16="http://schemas.microsoft.com/office/drawing/2014/main" id="{F5FBEA59-614E-4A55-BD67-9983964766EE}"/>
+              </a:ext>
+            </a:extLst>
+          </p:cNvPr>
+          <p:cNvSpPr/>
+          <p:nvPr/>
+        </p:nvSpPr>
+        <p:spPr>
+          <a:xfrm>
+            <a:off x="2300004" y="3589250"/>
+            <a:ext cx="2918603" cy="690112"/>
+          </a:xfrm>
+          <a:prstGeom prst="rightArrow">
+            <a:avLst/>
+          </a:prstGeom>
+          <a:solidFill>
+            <a:srgbClr val="00B0F0"/>
+          </a:solidFill>
+        </p:spPr>
+        <p:style>
+          <a:lnRef idx="2">
+            <a:schemeClr val="accent1">
+              <a:shade val="50000"/>
+            </a:schemeClr>
+          </a:lnRef>
+          <a:fillRef idx="1">
+            <a:schemeClr val="accent1"/>
+          </a:fillRef>
+          <a:effectRef idx="0">
+            <a:schemeClr val="accent1"/>
+          </a:effectRef>
+          <a:fontRef idx="minor">
+            <a:schemeClr val="lt1"/>
+          </a:fontRef>
+        </p:style>
+        <p:txBody>
+          <a:bodyPr rtlCol="0" anchor="ctr"/>
+          <a:lstStyle/>
+          <a:p>
+            <a:pPr algn="ctr"/>
+            <a:r>
+              <a:rPr lang="nl-NL">
+                <a:cs typeface="Calibri"/>
+              </a:rPr>
+              <a:t>Personal Data</a:t>
+            </a:r>
+            <a:endParaRPr lang="nl-NL"/>
+          </a:p>
+        </p:txBody>
+      </p:sp>
+      <p:sp>
+        <p:nvSpPr>
+          <p:cNvPr id="3" name="Cloud 2">
+            <a:extLst>
+              <a:ext uri="{FF2B5EF4-FFF2-40B4-BE49-F238E27FC236}">
+                <a16:creationId xmlns:a16="http://schemas.microsoft.com/office/drawing/2014/main" id="{1459BAE5-C60F-4DEB-8E10-C9EEF7BD2CA4}"/>
+              </a:ext>
+            </a:extLst>
+          </p:cNvPr>
+          <p:cNvSpPr/>
+          <p:nvPr/>
+        </p:nvSpPr>
+        <p:spPr>
+          <a:xfrm>
+            <a:off x="3092606" y="2897459"/>
+            <a:ext cx="1338143" cy="994316"/>
+          </a:xfrm>
+          <a:prstGeom prst="cloud">
+            <a:avLst/>
+          </a:prstGeom>
+          <a:solidFill>
+            <a:schemeClr val="accent4">
+              <a:lumMod val="40000"/>
+              <a:lumOff val="60000"/>
+            </a:schemeClr>
+          </a:solidFill>
+          <a:ln>
+            <a:noFill/>
+          </a:ln>
+        </p:spPr>
+        <p:style>
+          <a:lnRef idx="2">
+            <a:schemeClr val="accent1">
+              <a:shade val="50000"/>
+            </a:schemeClr>
+          </a:lnRef>
+          <a:fillRef idx="1">
+            <a:schemeClr val="accent1"/>
+          </a:fillRef>
+          <a:effectRef idx="0">
+            <a:schemeClr val="accent1"/>
+          </a:effectRef>
+          <a:fontRef idx="minor">
+            <a:schemeClr val="lt1"/>
+          </a:fontRef>
+        </p:style>
+        <p:txBody>
+          <a:bodyPr rtlCol="0" anchor="ctr"/>
+          <a:lstStyle/>
+          <a:p>
+            <a:pPr algn="r"/>
+            <a:r>
+              <a:rPr lang="nl-NL">
+                <a:solidFill>
+                  <a:schemeClr val="accent4">
+                    <a:lumMod val="75000"/>
+                  </a:schemeClr>
+                </a:solidFill>
+                <a:cs typeface="Calibri"/>
+              </a:rPr>
+              <a:t>     ?</a:t>
+            </a:r>
+            <a:endParaRPr lang="nl-NL"/>
+          </a:p>
+        </p:txBody>
+      </p:sp>
+      <p:sp>
+        <p:nvSpPr>
           <p:cNvPr id="2" name="Title 1">
             <a:extLst>
               <a:ext uri="{FF2B5EF4-FFF2-40B4-BE49-F238E27FC236}">
-                <a16:creationId xmlns:a16="http://schemas.microsoft.com/office/drawing/2014/main" id="{BFE6C493-AD4F-4293-B4BD-CE1C0F343C0D}"/>
+                <a16:creationId xmlns:a16="http://schemas.microsoft.com/office/drawing/2014/main" id="{EEFFB041-63B4-4752-B1FA-200F3532C9D0}"/>
               </a:ext>
             </a:extLst>
           </p:cNvPr>
@@ -7008,173 +6500,57 @@
           <a:bodyPr/>
           <a:lstStyle/>
           <a:p>
-            <a:r>
-              <a:rPr lang="nl-NL" err="1">
+            <a:pPr>
+              <a:spcBef>
+                <a:spcPts val="1000"/>
+              </a:spcBef>
+            </a:pPr>
+            <a:r>
+              <a:rPr lang="nl-NL" dirty="0">
                 <a:cs typeface="Calibri Light"/>
               </a:rPr>
-              <a:t>Request</a:t>
-            </a:r>
-            <a:endParaRPr lang="nl-NL" err="1"/>
-          </a:p>
-        </p:txBody>
-      </p:sp>
-      <p:sp>
-        <p:nvSpPr>
-          <p:cNvPr id="3" name="Content Placeholder 2">
-            <a:extLst>
-              <a:ext uri="{FF2B5EF4-FFF2-40B4-BE49-F238E27FC236}">
-                <a16:creationId xmlns:a16="http://schemas.microsoft.com/office/drawing/2014/main" id="{1254824B-0798-4731-8364-896AD6A47E0B}"/>
-              </a:ext>
-            </a:extLst>
-          </p:cNvPr>
-          <p:cNvSpPr>
-            <a:spLocks noGrp="1"/>
-          </p:cNvSpPr>
-          <p:nvPr>
-            <p:ph idx="1"/>
-          </p:nvPr>
+              <a:t>Financial Passport: </a:t>
+            </a:r>
+            <a:br>
+              <a:rPr lang="nl-NL" dirty="0">
+                <a:ea typeface="+mj-lt"/>
+                <a:cs typeface="+mj-lt"/>
+              </a:rPr>
+            </a:br>
+            <a:r>
+              <a:rPr lang="nl-NL">
+                <a:ea typeface="+mj-lt"/>
+                <a:cs typeface="+mj-lt"/>
+              </a:rPr>
+              <a:t>                   App enriches Personal Data</a:t>
+            </a:r>
+            <a:endParaRPr lang="en-US">
+              <a:ea typeface="+mj-lt"/>
+              <a:cs typeface="+mj-lt"/>
+            </a:endParaRPr>
+          </a:p>
+        </p:txBody>
+      </p:sp>
+      <p:sp>
+        <p:nvSpPr>
+          <p:cNvPr id="4" name="Rectangle: Rounded Corners 3">
+            <a:extLst>
+              <a:ext uri="{FF2B5EF4-FFF2-40B4-BE49-F238E27FC236}">
+                <a16:creationId xmlns:a16="http://schemas.microsoft.com/office/drawing/2014/main" id="{6F7B979C-F36E-4633-9FA4-963174B1BED6}"/>
+              </a:ext>
+            </a:extLst>
+          </p:cNvPr>
+          <p:cNvSpPr/>
+          <p:nvPr/>
         </p:nvSpPr>
         <p:spPr>
           <a:xfrm>
-            <a:off x="3296728" y="316002"/>
-            <a:ext cx="8589035" cy="4351338"/>
-          </a:xfrm>
-        </p:spPr>
-        <p:txBody>
-          <a:bodyPr vert="horz" lIns="91440" tIns="45720" rIns="91440" bIns="45720" rtlCol="0" anchor="t">
-            <a:normAutofit/>
-          </a:bodyPr>
-          <a:lstStyle/>
-          <a:p>
-            <a:r>
-              <a:rPr lang="nl-NL">
-                <a:cs typeface="Calibri"/>
-              </a:rPr>
-              <a:t>As a </a:t>
-            </a:r>
-            <a:r>
-              <a:rPr lang="nl-NL" err="1">
-                <a:cs typeface="Calibri"/>
-              </a:rPr>
-              <a:t>Relying</a:t>
-            </a:r>
-            <a:r>
-              <a:rPr lang="nl-NL">
-                <a:cs typeface="Calibri"/>
-              </a:rPr>
-              <a:t> Party, I do </a:t>
-            </a:r>
-            <a:r>
-              <a:rPr lang="nl-NL" err="1">
-                <a:cs typeface="Calibri"/>
-              </a:rPr>
-              <a:t>not</a:t>
-            </a:r>
-            <a:r>
-              <a:rPr lang="nl-NL">
-                <a:cs typeface="Calibri"/>
-              </a:rPr>
-              <a:t> want </a:t>
-            </a:r>
-            <a:r>
-              <a:rPr lang="nl-NL" err="1">
-                <a:cs typeface="Calibri"/>
-              </a:rPr>
-              <a:t>to</a:t>
-            </a:r>
-            <a:r>
-              <a:rPr lang="nl-NL">
-                <a:cs typeface="Calibri"/>
-              </a:rPr>
-              <a:t> </a:t>
-            </a:r>
-            <a:r>
-              <a:rPr lang="nl-NL" err="1">
-                <a:cs typeface="Calibri"/>
-              </a:rPr>
-              <a:t>process</a:t>
-            </a:r>
-            <a:r>
-              <a:rPr lang="nl-NL">
-                <a:cs typeface="Calibri"/>
-              </a:rPr>
-              <a:t> </a:t>
-            </a:r>
-            <a:r>
-              <a:rPr lang="nl-NL" err="1">
-                <a:cs typeface="Calibri"/>
-              </a:rPr>
-              <a:t>unencrypted</a:t>
-            </a:r>
-            <a:r>
-              <a:rPr lang="nl-NL">
-                <a:cs typeface="Calibri"/>
-              </a:rPr>
-              <a:t> Personal Data in order </a:t>
-            </a:r>
-            <a:r>
-              <a:rPr lang="nl-NL" err="1">
-                <a:cs typeface="Calibri"/>
-              </a:rPr>
-              <a:t>to</a:t>
-            </a:r>
-            <a:r>
-              <a:rPr lang="nl-NL">
-                <a:cs typeface="Calibri"/>
-              </a:rPr>
-              <a:t> </a:t>
-            </a:r>
-            <a:r>
-              <a:rPr lang="nl-NL" err="1">
-                <a:cs typeface="Calibri"/>
-              </a:rPr>
-              <a:t>minimize</a:t>
-            </a:r>
-            <a:r>
-              <a:rPr lang="nl-NL">
-                <a:cs typeface="Calibri"/>
-              </a:rPr>
-              <a:t> privacy </a:t>
-            </a:r>
-            <a:r>
-              <a:rPr lang="nl-NL" err="1">
-                <a:cs typeface="Calibri"/>
-              </a:rPr>
-              <a:t>risks</a:t>
-            </a:r>
-            <a:r>
-              <a:rPr lang="nl-NL">
-                <a:cs typeface="Calibri"/>
-              </a:rPr>
-              <a:t>. </a:t>
-            </a:r>
-            <a:endParaRPr lang="nl-NL"/>
-          </a:p>
-        </p:txBody>
-      </p:sp>
-      <p:sp>
-        <p:nvSpPr>
-          <p:cNvPr id="5" name="Arrow: Right 4">
-            <a:extLst>
-              <a:ext uri="{FF2B5EF4-FFF2-40B4-BE49-F238E27FC236}">
-                <a16:creationId xmlns:a16="http://schemas.microsoft.com/office/drawing/2014/main" id="{12B18297-3378-4DB3-B9D1-669BD355F2C1}"/>
-              </a:ext>
-            </a:extLst>
-          </p:cNvPr>
-          <p:cNvSpPr/>
-          <p:nvPr/>
-        </p:nvSpPr>
-        <p:spPr>
-          <a:xfrm>
-            <a:off x="2300004" y="3589250"/>
-            <a:ext cx="2918603" cy="690112"/>
-          </a:xfrm>
-          <a:prstGeom prst="rightArrow">
-            <a:avLst/>
-          </a:prstGeom>
-          <a:solidFill>
-            <a:srgbClr val="00B0F0"/>
-          </a:solidFill>
+            <a:off x="5538159" y="3590027"/>
+            <a:ext cx="920150" cy="690113"/>
+          </a:xfrm>
+          <a:prstGeom prst="roundRect">
+            <a:avLst/>
+          </a:prstGeom>
         </p:spPr>
         <p:style>
           <a:lnRef idx="2">
@@ -7201,7 +6577,7 @@
               <a:rPr lang="nl-NL">
                 <a:cs typeface="Calibri"/>
               </a:rPr>
-              <a:t>Personal Data</a:t>
+              <a:t>app</a:t>
             </a:r>
             <a:endParaRPr lang="nl-NL"/>
           </a:p>
@@ -7209,10 +6585,10 @@
       </p:sp>
       <p:sp>
         <p:nvSpPr>
-          <p:cNvPr id="7" name="Rectangle: Rounded Corners 6">
-            <a:extLst>
-              <a:ext uri="{FF2B5EF4-FFF2-40B4-BE49-F238E27FC236}">
-                <a16:creationId xmlns:a16="http://schemas.microsoft.com/office/drawing/2014/main" id="{A265ADF6-EB70-4FA0-97AA-FC46EA7580B0}"/>
+          <p:cNvPr id="6" name="Rectangle 5">
+            <a:extLst>
+              <a:ext uri="{FF2B5EF4-FFF2-40B4-BE49-F238E27FC236}">
+                <a16:creationId xmlns:a16="http://schemas.microsoft.com/office/drawing/2014/main" id="{E719695D-18F1-427E-92B2-DEDE85954C38}"/>
               </a:ext>
             </a:extLst>
           </p:cNvPr>
@@ -7221,10 +6597,10 @@
         </p:nvSpPr>
         <p:spPr>
           <a:xfrm>
-            <a:off x="5538159" y="3590027"/>
-            <a:ext cx="920150" cy="690113"/>
-          </a:xfrm>
-          <a:prstGeom prst="roundRect">
+            <a:off x="4962166" y="1878222"/>
+            <a:ext cx="2070338" cy="920150"/>
+          </a:xfrm>
+          <a:prstGeom prst="rect">
             <a:avLst/>
           </a:prstGeom>
         </p:spPr>
@@ -7250,21 +6626,21 @@
           <a:p>
             <a:pPr algn="ctr"/>
             <a:r>
-              <a:rPr lang="nl-NL">
+              <a:rPr lang="nl-NL" err="1">
                 <a:cs typeface="Calibri"/>
               </a:rPr>
-              <a:t>app</a:t>
-            </a:r>
-            <a:endParaRPr lang="nl-NL"/>
-          </a:p>
-        </p:txBody>
-      </p:sp>
-      <p:sp>
-        <p:nvSpPr>
-          <p:cNvPr id="9" name="Rectangle 8">
-            <a:extLst>
-              <a:ext uri="{FF2B5EF4-FFF2-40B4-BE49-F238E27FC236}">
-                <a16:creationId xmlns:a16="http://schemas.microsoft.com/office/drawing/2014/main" id="{A62CF2C8-5BCB-4B16-9280-AD7AF3279620}"/>
+              <a:t>Individual</a:t>
+            </a:r>
+            <a:endParaRPr lang="nl-NL" err="1"/>
+          </a:p>
+        </p:txBody>
+      </p:sp>
+      <p:sp>
+        <p:nvSpPr>
+          <p:cNvPr id="8" name="Rectangle 7">
+            <a:extLst>
+              <a:ext uri="{FF2B5EF4-FFF2-40B4-BE49-F238E27FC236}">
+                <a16:creationId xmlns:a16="http://schemas.microsoft.com/office/drawing/2014/main" id="{916878B0-9878-42A7-8DE9-4C148EA33003}"/>
               </a:ext>
             </a:extLst>
           </p:cNvPr>
@@ -7273,7 +6649,7 @@
         </p:nvSpPr>
         <p:spPr>
           <a:xfrm>
-            <a:off x="4962166" y="1878222"/>
+            <a:off x="490806" y="1863843"/>
             <a:ext cx="2070338" cy="920150"/>
           </a:xfrm>
           <a:prstGeom prst="rect">
@@ -7305,18 +6681,24 @@
               <a:rPr lang="nl-NL" err="1">
                 <a:cs typeface="Calibri"/>
               </a:rPr>
-              <a:t>Individual</a:t>
-            </a:r>
-            <a:endParaRPr lang="nl-NL" err="1"/>
-          </a:p>
-        </p:txBody>
-      </p:sp>
-      <p:sp>
-        <p:nvSpPr>
-          <p:cNvPr id="11" name="Rectangle 10">
-            <a:extLst>
-              <a:ext uri="{FF2B5EF4-FFF2-40B4-BE49-F238E27FC236}">
-                <a16:creationId xmlns:a16="http://schemas.microsoft.com/office/drawing/2014/main" id="{1A6DB321-4E46-40E4-9009-6CD3A3B713A0}"/>
+              <a:t>Relying</a:t>
+            </a:r>
+            <a:r>
+              <a:rPr lang="nl-NL">
+                <a:cs typeface="Calibri"/>
+              </a:rPr>
+              <a:t> Party</a:t>
+            </a:r>
+            <a:endParaRPr lang="nl-NL"/>
+          </a:p>
+        </p:txBody>
+      </p:sp>
+      <p:sp>
+        <p:nvSpPr>
+          <p:cNvPr id="10" name="Rectangle 9">
+            <a:extLst>
+              <a:ext uri="{FF2B5EF4-FFF2-40B4-BE49-F238E27FC236}">
+                <a16:creationId xmlns:a16="http://schemas.microsoft.com/office/drawing/2014/main" id="{F5A10C9E-0BB7-45B6-B065-846479345FAE}"/>
               </a:ext>
             </a:extLst>
           </p:cNvPr>
@@ -7325,7 +6707,7 @@
         </p:nvSpPr>
         <p:spPr>
           <a:xfrm>
-            <a:off x="490806" y="1863843"/>
+            <a:off x="9519788" y="1878221"/>
             <a:ext cx="2070338" cy="920150"/>
           </a:xfrm>
           <a:prstGeom prst="rect">
@@ -7354,27 +6736,21 @@
           <a:p>
             <a:pPr algn="ctr"/>
             <a:r>
-              <a:rPr lang="nl-NL" err="1">
-                <a:cs typeface="Calibri"/>
-              </a:rPr>
-              <a:t>Relying</a:t>
-            </a:r>
-            <a:r>
               <a:rPr lang="nl-NL">
                 <a:cs typeface="Calibri"/>
               </a:rPr>
-              <a:t> Party</a:t>
-            </a:r>
-            <a:endParaRPr lang="nl-NL"/>
-          </a:p>
-        </p:txBody>
-      </p:sp>
-      <p:sp>
-        <p:nvSpPr>
-          <p:cNvPr id="13" name="Rectangle 12">
-            <a:extLst>
-              <a:ext uri="{FF2B5EF4-FFF2-40B4-BE49-F238E27FC236}">
-                <a16:creationId xmlns:a16="http://schemas.microsoft.com/office/drawing/2014/main" id="{B16E5F16-7E1F-4DE2-9375-7AAEBC70D42B}"/>
+              <a:t>Data Provider</a:t>
+            </a:r>
+            <a:endParaRPr lang="nl-NL" err="1"/>
+          </a:p>
+        </p:txBody>
+      </p:sp>
+      <p:sp>
+        <p:nvSpPr>
+          <p:cNvPr id="12" name="Rectangle: Rounded Corners 11">
+            <a:extLst>
+              <a:ext uri="{FF2B5EF4-FFF2-40B4-BE49-F238E27FC236}">
+                <a16:creationId xmlns:a16="http://schemas.microsoft.com/office/drawing/2014/main" id="{B205402D-7857-4378-B96C-83C546FD48C3}"/>
               </a:ext>
             </a:extLst>
           </p:cNvPr>
@@ -7383,10 +6759,10 @@
         </p:nvSpPr>
         <p:spPr>
           <a:xfrm>
-            <a:off x="9519788" y="1878221"/>
-            <a:ext cx="2070338" cy="920150"/>
-          </a:xfrm>
-          <a:prstGeom prst="rect">
+            <a:off x="951782" y="3460631"/>
+            <a:ext cx="1121432" cy="920150"/>
+          </a:xfrm>
+          <a:prstGeom prst="roundRect">
             <a:avLst/>
           </a:prstGeom>
         </p:spPr>
@@ -7415,18 +6791,18 @@
               <a:rPr lang="nl-NL">
                 <a:cs typeface="Calibri"/>
               </a:rPr>
-              <a:t>Data Provider</a:t>
-            </a:r>
-            <a:endParaRPr lang="nl-NL" err="1"/>
-          </a:p>
-        </p:txBody>
-      </p:sp>
-      <p:sp>
-        <p:nvSpPr>
-          <p:cNvPr id="15" name="Rectangle: Rounded Corners 14">
-            <a:extLst>
-              <a:ext uri="{FF2B5EF4-FFF2-40B4-BE49-F238E27FC236}">
-                <a16:creationId xmlns:a16="http://schemas.microsoft.com/office/drawing/2014/main" id="{84CF2148-D1BF-48DB-B561-E9CF47E4CDD4}"/>
+              <a:t>RP Backend</a:t>
+            </a:r>
+            <a:endParaRPr lang="nl-NL"/>
+          </a:p>
+        </p:txBody>
+      </p:sp>
+      <p:sp>
+        <p:nvSpPr>
+          <p:cNvPr id="14" name="Rectangle: Rounded Corners 13">
+            <a:extLst>
+              <a:ext uri="{FF2B5EF4-FFF2-40B4-BE49-F238E27FC236}">
+                <a16:creationId xmlns:a16="http://schemas.microsoft.com/office/drawing/2014/main" id="{532BBED1-49EB-4239-B777-099C006FCEA4}"/>
               </a:ext>
             </a:extLst>
           </p:cNvPr>
@@ -7435,7 +6811,7 @@
         </p:nvSpPr>
         <p:spPr>
           <a:xfrm>
-            <a:off x="951782" y="3460631"/>
+            <a:off x="9995140" y="3475007"/>
             <a:ext cx="1121432" cy="920150"/>
           </a:xfrm>
           <a:prstGeom prst="roundRect">
@@ -7467,58 +6843,6 @@
               <a:rPr lang="nl-NL">
                 <a:cs typeface="Calibri"/>
               </a:rPr>
-              <a:t>RP Backend</a:t>
-            </a:r>
-            <a:endParaRPr lang="nl-NL"/>
-          </a:p>
-        </p:txBody>
-      </p:sp>
-      <p:sp>
-        <p:nvSpPr>
-          <p:cNvPr id="17" name="Rectangle: Rounded Corners 16">
-            <a:extLst>
-              <a:ext uri="{FF2B5EF4-FFF2-40B4-BE49-F238E27FC236}">
-                <a16:creationId xmlns:a16="http://schemas.microsoft.com/office/drawing/2014/main" id="{EFD11C76-1ACD-4415-A7E5-C32DC09DE62F}"/>
-              </a:ext>
-            </a:extLst>
-          </p:cNvPr>
-          <p:cNvSpPr/>
-          <p:nvPr/>
-        </p:nvSpPr>
-        <p:spPr>
-          <a:xfrm>
-            <a:off x="9995140" y="3475007"/>
-            <a:ext cx="1121432" cy="920150"/>
-          </a:xfrm>
-          <a:prstGeom prst="roundRect">
-            <a:avLst/>
-          </a:prstGeom>
-        </p:spPr>
-        <p:style>
-          <a:lnRef idx="2">
-            <a:schemeClr val="accent1">
-              <a:shade val="50000"/>
-            </a:schemeClr>
-          </a:lnRef>
-          <a:fillRef idx="1">
-            <a:schemeClr val="accent1"/>
-          </a:fillRef>
-          <a:effectRef idx="0">
-            <a:schemeClr val="accent1"/>
-          </a:effectRef>
-          <a:fontRef idx="minor">
-            <a:schemeClr val="lt1"/>
-          </a:fontRef>
-        </p:style>
-        <p:txBody>
-          <a:bodyPr rtlCol="0" anchor="ctr"/>
-          <a:lstStyle/>
-          <a:p>
-            <a:pPr algn="ctr"/>
-            <a:r>
-              <a:rPr lang="nl-NL">
-                <a:cs typeface="Calibri"/>
-              </a:rPr>
               <a:t>DP Backend</a:t>
             </a:r>
             <a:endParaRPr lang="nl-NL"/>
@@ -7527,10 +6851,10 @@
       </p:sp>
       <p:cxnSp>
         <p:nvCxnSpPr>
-          <p:cNvPr id="19" name="Straight Arrow Connector 18">
-            <a:extLst>
-              <a:ext uri="{FF2B5EF4-FFF2-40B4-BE49-F238E27FC236}">
-                <a16:creationId xmlns:a16="http://schemas.microsoft.com/office/drawing/2014/main" id="{BD8D858C-AEA0-4627-B19E-4C8BBFD074FC}"/>
+          <p:cNvPr id="16" name="Straight Arrow Connector 15">
+            <a:extLst>
+              <a:ext uri="{FF2B5EF4-FFF2-40B4-BE49-F238E27FC236}">
+                <a16:creationId xmlns:a16="http://schemas.microsoft.com/office/drawing/2014/main" id="{71BC3B90-D72E-489A-BE28-AAE5B457CC13}"/>
               </a:ext>
             </a:extLst>
           </p:cNvPr>
@@ -7563,10 +6887,10 @@
       </p:cxnSp>
       <p:cxnSp>
         <p:nvCxnSpPr>
-          <p:cNvPr id="21" name="Straight Arrow Connector 20">
-            <a:extLst>
-              <a:ext uri="{FF2B5EF4-FFF2-40B4-BE49-F238E27FC236}">
-                <a16:creationId xmlns:a16="http://schemas.microsoft.com/office/drawing/2014/main" id="{BE34676A-5F6B-444F-B918-B63A2A7DCB6B}"/>
+          <p:cNvPr id="18" name="Straight Arrow Connector 17">
+            <a:extLst>
+              <a:ext uri="{FF2B5EF4-FFF2-40B4-BE49-F238E27FC236}">
+                <a16:creationId xmlns:a16="http://schemas.microsoft.com/office/drawing/2014/main" id="{59A319DA-F22C-4ADC-A49F-57A70E97A79B}"/>
               </a:ext>
             </a:extLst>
           </p:cNvPr>
@@ -7601,10 +6925,10 @@
       </p:cxnSp>
       <p:cxnSp>
         <p:nvCxnSpPr>
-          <p:cNvPr id="23" name="Straight Arrow Connector 22">
-            <a:extLst>
-              <a:ext uri="{FF2B5EF4-FFF2-40B4-BE49-F238E27FC236}">
-                <a16:creationId xmlns:a16="http://schemas.microsoft.com/office/drawing/2014/main" id="{9D27FA8D-9994-4BF1-B126-231BFE093443}"/>
+          <p:cNvPr id="20" name="Straight Arrow Connector 19">
+            <a:extLst>
+              <a:ext uri="{FF2B5EF4-FFF2-40B4-BE49-F238E27FC236}">
+                <a16:creationId xmlns:a16="http://schemas.microsoft.com/office/drawing/2014/main" id="{1BFE6B9D-970D-476F-B873-E74264572F72}"/>
               </a:ext>
             </a:extLst>
           </p:cNvPr>
@@ -7639,10 +6963,10 @@
       </p:cxnSp>
       <p:cxnSp>
         <p:nvCxnSpPr>
-          <p:cNvPr id="25" name="Straight Arrow Connector 24">
-            <a:extLst>
-              <a:ext uri="{FF2B5EF4-FFF2-40B4-BE49-F238E27FC236}">
-                <a16:creationId xmlns:a16="http://schemas.microsoft.com/office/drawing/2014/main" id="{D342D65B-4566-4BEA-AB3B-22DF9431A1FA}"/>
+          <p:cNvPr id="22" name="Straight Arrow Connector 21">
+            <a:extLst>
+              <a:ext uri="{FF2B5EF4-FFF2-40B4-BE49-F238E27FC236}">
+                <a16:creationId xmlns:a16="http://schemas.microsoft.com/office/drawing/2014/main" id="{D8F7CAAB-5794-4240-BC1C-D5C62081132A}"/>
               </a:ext>
             </a:extLst>
           </p:cNvPr>
@@ -7677,10 +7001,10 @@
       </p:cxnSp>
       <p:cxnSp>
         <p:nvCxnSpPr>
-          <p:cNvPr id="27" name="Straight Arrow Connector 26">
-            <a:extLst>
-              <a:ext uri="{FF2B5EF4-FFF2-40B4-BE49-F238E27FC236}">
-                <a16:creationId xmlns:a16="http://schemas.microsoft.com/office/drawing/2014/main" id="{14E396DF-C8E7-43B1-A6DE-71E11D264161}"/>
+          <p:cNvPr id="45" name="Straight Arrow Connector 44">
+            <a:extLst>
+              <a:ext uri="{FF2B5EF4-FFF2-40B4-BE49-F238E27FC236}">
+                <a16:creationId xmlns:a16="http://schemas.microsoft.com/office/drawing/2014/main" id="{D7DE1B2F-ED96-4E77-94FE-B0529582E102}"/>
               </a:ext>
             </a:extLst>
           </p:cNvPr>
@@ -7715,10 +7039,10 @@
       </p:cxnSp>
       <p:cxnSp>
         <p:nvCxnSpPr>
-          <p:cNvPr id="29" name="Straight Arrow Connector 28">
-            <a:extLst>
-              <a:ext uri="{FF2B5EF4-FFF2-40B4-BE49-F238E27FC236}">
-                <a16:creationId xmlns:a16="http://schemas.microsoft.com/office/drawing/2014/main" id="{BA67C10C-6CBB-4784-B1D2-98A4CEA6C903}"/>
+          <p:cNvPr id="47" name="Straight Arrow Connector 46">
+            <a:extLst>
+              <a:ext uri="{FF2B5EF4-FFF2-40B4-BE49-F238E27FC236}">
+                <a16:creationId xmlns:a16="http://schemas.microsoft.com/office/drawing/2014/main" id="{87E9B162-62BE-4A04-B28F-45ACF8F589E6}"/>
               </a:ext>
             </a:extLst>
           </p:cNvPr>
@@ -7753,10 +7077,10 @@
       </p:cxnSp>
       <p:cxnSp>
         <p:nvCxnSpPr>
-          <p:cNvPr id="31" name="Straight Arrow Connector 30">
-            <a:extLst>
-              <a:ext uri="{FF2B5EF4-FFF2-40B4-BE49-F238E27FC236}">
-                <a16:creationId xmlns:a16="http://schemas.microsoft.com/office/drawing/2014/main" id="{AF6AE2BC-ABB6-481D-AD13-271A763B3154}"/>
+          <p:cNvPr id="49" name="Straight Arrow Connector 48">
+            <a:extLst>
+              <a:ext uri="{FF2B5EF4-FFF2-40B4-BE49-F238E27FC236}">
+                <a16:creationId xmlns:a16="http://schemas.microsoft.com/office/drawing/2014/main" id="{5F5CA8FC-4FFA-40EB-9250-6C86945210A0}"/>
               </a:ext>
             </a:extLst>
           </p:cNvPr>
@@ -7791,10 +7115,10 @@
       </p:cxnSp>
       <p:cxnSp>
         <p:nvCxnSpPr>
-          <p:cNvPr id="33" name="Straight Arrow Connector 32">
-            <a:extLst>
-              <a:ext uri="{FF2B5EF4-FFF2-40B4-BE49-F238E27FC236}">
-                <a16:creationId xmlns:a16="http://schemas.microsoft.com/office/drawing/2014/main" id="{B29EE4C8-7B52-48CC-891A-AF4FD45D8CF7}"/>
+          <p:cNvPr id="51" name="Straight Arrow Connector 50">
+            <a:extLst>
+              <a:ext uri="{FF2B5EF4-FFF2-40B4-BE49-F238E27FC236}">
+                <a16:creationId xmlns:a16="http://schemas.microsoft.com/office/drawing/2014/main" id="{4B73A8C1-36CC-4F5B-A8F7-3F6B769A2220}"/>
               </a:ext>
             </a:extLst>
           </p:cNvPr>
@@ -7829,10 +7153,10 @@
       </p:cxnSp>
       <p:sp>
         <p:nvSpPr>
-          <p:cNvPr id="35" name="Oval 34">
-            <a:extLst>
-              <a:ext uri="{FF2B5EF4-FFF2-40B4-BE49-F238E27FC236}">
-                <a16:creationId xmlns:a16="http://schemas.microsoft.com/office/drawing/2014/main" id="{B9E76DA2-EAB4-43CE-B7AE-FAF77044EEAC}"/>
+          <p:cNvPr id="53" name="Oval 52">
+            <a:extLst>
+              <a:ext uri="{FF2B5EF4-FFF2-40B4-BE49-F238E27FC236}">
+                <a16:creationId xmlns:a16="http://schemas.microsoft.com/office/drawing/2014/main" id="{E526CB37-93B5-4CF6-B19B-173EBC79929F}"/>
               </a:ext>
             </a:extLst>
           </p:cNvPr>
@@ -7883,10 +7207,10 @@
       </p:sp>
       <p:sp>
         <p:nvSpPr>
-          <p:cNvPr id="37" name="Oval 36">
-            <a:extLst>
-              <a:ext uri="{FF2B5EF4-FFF2-40B4-BE49-F238E27FC236}">
-                <a16:creationId xmlns:a16="http://schemas.microsoft.com/office/drawing/2014/main" id="{C82DDB97-1860-42B0-AE13-4629BB2A8A99}"/>
+          <p:cNvPr id="55" name="Oval 54">
+            <a:extLst>
+              <a:ext uri="{FF2B5EF4-FFF2-40B4-BE49-F238E27FC236}">
+                <a16:creationId xmlns:a16="http://schemas.microsoft.com/office/drawing/2014/main" id="{DE6C1831-2270-481A-85F5-498B13D4878F}"/>
               </a:ext>
             </a:extLst>
           </p:cNvPr>
@@ -7937,10 +7261,10 @@
       </p:sp>
       <p:sp>
         <p:nvSpPr>
-          <p:cNvPr id="39" name="Oval 38">
-            <a:extLst>
-              <a:ext uri="{FF2B5EF4-FFF2-40B4-BE49-F238E27FC236}">
-                <a16:creationId xmlns:a16="http://schemas.microsoft.com/office/drawing/2014/main" id="{1128F50D-4293-4CBE-AF3D-C656E582E25C}"/>
+          <p:cNvPr id="57" name="Oval 56">
+            <a:extLst>
+              <a:ext uri="{FF2B5EF4-FFF2-40B4-BE49-F238E27FC236}">
+                <a16:creationId xmlns:a16="http://schemas.microsoft.com/office/drawing/2014/main" id="{3206A779-BC16-4D44-A103-CB1A75A33D64}"/>
               </a:ext>
             </a:extLst>
           </p:cNvPr>
@@ -7991,10 +7315,10 @@
       </p:sp>
       <p:sp>
         <p:nvSpPr>
-          <p:cNvPr id="41" name="Cloud 40">
-            <a:extLst>
-              <a:ext uri="{FF2B5EF4-FFF2-40B4-BE49-F238E27FC236}">
-                <a16:creationId xmlns:a16="http://schemas.microsoft.com/office/drawing/2014/main" id="{7C34FF5F-452E-42AD-8491-0BA97D9F0F47}"/>
+          <p:cNvPr id="59" name="Cloud 58">
+            <a:extLst>
+              <a:ext uri="{FF2B5EF4-FFF2-40B4-BE49-F238E27FC236}">
+                <a16:creationId xmlns:a16="http://schemas.microsoft.com/office/drawing/2014/main" id="{6A9998FF-0946-4692-9981-D7A74F814AA2}"/>
               </a:ext>
             </a:extLst>
           </p:cNvPr>
@@ -8045,10 +7369,10 @@
       </p:sp>
       <p:sp>
         <p:nvSpPr>
-          <p:cNvPr id="43" name="Frame 42">
-            <a:extLst>
-              <a:ext uri="{FF2B5EF4-FFF2-40B4-BE49-F238E27FC236}">
-                <a16:creationId xmlns:a16="http://schemas.microsoft.com/office/drawing/2014/main" id="{8951E14E-CCF4-4664-AC71-404533555B94}"/>
+          <p:cNvPr id="60" name="Frame 59">
+            <a:extLst>
+              <a:ext uri="{FF2B5EF4-FFF2-40B4-BE49-F238E27FC236}">
+                <a16:creationId xmlns:a16="http://schemas.microsoft.com/office/drawing/2014/main" id="{96BAD980-D27A-4E7B-A018-FAF92CD72D00}"/>
               </a:ext>
             </a:extLst>
           </p:cNvPr>
@@ -8095,10 +7419,10 @@
       </p:sp>
       <p:sp>
         <p:nvSpPr>
-          <p:cNvPr id="45" name="Block Arc 44">
-            <a:extLst>
-              <a:ext uri="{FF2B5EF4-FFF2-40B4-BE49-F238E27FC236}">
-                <a16:creationId xmlns:a16="http://schemas.microsoft.com/office/drawing/2014/main" id="{3CF363C7-EFDC-4D13-9124-9140F23121EF}"/>
+          <p:cNvPr id="61" name="Block Arc 60">
+            <a:extLst>
+              <a:ext uri="{FF2B5EF4-FFF2-40B4-BE49-F238E27FC236}">
+                <a16:creationId xmlns:a16="http://schemas.microsoft.com/office/drawing/2014/main" id="{7804F504-DF5E-4DF1-BB5B-528230C87E68}"/>
               </a:ext>
             </a:extLst>
           </p:cNvPr>
@@ -8106,11 +7430,61 @@
           <p:nvPr/>
         </p:nvSpPr>
         <p:spPr>
+          <a:xfrm rot="60000">
+            <a:off x="3553184" y="3102751"/>
+            <a:ext cx="301924" cy="431320"/>
+          </a:xfrm>
+          <a:prstGeom prst="blockArc">
+            <a:avLst/>
+          </a:prstGeom>
+        </p:spPr>
+        <p:style>
+          <a:lnRef idx="2">
+            <a:schemeClr val="accent1">
+              <a:shade val="50000"/>
+            </a:schemeClr>
+          </a:lnRef>
+          <a:fillRef idx="1">
+            <a:schemeClr val="accent1"/>
+          </a:fillRef>
+          <a:effectRef idx="0">
+            <a:schemeClr val="accent1"/>
+          </a:effectRef>
+          <a:fontRef idx="minor">
+            <a:schemeClr val="lt1"/>
+          </a:fontRef>
+        </p:style>
+        <p:txBody>
+          <a:bodyPr rtlCol="0" anchor="ctr"/>
+          <a:lstStyle/>
+          <a:p>
+            <a:pPr algn="ctr"/>
+            <a:endParaRPr lang="nl-NL">
+              <a:solidFill>
+                <a:srgbClr val="BF9000"/>
+              </a:solidFill>
+            </a:endParaRPr>
+          </a:p>
+        </p:txBody>
+      </p:sp>
+      <p:sp>
+        <p:nvSpPr>
+          <p:cNvPr id="7" name="Frame 6">
+            <a:extLst>
+              <a:ext uri="{FF2B5EF4-FFF2-40B4-BE49-F238E27FC236}">
+                <a16:creationId xmlns:a16="http://schemas.microsoft.com/office/drawing/2014/main" id="{981EA4FA-3ADC-47F9-8209-7A754BFE1459}"/>
+              </a:ext>
+            </a:extLst>
+          </p:cNvPr>
+          <p:cNvSpPr/>
+          <p:nvPr/>
+        </p:nvSpPr>
+        <p:spPr>
           <a:xfrm>
-            <a:off x="3553184" y="3100297"/>
-            <a:ext cx="301924" cy="431320"/>
-          </a:xfrm>
-          <a:prstGeom prst="blockArc">
+            <a:off x="649856" y="4927120"/>
+            <a:ext cx="359433" cy="301923"/>
+          </a:xfrm>
+          <a:prstGeom prst="frame">
             <a:avLst/>
           </a:prstGeom>
         </p:spPr>
@@ -8143,10 +7517,114 @@
           </a:p>
         </p:txBody>
       </p:sp>
+      <p:sp>
+        <p:nvSpPr>
+          <p:cNvPr id="9" name="Block Arc 8">
+            <a:extLst>
+              <a:ext uri="{FF2B5EF4-FFF2-40B4-BE49-F238E27FC236}">
+                <a16:creationId xmlns:a16="http://schemas.microsoft.com/office/drawing/2014/main" id="{C0CEE7E9-6DAB-4EFB-B269-E05C3D0D2B93}"/>
+              </a:ext>
+            </a:extLst>
+          </p:cNvPr>
+          <p:cNvSpPr/>
+          <p:nvPr/>
+        </p:nvSpPr>
+        <p:spPr>
+          <a:xfrm rot="21540000">
+            <a:off x="677712" y="4681805"/>
+            <a:ext cx="301924" cy="431320"/>
+          </a:xfrm>
+          <a:prstGeom prst="blockArc">
+            <a:avLst/>
+          </a:prstGeom>
+        </p:spPr>
+        <p:style>
+          <a:lnRef idx="2">
+            <a:schemeClr val="accent1">
+              <a:shade val="50000"/>
+            </a:schemeClr>
+          </a:lnRef>
+          <a:fillRef idx="1">
+            <a:schemeClr val="accent1"/>
+          </a:fillRef>
+          <a:effectRef idx="0">
+            <a:schemeClr val="accent1"/>
+          </a:effectRef>
+          <a:fontRef idx="minor">
+            <a:schemeClr val="lt1"/>
+          </a:fontRef>
+        </p:style>
+        <p:txBody>
+          <a:bodyPr rtlCol="0" anchor="ctr"/>
+          <a:lstStyle/>
+          <a:p>
+            <a:pPr algn="ctr"/>
+            <a:endParaRPr lang="nl-NL">
+              <a:solidFill>
+                <a:schemeClr val="tx1"/>
+              </a:solidFill>
+            </a:endParaRPr>
+          </a:p>
+        </p:txBody>
+      </p:sp>
+      <p:sp>
+        <p:nvSpPr>
+          <p:cNvPr id="11" name="Star: 5 Points 10">
+            <a:extLst>
+              <a:ext uri="{FF2B5EF4-FFF2-40B4-BE49-F238E27FC236}">
+                <a16:creationId xmlns:a16="http://schemas.microsoft.com/office/drawing/2014/main" id="{7997B96C-AE20-4A83-B92A-F9AFEB377AFB}"/>
+              </a:ext>
+            </a:extLst>
+          </p:cNvPr>
+          <p:cNvSpPr/>
+          <p:nvPr/>
+        </p:nvSpPr>
+        <p:spPr>
+          <a:xfrm rot="240000">
+            <a:off x="6038386" y="3101898"/>
+            <a:ext cx="1012901" cy="780585"/>
+          </a:xfrm>
+          <a:prstGeom prst="star5">
+            <a:avLst/>
+          </a:prstGeom>
+          <a:solidFill>
+            <a:srgbClr val="FFC000"/>
+          </a:solidFill>
+          <a:ln>
+            <a:solidFill>
+              <a:srgbClr val="FFC000"/>
+            </a:solidFill>
+          </a:ln>
+        </p:spPr>
+        <p:style>
+          <a:lnRef idx="2">
+            <a:schemeClr val="accent1">
+              <a:shade val="50000"/>
+            </a:schemeClr>
+          </a:lnRef>
+          <a:fillRef idx="1">
+            <a:schemeClr val="accent1"/>
+          </a:fillRef>
+          <a:effectRef idx="0">
+            <a:schemeClr val="accent1"/>
+          </a:effectRef>
+          <a:fontRef idx="minor">
+            <a:schemeClr val="lt1"/>
+          </a:fontRef>
+        </p:style>
+        <p:txBody>
+          <a:bodyPr rtlCol="0" anchor="ctr"/>
+          <a:lstStyle/>
+          <a:p>
+            <a:pPr algn="ctr"/>
+            <a:endParaRPr lang="nl-NL"/>
+          </a:p>
+        </p:txBody>
+      </p:sp>
     </p:spTree>
     <p:extLst>
       <p:ext uri="{BB962C8B-B14F-4D97-AF65-F5344CB8AC3E}">
-        <p14:creationId xmlns:p14="http://schemas.microsoft.com/office/powerpoint/2010/main" val="370089361"/>
+        <p14:creationId xmlns:p14="http://schemas.microsoft.com/office/powerpoint/2010/main" val="2961345263"/>
       </p:ext>
     </p:extLst>
   </p:cSld>
@@ -8233,90 +7711,90 @@
           <a:lstStyle/>
           <a:p>
             <a:r>
+              <a:rPr lang="nl-NL" b="1">
+                <a:cs typeface="Calibri"/>
+              </a:rPr>
+              <a:t>Service Providers agree </a:t>
+            </a:r>
+            <a:r>
               <a:rPr lang="nl-NL">
                 <a:cs typeface="Calibri"/>
               </a:rPr>
-              <a:t>Service Providers (Data Providers &amp; </a:t>
+              <a:t>on </a:t>
             </a:r>
             <a:r>
               <a:rPr lang="nl-NL" err="1">
                 <a:cs typeface="Calibri"/>
               </a:rPr>
-              <a:t>Relying</a:t>
+              <a:t>an</a:t>
+            </a:r>
+            <a:r>
+              <a:rPr lang="nl-NL" dirty="0">
+                <a:cs typeface="Calibri"/>
+              </a:rPr>
+              <a:t> </a:t>
+            </a:r>
+            <a:r>
+              <a:rPr lang="nl-NL" err="1">
+                <a:cs typeface="Calibri"/>
+              </a:rPr>
+              <a:t>encryption</a:t>
+            </a:r>
+            <a:r>
+              <a:rPr lang="nl-NL" dirty="0">
+                <a:cs typeface="Calibri"/>
+              </a:rPr>
+              <a:t> </a:t>
+            </a:r>
+            <a:r>
+              <a:rPr lang="nl-NL" err="1">
+                <a:cs typeface="Calibri"/>
+              </a:rPr>
+              <a:t>method</a:t>
             </a:r>
             <a:r>
               <a:rPr lang="nl-NL">
                 <a:cs typeface="Calibri"/>
               </a:rPr>
+              <a:t>.</a:t>
+            </a:r>
+          </a:p>
+          <a:p>
+            <a:r>
+              <a:rPr lang="nl-NL" b="1">
+                <a:cs typeface="Calibri"/>
+              </a:rPr>
+              <a:t>Qiy</a:t>
+            </a:r>
+            <a:r>
+              <a:rPr lang="nl-NL" b="1" dirty="0">
+                <a:cs typeface="Calibri"/>
+              </a:rPr>
               <a:t> </a:t>
             </a:r>
             <a:r>
-              <a:rPr lang="nl-NL" err="1">
+              <a:rPr lang="nl-NL" b="1" err="1">
                 <a:cs typeface="Calibri"/>
               </a:rPr>
-              <a:t>Parties</a:t>
+              <a:t>Scheme</a:t>
+            </a:r>
+            <a:r>
+              <a:rPr lang="nl-NL" b="1" dirty="0">
+                <a:cs typeface="Calibri"/>
+              </a:rPr>
+              <a:t> supports</a:t>
             </a:r>
             <a:r>
               <a:rPr lang="nl-NL">
                 <a:cs typeface="Calibri"/>
               </a:rPr>
-              <a:t>) </a:t>
-            </a:r>
-            <a:r>
-              <a:rPr lang="nl-NL" err="1">
+              <a:t> operation parameters in data request</a:t>
+            </a:r>
+            <a:r>
+              <a:rPr lang="nl-NL" dirty="0">
                 <a:cs typeface="Calibri"/>
               </a:rPr>
-              <a:t>agree</a:t>
-            </a:r>
-            <a:r>
-              <a:rPr lang="nl-NL">
-                <a:cs typeface="Calibri"/>
-              </a:rPr>
-              <a:t> on </a:t>
-            </a:r>
-            <a:r>
-              <a:rPr lang="nl-NL" err="1">
-                <a:cs typeface="Calibri"/>
-              </a:rPr>
-              <a:t>an</a:t>
-            </a:r>
-            <a:r>
-              <a:rPr lang="nl-NL">
-                <a:cs typeface="Calibri"/>
-              </a:rPr>
-              <a:t> </a:t>
-            </a:r>
-            <a:r>
-              <a:rPr lang="nl-NL" err="1">
-                <a:cs typeface="Calibri"/>
-              </a:rPr>
-              <a:t>encryption</a:t>
-            </a:r>
-            <a:r>
-              <a:rPr lang="nl-NL">
-                <a:cs typeface="Calibri"/>
-              </a:rPr>
-              <a:t> </a:t>
-            </a:r>
-            <a:r>
-              <a:rPr lang="nl-NL" err="1">
-                <a:cs typeface="Calibri"/>
-              </a:rPr>
-              <a:t>method</a:t>
-            </a:r>
-            <a:r>
-              <a:rPr lang="nl-NL">
-                <a:cs typeface="Calibri"/>
-              </a:rPr>
-              <a:t>.</a:t>
-            </a:r>
-          </a:p>
-          <a:p>
-            <a:r>
-              <a:rPr lang="nl-NL">
-                <a:cs typeface="Calibri"/>
-              </a:rPr>
-              <a:t>The Qiy Scheme supports free parameters in data request:</a:t>
+              <a:t>:</a:t>
             </a:r>
           </a:p>
           <a:p>
@@ -8326,7 +7804,7 @@
                 <a:ea typeface="+mn-lt"/>
                 <a:cs typeface="+mn-lt"/>
               </a:rPr>
-              <a:t>post requests</a:t>
+              <a:t>POST requests</a:t>
             </a:r>
           </a:p>
           <a:p>
@@ -8335,7 +7813,7 @@
               <a:rPr lang="nl-NL">
                 <a:cs typeface="Calibri"/>
               </a:rPr>
-              <a:t>body parameters</a:t>
+              <a:t>body</a:t>
             </a:r>
           </a:p>
           <a:p>
@@ -8344,8 +7822,9 @@
               <a:rPr lang="nl-NL">
                 <a:cs typeface="Calibri"/>
               </a:rPr>
-              <a:t>Json data</a:t>
-            </a:r>
+              <a:t>Json</a:t>
+            </a:r>
+            <a:endParaRPr lang="nl-NL"/>
           </a:p>
           <a:p>
             <a:pPr marL="0" indent="0">
@@ -8371,7 +7850,7 @@
         </p:nvSpPr>
         <p:spPr>
           <a:xfrm>
-            <a:off x="5788325" y="3401685"/>
+            <a:off x="5630349" y="3206539"/>
             <a:ext cx="6725727" cy="3139321"/>
           </a:xfrm>
           <a:prstGeom prst="rect">
@@ -8389,12 +7868,86 @@
           <a:lstStyle/>
           <a:p>
             <a:r>
+              <a:rPr lang="nl-NL" dirty="0" err="1">
+                <a:ea typeface="+mn-lt"/>
+                <a:cs typeface="+mn-lt"/>
+              </a:rPr>
+              <a:t>Example</a:t>
+            </a:r>
+            <a:r>
+              <a:rPr lang="nl-NL" dirty="0">
+                <a:ea typeface="+mn-lt"/>
+                <a:cs typeface="+mn-lt"/>
+              </a:rPr>
+              <a:t> body of data </a:t>
+            </a:r>
+            <a:r>
+              <a:rPr lang="nl-NL" dirty="0" err="1">
+                <a:ea typeface="+mn-lt"/>
+                <a:cs typeface="+mn-lt"/>
+              </a:rPr>
+              <a:t>request</a:t>
+            </a:r>
+            <a:r>
+              <a:rPr lang="nl-NL" dirty="0">
+                <a:ea typeface="+mn-lt"/>
+                <a:cs typeface="+mn-lt"/>
+              </a:rPr>
+              <a:t>:</a:t>
+            </a:r>
+          </a:p>
+          <a:p>
+            <a:r>
+              <a:rPr lang="nl-NL" dirty="0">
+                <a:ea typeface="+mn-lt"/>
+                <a:cs typeface="+mn-lt"/>
+              </a:rPr>
+              <a:t>[</a:t>
+            </a:r>
+          </a:p>
+          <a:p>
+            <a:r>
+              <a:rPr lang="nl-NL" dirty="0">
+                <a:ea typeface="+mn-lt"/>
+                <a:cs typeface="+mn-lt"/>
+              </a:rPr>
+              <a:t>    {</a:t>
+            </a:r>
+            <a:endParaRPr lang="nl-NL" dirty="0"/>
+          </a:p>
+          <a:p>
+            <a:r>
+              <a:rPr lang="nl-NL" dirty="0">
+                <a:ea typeface="+mn-lt"/>
+                <a:cs typeface="+mn-lt"/>
+              </a:rPr>
+              <a:t>        "</a:t>
+            </a:r>
+            <a:r>
+              <a:rPr lang="nl-NL" dirty="0" err="1">
+                <a:ea typeface="+mn-lt"/>
+                <a:cs typeface="+mn-lt"/>
+              </a:rPr>
+              <a:t>id</a:t>
+            </a:r>
+            <a:r>
+              <a:rPr lang="nl-NL" dirty="0">
+                <a:ea typeface="+mn-lt"/>
+                <a:cs typeface="+mn-lt"/>
+              </a:rPr>
+              <a:t>": {{feed_id1}}, </a:t>
+            </a:r>
+            <a:endParaRPr lang="nl-NL"/>
+          </a:p>
+          <a:p>
+            <a:r>
               <a:rPr lang="nl-NL">
                 <a:ea typeface="+mn-lt"/>
                 <a:cs typeface="+mn-lt"/>
               </a:rPr>
-              <a:t>Example body of data request:</a:t>
-            </a:r>
+              <a:t>        "operationParameters": {</a:t>
+            </a:r>
+            <a:endParaRPr lang="nl-NL"/>
           </a:p>
           <a:p>
             <a:r>
@@ -8402,8 +7955,11 @@
                 <a:ea typeface="+mn-lt"/>
                 <a:cs typeface="+mn-lt"/>
               </a:rPr>
-              <a:t>[</a:t>
-            </a:r>
+              <a:t>            "name1": "value1",</a:t>
+            </a:r>
+            <a:endParaRPr lang="nl-NL">
+              <a:cs typeface="Calibri" panose="020F0502020204030204"/>
+            </a:endParaRPr>
           </a:p>
           <a:p>
             <a:r>
@@ -8411,92 +7967,50 @@
                 <a:ea typeface="+mn-lt"/>
                 <a:cs typeface="+mn-lt"/>
               </a:rPr>
-              <a:t>    {</a:t>
+              <a:t>            "name2": "value2"</a:t>
             </a:r>
             <a:endParaRPr lang="nl-NL"/>
           </a:p>
           <a:p>
             <a:r>
-              <a:rPr lang="nl-NL">
+              <a:rPr lang="nl-NL" dirty="0">
                 <a:ea typeface="+mn-lt"/>
                 <a:cs typeface="+mn-lt"/>
               </a:rPr>
-              <a:t>        "id": {{feed_id1}}, </a:t>
-            </a:r>
-            <a:endParaRPr lang="nl-NL"/>
-          </a:p>
-          <a:p>
-            <a:r>
-              <a:rPr lang="nl-NL">
+              <a:t>        }</a:t>
+            </a:r>
+            <a:endParaRPr lang="nl-NL" dirty="0"/>
+          </a:p>
+          <a:p>
+            <a:r>
+              <a:rPr lang="nl-NL" dirty="0">
                 <a:ea typeface="+mn-lt"/>
                 <a:cs typeface="+mn-lt"/>
               </a:rPr>
-              <a:t>        "operation_parameters": {</a:t>
-            </a:r>
-            <a:endParaRPr lang="nl-NL"/>
-          </a:p>
-          <a:p>
-            <a:r>
-              <a:rPr lang="nl-NL">
+              <a:t>    },</a:t>
+            </a:r>
+            <a:endParaRPr lang="nl-NL" dirty="0"/>
+          </a:p>
+          <a:p>
+            <a:r>
+              <a:rPr lang="nl-NL" dirty="0">
                 <a:ea typeface="+mn-lt"/>
                 <a:cs typeface="+mn-lt"/>
               </a:rPr>
-              <a:t>            "name1": "value11",</a:t>
-            </a:r>
-            <a:endParaRPr lang="nl-NL">
-              <a:cs typeface="Calibri" panose="020F0502020204030204"/>
-            </a:endParaRPr>
-          </a:p>
-          <a:p>
-            <a:r>
-              <a:rPr lang="nl-NL">
+              <a:t>    ...</a:t>
+            </a:r>
+            <a:endParaRPr lang="nl-NL" dirty="0"/>
+          </a:p>
+          <a:p>
+            <a:pPr algn="l"/>
+            <a:r>
+              <a:rPr lang="nl-NL" dirty="0">
                 <a:ea typeface="+mn-lt"/>
                 <a:cs typeface="+mn-lt"/>
               </a:rPr>
-              <a:t>            "name2": "value12"</a:t>
-            </a:r>
-            <a:endParaRPr lang="nl-NL"/>
-          </a:p>
-          <a:p>
-            <a:r>
-              <a:rPr lang="nl-NL">
-                <a:ea typeface="+mn-lt"/>
-                <a:cs typeface="+mn-lt"/>
-              </a:rPr>
-              <a:t>        }</a:t>
-            </a:r>
-            <a:endParaRPr lang="nl-NL"/>
-          </a:p>
-          <a:p>
-            <a:r>
-              <a:rPr lang="nl-NL">
-                <a:ea typeface="+mn-lt"/>
-                <a:cs typeface="+mn-lt"/>
-              </a:rPr>
-              <a:t>    },</a:t>
-            </a:r>
-            <a:endParaRPr lang="nl-NL"/>
-          </a:p>
-          <a:p>
-            <a:r>
-              <a:rPr lang="nl-NL">
-                <a:ea typeface="+mn-lt"/>
-                <a:cs typeface="+mn-lt"/>
-              </a:rPr>
-              <a:t>    ...</a:t>
-            </a:r>
-            <a:endParaRPr lang="nl-NL"/>
-          </a:p>
-          <a:p>
-            <a:pPr algn="l"/>
-            <a:r>
-              <a:rPr lang="nl-NL">
-                <a:ea typeface="+mn-lt"/>
-                <a:cs typeface="+mn-lt"/>
-              </a:rPr>
               <a:t>]</a:t>
             </a:r>
-            <a:endParaRPr lang="nl-NL"/>
+            <a:endParaRPr lang="nl-NL" dirty="0"/>
           </a:p>
         </p:txBody>
       </p:sp>
@@ -10572,16 +10086,28 @@
           </a:p>
           <a:p>
             <a:r>
-              <a:rPr lang="nl-NL" err="1">
+              <a:rPr lang="nl-NL" dirty="0" err="1">
                 <a:cs typeface="Calibri"/>
               </a:rPr>
               <a:t>Join</a:t>
             </a:r>
             <a:r>
-              <a:rPr lang="nl-NL">
+              <a:rPr lang="nl-NL" dirty="0">
                 <a:cs typeface="Calibri"/>
               </a:rPr>
-              <a:t> review meeting: </a:t>
+              <a:t> </a:t>
+            </a:r>
+            <a:r>
+              <a:rPr lang="nl-NL" dirty="0" err="1">
+                <a:cs typeface="Calibri"/>
+              </a:rPr>
+              <a:t>committing</a:t>
+            </a:r>
+            <a:r>
+              <a:rPr lang="nl-NL" dirty="0">
+                <a:cs typeface="Calibri"/>
+              </a:rPr>
+              <a:t> review: </a:t>
             </a:r>
           </a:p>
           <a:p>
@@ -10589,14 +10115,14 @@
               <a:buNone/>
             </a:pPr>
             <a:r>
-              <a:rPr lang="de-DE">
+              <a:rPr lang="de-DE" dirty="0">
                 <a:ea typeface="+mn-lt"/>
                 <a:cs typeface="+mn-lt"/>
                 <a:hlinkClick r:id="rId2"/>
               </a:rPr>
               <a:t>Qiy Scheme  </a:t>
             </a:r>
-            <a:endParaRPr lang="nl-NL">
+            <a:endParaRPr lang="nl-NL" dirty="0">
               <a:ea typeface="+mn-lt"/>
               <a:cs typeface="+mn-lt"/>
             </a:endParaRPr>
@@ -10606,12 +10132,12 @@
               <a:buNone/>
             </a:pPr>
             <a:r>
-              <a:rPr lang="de-DE">
+              <a:rPr lang="de-DE" dirty="0">
                 <a:ea typeface="+mn-lt"/>
                 <a:cs typeface="+mn-lt"/>
                 <a:hlinkClick r:id="rId2"/>
               </a:rPr>
-              <a:t>Workstream Functionality &amp; Technology</a:t>
+              <a:t>Work Stream Functionality &amp; Technology</a:t>
             </a:r>
           </a:p>
           <a:p>
@@ -10619,14 +10145,14 @@
               <a:buNone/>
             </a:pPr>
             <a:r>
-              <a:rPr lang="de-DE">
+              <a:rPr lang="de-DE" dirty="0">
                 <a:ea typeface="+mn-lt"/>
                 <a:cs typeface="+mn-lt"/>
                 <a:hlinkClick r:id="rId2"/>
               </a:rPr>
               <a:t>Meeting 08-22</a:t>
             </a:r>
-            <a:endParaRPr lang="nl-NL">
+            <a:endParaRPr lang="nl-NL" dirty="0">
               <a:cs typeface="Calibri"/>
             </a:endParaRPr>
           </a:p>
@@ -10921,15 +10447,6 @@
 </file>
 
 <file path=customXml/item2.xml><?xml version="1.0" encoding="utf-8"?>
-<?mso-contentType ?>
-<FormTemplates xmlns="http://schemas.microsoft.com/sharepoint/v3/contenttype/forms">
-  <Display>DocumentLibraryForm</Display>
-  <Edit>DocumentLibraryForm</Edit>
-  <New>DocumentLibraryForm</New>
-</FormTemplates>
-</file>
-
-<file path=customXml/item3.xml><?xml version="1.0" encoding="utf-8"?>
 <ct:contentTypeSchema xmlns:ct="http://schemas.microsoft.com/office/2006/metadata/contentType" xmlns:ma="http://schemas.microsoft.com/office/2006/metadata/properties/metaAttributes" ct:_="" ma:_="" ma:contentTypeName="Document" ma:contentTypeID="0x010100C28418567F7B784AB563F61335F28BFE" ma:contentTypeVersion="2" ma:contentTypeDescription="Een nieuw document maken." ma:contentTypeScope="" ma:versionID="c70f18f9afa91204a99ae6d13747001e">
   <xsd:schema xmlns:xsd="http://www.w3.org/2001/XMLSchema" xmlns:xs="http://www.w3.org/2001/XMLSchema" xmlns:p="http://schemas.microsoft.com/office/2006/metadata/properties" xmlns:ns2="45b9cb8d-a685-4490-8e03-159b20be9a34" targetNamespace="http://schemas.microsoft.com/office/2006/metadata/properties" ma:root="true" ma:fieldsID="421eec466d9924ab145f0a4ca4d40dff" ns2:_="">
     <xsd:import namespace="45b9cb8d-a685-4490-8e03-159b20be9a34"/>
@@ -11061,6 +10578,15 @@
 </ct:contentTypeSchema>
 </file>
 
+<file path=customXml/item3.xml><?xml version="1.0" encoding="utf-8"?>
+<?mso-contentType ?>
+<FormTemplates xmlns="http://schemas.microsoft.com/sharepoint/v3/contenttype/forms">
+  <Display>DocumentLibraryForm</Display>
+  <Edit>DocumentLibraryForm</Edit>
+  <New>DocumentLibraryForm</New>
+</FormTemplates>
+</file>
+
 <file path=customXml/itemProps1.xml><?xml version="1.0" encoding="utf-8"?>
 <ds:datastoreItem xmlns:ds="http://schemas.openxmlformats.org/officeDocument/2006/customXml" ds:itemID="{EA4D41B1-2F8F-44AB-A2AB-7298E2DEB5E2}">
   <ds:schemaRefs>
@@ -11071,27 +10597,27 @@
 </file>
 
 <file path=customXml/itemProps2.xml><?xml version="1.0" encoding="utf-8"?>
+<ds:datastoreItem xmlns:ds="http://schemas.openxmlformats.org/officeDocument/2006/customXml" ds:itemID="{403CC1D2-025A-40C0-BB4E-40289BCCA896}">
+  <ds:schemaRefs>
+    <ds:schemaRef ds:uri="http://schemas.microsoft.com/office/2006/metadata/contentType"/>
+    <ds:schemaRef ds:uri="http://schemas.microsoft.com/office/2006/metadata/properties/metaAttributes"/>
+    <ds:schemaRef ds:uri="http://www.w3.org/2001/XMLSchema"/>
+    <ds:schemaRef ds:uri="http://schemas.microsoft.com/office/2006/metadata/properties"/>
+    <ds:schemaRef ds:uri="45b9cb8d-a685-4490-8e03-159b20be9a34"/>
+    <ds:schemaRef ds:uri="http://schemas.microsoft.com/office/2006/documentManagement/types"/>
+    <ds:schemaRef ds:uri="http://schemas.microsoft.com/office/infopath/2007/PartnerControls"/>
+    <ds:schemaRef ds:uri="http://schemas.openxmlformats.org/package/2006/metadata/core-properties"/>
+    <ds:schemaRef ds:uri="http://purl.org/dc/elements/1.1/"/>
+    <ds:schemaRef ds:uri="http://purl.org/dc/terms/"/>
+    <ds:schemaRef ds:uri="http://schemas.microsoft.com/internal/obd"/>
+  </ds:schemaRefs>
+</ds:datastoreItem>
+</file>
+
+<file path=customXml/itemProps3.xml><?xml version="1.0" encoding="utf-8"?>
 <ds:datastoreItem xmlns:ds="http://schemas.openxmlformats.org/officeDocument/2006/customXml" ds:itemID="{833B8B25-F777-4BF7-89DC-9C044D5C6115}">
   <ds:schemaRefs>
     <ds:schemaRef ds:uri="http://schemas.microsoft.com/sharepoint/v3/contenttype/forms"/>
   </ds:schemaRefs>
 </ds:datastoreItem>
-</file>
-
-<file path=customXml/itemProps3.xml><?xml version="1.0" encoding="utf-8"?>
-<ds:datastoreItem xmlns:ds="http://schemas.openxmlformats.org/officeDocument/2006/customXml" ds:itemID="{403CC1D2-025A-40C0-BB4E-40289BCCA896}">
-  <ds:schemaRefs>
-    <ds:schemaRef ds:uri="45b9cb8d-a685-4490-8e03-159b20be9a34"/>
-    <ds:schemaRef ds:uri="http://purl.org/dc/elements/1.1/"/>
-    <ds:schemaRef ds:uri="http://purl.org/dc/terms/"/>
-    <ds:schemaRef ds:uri="http://schemas.microsoft.com/internal/obd"/>
-    <ds:schemaRef ds:uri="http://schemas.microsoft.com/office/2006/documentManagement/types"/>
-    <ds:schemaRef ds:uri="http://schemas.microsoft.com/office/2006/metadata/contentType"/>
-    <ds:schemaRef ds:uri="http://schemas.microsoft.com/office/2006/metadata/properties"/>
-    <ds:schemaRef ds:uri="http://schemas.microsoft.com/office/2006/metadata/properties/metaAttributes"/>
-    <ds:schemaRef ds:uri="http://schemas.microsoft.com/office/infopath/2007/PartnerControls"/>
-    <ds:schemaRef ds:uri="http://schemas.openxmlformats.org/package/2006/metadata/core-properties"/>
-    <ds:schemaRef ds:uri="http://www.w3.org/2001/XMLSchema"/>
-  </ds:schemaRefs>
-</ds:datastoreItem>
 </file>
</xml_diff>